<commit_message>
update slides and plot sizes to fit slides
</commit_message>
<xml_diff>
--- a/CA1/CA1 Slides.pptx
+++ b/CA1/CA1 Slides.pptx
@@ -5,12 +5,22 @@
     <p:sldMasterId id="2147483648" r:id="rId1"/>
   </p:sldMasterIdLst>
   <p:notesMasterIdLst>
-    <p:notesMasterId r:id="rId5"/>
+    <p:notesMasterId r:id="rId15"/>
   </p:notesMasterIdLst>
   <p:sldIdLst>
     <p:sldId id="256" r:id="rId2"/>
     <p:sldId id="257" r:id="rId3"/>
     <p:sldId id="258" r:id="rId4"/>
+    <p:sldId id="260" r:id="rId5"/>
+    <p:sldId id="263" r:id="rId6"/>
+    <p:sldId id="259" r:id="rId7"/>
+    <p:sldId id="262" r:id="rId8"/>
+    <p:sldId id="264" r:id="rId9"/>
+    <p:sldId id="265" r:id="rId10"/>
+    <p:sldId id="269" r:id="rId11"/>
+    <p:sldId id="266" r:id="rId12"/>
+    <p:sldId id="267" r:id="rId13"/>
+    <p:sldId id="268" r:id="rId14"/>
   </p:sldIdLst>
   <p:sldSz cx="12192000" cy="6858000"/>
   <p:notesSz cx="6858000" cy="9144000"/>
@@ -109,6 +119,11 @@
       </a:defRPr>
     </a:lvl9pPr>
   </p:defaultTextStyle>
+  <p:extLst>
+    <p:ext uri="{EFAFB233-063F-42B5-8137-9DF3F51BA10A}">
+      <p15:sldGuideLst xmlns:p15="http://schemas.microsoft.com/office/powerpoint/2012/main"/>
+    </p:ext>
+  </p:extLst>
 </p:presentation>
 </file>
 
@@ -5006,6 +5021,606 @@
 </p:sld>
 </file>
 
+<file path=ppt/slides/slide10.xml><?xml version="1.0" encoding="utf-8"?>
+<p:sld xmlns:a="http://schemas.openxmlformats.org/drawingml/2006/main" xmlns:r="http://schemas.openxmlformats.org/officeDocument/2006/relationships" xmlns:p="http://schemas.openxmlformats.org/presentationml/2006/main">
+  <p:cSld>
+    <p:spTree>
+      <p:nvGrpSpPr>
+        <p:cNvPr id="1" name=""/>
+        <p:cNvGrpSpPr/>
+        <p:nvPr/>
+      </p:nvGrpSpPr>
+      <p:grpSpPr>
+        <a:xfrm>
+          <a:off x="0" y="0"/>
+          <a:ext cx="0" cy="0"/>
+          <a:chOff x="0" y="0"/>
+          <a:chExt cx="0" cy="0"/>
+        </a:xfrm>
+      </p:grpSpPr>
+      <p:sp>
+        <p:nvSpPr>
+          <p:cNvPr id="2" name="Title 1">
+            <a:extLst>
+              <a:ext uri="{FF2B5EF4-FFF2-40B4-BE49-F238E27FC236}">
+                <a16:creationId xmlns:a16="http://schemas.microsoft.com/office/drawing/2014/main" id="{6AA6D162-3792-C1DD-3411-EEF61C233EC6}"/>
+              </a:ext>
+            </a:extLst>
+          </p:cNvPr>
+          <p:cNvSpPr>
+            <a:spLocks noGrp="1"/>
+          </p:cNvSpPr>
+          <p:nvPr>
+            <p:ph type="title"/>
+          </p:nvPr>
+        </p:nvSpPr>
+        <p:spPr>
+          <a:xfrm>
+            <a:off x="838200" y="365125"/>
+            <a:ext cx="5857068" cy="1325563"/>
+          </a:xfrm>
+        </p:spPr>
+        <p:txBody>
+          <a:bodyPr/>
+          <a:lstStyle/>
+          <a:p>
+            <a:endParaRPr lang="en-US" dirty="0"/>
+          </a:p>
+        </p:txBody>
+      </p:sp>
+      <p:sp>
+        <p:nvSpPr>
+          <p:cNvPr id="3" name="Content Placeholder 2">
+            <a:extLst>
+              <a:ext uri="{FF2B5EF4-FFF2-40B4-BE49-F238E27FC236}">
+                <a16:creationId xmlns:a16="http://schemas.microsoft.com/office/drawing/2014/main" id="{F8F5BA37-534C-3525-8A90-76F4E0BE1FE1}"/>
+              </a:ext>
+            </a:extLst>
+          </p:cNvPr>
+          <p:cNvSpPr>
+            <a:spLocks noGrp="1"/>
+          </p:cNvSpPr>
+          <p:nvPr>
+            <p:ph idx="1"/>
+          </p:nvPr>
+        </p:nvSpPr>
+        <p:spPr>
+          <a:xfrm>
+            <a:off x="838200" y="1825625"/>
+            <a:ext cx="5857068" cy="4351338"/>
+          </a:xfrm>
+        </p:spPr>
+        <p:txBody>
+          <a:bodyPr/>
+          <a:lstStyle/>
+          <a:p>
+            <a:endParaRPr lang="en-US" dirty="0"/>
+          </a:p>
+        </p:txBody>
+      </p:sp>
+      <p:sp>
+        <p:nvSpPr>
+          <p:cNvPr id="4" name="Slide Number Placeholder 3">
+            <a:extLst>
+              <a:ext uri="{FF2B5EF4-FFF2-40B4-BE49-F238E27FC236}">
+                <a16:creationId xmlns:a16="http://schemas.microsoft.com/office/drawing/2014/main" id="{AD5ABD77-EBE2-5386-06B6-7CC422E72F01}"/>
+              </a:ext>
+            </a:extLst>
+          </p:cNvPr>
+          <p:cNvSpPr>
+            <a:spLocks noGrp="1"/>
+          </p:cNvSpPr>
+          <p:nvPr>
+            <p:ph type="sldNum" sz="quarter" idx="12"/>
+          </p:nvPr>
+        </p:nvSpPr>
+        <p:spPr/>
+        <p:txBody>
+          <a:bodyPr/>
+          <a:lstStyle/>
+          <a:p>
+            <a:fld id="{E6FE59FF-D9EB-D545-90E6-CE90D1694C9B}" type="slidenum">
+              <a:rPr lang="en-US" smtClean="0"/>
+              <a:pPr/>
+              <a:t>10</a:t>
+            </a:fld>
+            <a:endParaRPr lang="en-US" dirty="0"/>
+          </a:p>
+        </p:txBody>
+      </p:sp>
+      <p:pic>
+        <p:nvPicPr>
+          <p:cNvPr id="6" name="Picture 5">
+            <a:extLst>
+              <a:ext uri="{FF2B5EF4-FFF2-40B4-BE49-F238E27FC236}">
+                <a16:creationId xmlns:a16="http://schemas.microsoft.com/office/drawing/2014/main" id="{5DD47241-F288-21E8-88CB-A6F28FCB8960}"/>
+              </a:ext>
+            </a:extLst>
+          </p:cNvPr>
+          <p:cNvPicPr>
+            <a:picLocks noChangeAspect="1"/>
+          </p:cNvPicPr>
+          <p:nvPr/>
+        </p:nvPicPr>
+        <p:blipFill>
+          <a:blip r:embed="rId2"/>
+          <a:stretch>
+            <a:fillRect/>
+          </a:stretch>
+        </p:blipFill>
+        <p:spPr>
+          <a:xfrm>
+            <a:off x="6865749" y="392724"/>
+            <a:ext cx="5181100" cy="5931984"/>
+          </a:xfrm>
+          <a:prstGeom prst="rect">
+            <a:avLst/>
+          </a:prstGeom>
+        </p:spPr>
+      </p:pic>
+    </p:spTree>
+    <p:extLst>
+      <p:ext uri="{BB962C8B-B14F-4D97-AF65-F5344CB8AC3E}">
+        <p14:creationId xmlns:p14="http://schemas.microsoft.com/office/powerpoint/2010/main" val="3308921364"/>
+      </p:ext>
+    </p:extLst>
+  </p:cSld>
+  <p:clrMapOvr>
+    <a:masterClrMapping/>
+  </p:clrMapOvr>
+</p:sld>
+</file>
+
+<file path=ppt/slides/slide11.xml><?xml version="1.0" encoding="utf-8"?>
+<p:sld xmlns:a="http://schemas.openxmlformats.org/drawingml/2006/main" xmlns:r="http://schemas.openxmlformats.org/officeDocument/2006/relationships" xmlns:p="http://schemas.openxmlformats.org/presentationml/2006/main">
+  <p:cSld>
+    <p:spTree>
+      <p:nvGrpSpPr>
+        <p:cNvPr id="1" name=""/>
+        <p:cNvGrpSpPr/>
+        <p:nvPr/>
+      </p:nvGrpSpPr>
+      <p:grpSpPr>
+        <a:xfrm>
+          <a:off x="0" y="0"/>
+          <a:ext cx="0" cy="0"/>
+          <a:chOff x="0" y="0"/>
+          <a:chExt cx="0" cy="0"/>
+        </a:xfrm>
+      </p:grpSpPr>
+      <p:sp>
+        <p:nvSpPr>
+          <p:cNvPr id="2" name="Title 1">
+            <a:extLst>
+              <a:ext uri="{FF2B5EF4-FFF2-40B4-BE49-F238E27FC236}">
+                <a16:creationId xmlns:a16="http://schemas.microsoft.com/office/drawing/2014/main" id="{11DBBA12-6E02-21FB-9470-5A7FAEEDC054}"/>
+              </a:ext>
+            </a:extLst>
+          </p:cNvPr>
+          <p:cNvSpPr>
+            <a:spLocks noGrp="1"/>
+          </p:cNvSpPr>
+          <p:nvPr>
+            <p:ph type="title"/>
+          </p:nvPr>
+        </p:nvSpPr>
+        <p:spPr>
+          <a:xfrm>
+            <a:off x="838200" y="365125"/>
+            <a:ext cx="4245244" cy="1325563"/>
+          </a:xfrm>
+        </p:spPr>
+        <p:txBody>
+          <a:bodyPr/>
+          <a:lstStyle/>
+          <a:p>
+            <a:endParaRPr lang="en-US" dirty="0"/>
+          </a:p>
+        </p:txBody>
+      </p:sp>
+      <p:sp>
+        <p:nvSpPr>
+          <p:cNvPr id="3" name="Content Placeholder 2">
+            <a:extLst>
+              <a:ext uri="{FF2B5EF4-FFF2-40B4-BE49-F238E27FC236}">
+                <a16:creationId xmlns:a16="http://schemas.microsoft.com/office/drawing/2014/main" id="{CE84337D-3D74-248F-711D-B55D3962994C}"/>
+              </a:ext>
+            </a:extLst>
+          </p:cNvPr>
+          <p:cNvSpPr>
+            <a:spLocks noGrp="1"/>
+          </p:cNvSpPr>
+          <p:nvPr>
+            <p:ph idx="1"/>
+          </p:nvPr>
+        </p:nvSpPr>
+        <p:spPr>
+          <a:xfrm>
+            <a:off x="838200" y="1825625"/>
+            <a:ext cx="4245244" cy="4351338"/>
+          </a:xfrm>
+        </p:spPr>
+        <p:txBody>
+          <a:bodyPr/>
+          <a:lstStyle/>
+          <a:p>
+            <a:endParaRPr lang="en-US" dirty="0"/>
+          </a:p>
+        </p:txBody>
+      </p:sp>
+      <p:sp>
+        <p:nvSpPr>
+          <p:cNvPr id="4" name="Slide Number Placeholder 3">
+            <a:extLst>
+              <a:ext uri="{FF2B5EF4-FFF2-40B4-BE49-F238E27FC236}">
+                <a16:creationId xmlns:a16="http://schemas.microsoft.com/office/drawing/2014/main" id="{D79CC5E2-9BD9-56C9-BCE1-07015755B40D}"/>
+              </a:ext>
+            </a:extLst>
+          </p:cNvPr>
+          <p:cNvSpPr>
+            <a:spLocks noGrp="1"/>
+          </p:cNvSpPr>
+          <p:nvPr>
+            <p:ph type="sldNum" sz="quarter" idx="12"/>
+          </p:nvPr>
+        </p:nvSpPr>
+        <p:spPr/>
+        <p:txBody>
+          <a:bodyPr/>
+          <a:lstStyle/>
+          <a:p>
+            <a:fld id="{E6FE59FF-D9EB-D545-90E6-CE90D1694C9B}" type="slidenum">
+              <a:rPr lang="en-US" smtClean="0"/>
+              <a:pPr/>
+              <a:t>11</a:t>
+            </a:fld>
+            <a:endParaRPr lang="en-US" dirty="0"/>
+          </a:p>
+        </p:txBody>
+      </p:sp>
+      <p:pic>
+        <p:nvPicPr>
+          <p:cNvPr id="5" name="Picture 4" descr="Chart, line chart&#10;&#10;Description automatically generated">
+            <a:extLst>
+              <a:ext uri="{FF2B5EF4-FFF2-40B4-BE49-F238E27FC236}">
+                <a16:creationId xmlns:a16="http://schemas.microsoft.com/office/drawing/2014/main" id="{E7EABACD-2C7E-DE0C-5F10-F1CFD4A048FF}"/>
+              </a:ext>
+            </a:extLst>
+          </p:cNvPr>
+          <p:cNvPicPr>
+            <a:picLocks noChangeAspect="1"/>
+          </p:cNvPicPr>
+          <p:nvPr/>
+        </p:nvPicPr>
+        <p:blipFill>
+          <a:blip r:embed="rId2"/>
+          <a:stretch>
+            <a:fillRect/>
+          </a:stretch>
+        </p:blipFill>
+        <p:spPr>
+          <a:xfrm>
+            <a:off x="5377912" y="981189"/>
+            <a:ext cx="6549325" cy="4895621"/>
+          </a:xfrm>
+          <a:prstGeom prst="rect">
+            <a:avLst/>
+          </a:prstGeom>
+        </p:spPr>
+      </p:pic>
+    </p:spTree>
+    <p:extLst>
+      <p:ext uri="{BB962C8B-B14F-4D97-AF65-F5344CB8AC3E}">
+        <p14:creationId xmlns:p14="http://schemas.microsoft.com/office/powerpoint/2010/main" val="2638041493"/>
+      </p:ext>
+    </p:extLst>
+  </p:cSld>
+  <p:clrMapOvr>
+    <a:masterClrMapping/>
+  </p:clrMapOvr>
+</p:sld>
+</file>
+
+<file path=ppt/slides/slide12.xml><?xml version="1.0" encoding="utf-8"?>
+<p:sld xmlns:a="http://schemas.openxmlformats.org/drawingml/2006/main" xmlns:r="http://schemas.openxmlformats.org/officeDocument/2006/relationships" xmlns:p="http://schemas.openxmlformats.org/presentationml/2006/main">
+  <p:cSld>
+    <p:spTree>
+      <p:nvGrpSpPr>
+        <p:cNvPr id="1" name=""/>
+        <p:cNvGrpSpPr/>
+        <p:nvPr/>
+      </p:nvGrpSpPr>
+      <p:grpSpPr>
+        <a:xfrm>
+          <a:off x="0" y="0"/>
+          <a:ext cx="0" cy="0"/>
+          <a:chOff x="0" y="0"/>
+          <a:chExt cx="0" cy="0"/>
+        </a:xfrm>
+      </p:grpSpPr>
+      <p:sp>
+        <p:nvSpPr>
+          <p:cNvPr id="2" name="Title 1">
+            <a:extLst>
+              <a:ext uri="{FF2B5EF4-FFF2-40B4-BE49-F238E27FC236}">
+                <a16:creationId xmlns:a16="http://schemas.microsoft.com/office/drawing/2014/main" id="{EC4B782B-6B1F-16F5-7582-475E887D20D9}"/>
+              </a:ext>
+            </a:extLst>
+          </p:cNvPr>
+          <p:cNvSpPr>
+            <a:spLocks noGrp="1"/>
+          </p:cNvSpPr>
+          <p:nvPr>
+            <p:ph type="title"/>
+          </p:nvPr>
+        </p:nvSpPr>
+        <p:spPr>
+          <a:xfrm>
+            <a:off x="838199" y="365125"/>
+            <a:ext cx="5066655" cy="1325563"/>
+          </a:xfrm>
+        </p:spPr>
+        <p:txBody>
+          <a:bodyPr/>
+          <a:lstStyle/>
+          <a:p>
+            <a:endParaRPr lang="en-US" dirty="0"/>
+          </a:p>
+        </p:txBody>
+      </p:sp>
+      <p:sp>
+        <p:nvSpPr>
+          <p:cNvPr id="3" name="Content Placeholder 2">
+            <a:extLst>
+              <a:ext uri="{FF2B5EF4-FFF2-40B4-BE49-F238E27FC236}">
+                <a16:creationId xmlns:a16="http://schemas.microsoft.com/office/drawing/2014/main" id="{2D21537C-8050-0B9C-B9E0-2076DCEDC41B}"/>
+              </a:ext>
+            </a:extLst>
+          </p:cNvPr>
+          <p:cNvSpPr>
+            <a:spLocks noGrp="1"/>
+          </p:cNvSpPr>
+          <p:nvPr>
+            <p:ph idx="1"/>
+          </p:nvPr>
+        </p:nvSpPr>
+        <p:spPr>
+          <a:xfrm>
+            <a:off x="838199" y="1825625"/>
+            <a:ext cx="5066655" cy="4351338"/>
+          </a:xfrm>
+        </p:spPr>
+        <p:txBody>
+          <a:bodyPr/>
+          <a:lstStyle/>
+          <a:p>
+            <a:endParaRPr lang="en-US" dirty="0"/>
+          </a:p>
+        </p:txBody>
+      </p:sp>
+      <p:sp>
+        <p:nvSpPr>
+          <p:cNvPr id="4" name="Slide Number Placeholder 3">
+            <a:extLst>
+              <a:ext uri="{FF2B5EF4-FFF2-40B4-BE49-F238E27FC236}">
+                <a16:creationId xmlns:a16="http://schemas.microsoft.com/office/drawing/2014/main" id="{E997AB43-4AAD-B4DA-E158-D945270FC108}"/>
+              </a:ext>
+            </a:extLst>
+          </p:cNvPr>
+          <p:cNvSpPr>
+            <a:spLocks noGrp="1"/>
+          </p:cNvSpPr>
+          <p:nvPr>
+            <p:ph type="sldNum" sz="quarter" idx="12"/>
+          </p:nvPr>
+        </p:nvSpPr>
+        <p:spPr/>
+        <p:txBody>
+          <a:bodyPr/>
+          <a:lstStyle/>
+          <a:p>
+            <a:fld id="{E6FE59FF-D9EB-D545-90E6-CE90D1694C9B}" type="slidenum">
+              <a:rPr lang="en-US" smtClean="0"/>
+              <a:pPr/>
+              <a:t>12</a:t>
+            </a:fld>
+            <a:endParaRPr lang="en-US" dirty="0"/>
+          </a:p>
+        </p:txBody>
+      </p:sp>
+      <p:pic>
+        <p:nvPicPr>
+          <p:cNvPr id="6" name="Picture 5">
+            <a:extLst>
+              <a:ext uri="{FF2B5EF4-FFF2-40B4-BE49-F238E27FC236}">
+                <a16:creationId xmlns:a16="http://schemas.microsoft.com/office/drawing/2014/main" id="{02508BBA-7536-E325-E2BF-0B5DD2B18C6D}"/>
+              </a:ext>
+            </a:extLst>
+          </p:cNvPr>
+          <p:cNvPicPr>
+            <a:picLocks noChangeAspect="1"/>
+          </p:cNvPicPr>
+          <p:nvPr/>
+        </p:nvPicPr>
+        <p:blipFill>
+          <a:blip r:embed="rId2"/>
+          <a:stretch>
+            <a:fillRect/>
+          </a:stretch>
+        </p:blipFill>
+        <p:spPr>
+          <a:xfrm>
+            <a:off x="6044337" y="425557"/>
+            <a:ext cx="6006885" cy="6006885"/>
+          </a:xfrm>
+          <a:prstGeom prst="rect">
+            <a:avLst/>
+          </a:prstGeom>
+        </p:spPr>
+      </p:pic>
+    </p:spTree>
+    <p:extLst>
+      <p:ext uri="{BB962C8B-B14F-4D97-AF65-F5344CB8AC3E}">
+        <p14:creationId xmlns:p14="http://schemas.microsoft.com/office/powerpoint/2010/main" val="928219461"/>
+      </p:ext>
+    </p:extLst>
+  </p:cSld>
+  <p:clrMapOvr>
+    <a:masterClrMapping/>
+  </p:clrMapOvr>
+</p:sld>
+</file>
+
+<file path=ppt/slides/slide13.xml><?xml version="1.0" encoding="utf-8"?>
+<p:sld xmlns:a="http://schemas.openxmlformats.org/drawingml/2006/main" xmlns:r="http://schemas.openxmlformats.org/officeDocument/2006/relationships" xmlns:p="http://schemas.openxmlformats.org/presentationml/2006/main">
+  <p:cSld>
+    <p:spTree>
+      <p:nvGrpSpPr>
+        <p:cNvPr id="1" name=""/>
+        <p:cNvGrpSpPr/>
+        <p:nvPr/>
+      </p:nvGrpSpPr>
+      <p:grpSpPr>
+        <a:xfrm>
+          <a:off x="0" y="0"/>
+          <a:ext cx="0" cy="0"/>
+          <a:chOff x="0" y="0"/>
+          <a:chExt cx="0" cy="0"/>
+        </a:xfrm>
+      </p:grpSpPr>
+      <p:sp>
+        <p:nvSpPr>
+          <p:cNvPr id="2" name="Title 1">
+            <a:extLst>
+              <a:ext uri="{FF2B5EF4-FFF2-40B4-BE49-F238E27FC236}">
+                <a16:creationId xmlns:a16="http://schemas.microsoft.com/office/drawing/2014/main" id="{C4A634B8-030A-4482-12C1-692EE51B6997}"/>
+              </a:ext>
+            </a:extLst>
+          </p:cNvPr>
+          <p:cNvSpPr>
+            <a:spLocks noGrp="1"/>
+          </p:cNvSpPr>
+          <p:nvPr>
+            <p:ph type="title"/>
+          </p:nvPr>
+        </p:nvSpPr>
+        <p:spPr>
+          <a:xfrm>
+            <a:off x="838200" y="365125"/>
+            <a:ext cx="5717583" cy="1325563"/>
+          </a:xfrm>
+        </p:spPr>
+        <p:txBody>
+          <a:bodyPr/>
+          <a:lstStyle/>
+          <a:p>
+            <a:endParaRPr lang="en-US"/>
+          </a:p>
+        </p:txBody>
+      </p:sp>
+      <p:sp>
+        <p:nvSpPr>
+          <p:cNvPr id="3" name="Content Placeholder 2">
+            <a:extLst>
+              <a:ext uri="{FF2B5EF4-FFF2-40B4-BE49-F238E27FC236}">
+                <a16:creationId xmlns:a16="http://schemas.microsoft.com/office/drawing/2014/main" id="{BDE36D69-B8B0-C3E8-84ED-BA08459C3658}"/>
+              </a:ext>
+            </a:extLst>
+          </p:cNvPr>
+          <p:cNvSpPr>
+            <a:spLocks noGrp="1"/>
+          </p:cNvSpPr>
+          <p:nvPr>
+            <p:ph idx="1"/>
+          </p:nvPr>
+        </p:nvSpPr>
+        <p:spPr>
+          <a:xfrm>
+            <a:off x="838200" y="1825625"/>
+            <a:ext cx="5717583" cy="4351338"/>
+          </a:xfrm>
+        </p:spPr>
+        <p:txBody>
+          <a:bodyPr/>
+          <a:lstStyle/>
+          <a:p>
+            <a:endParaRPr lang="en-US"/>
+          </a:p>
+        </p:txBody>
+      </p:sp>
+      <p:sp>
+        <p:nvSpPr>
+          <p:cNvPr id="4" name="Slide Number Placeholder 3">
+            <a:extLst>
+              <a:ext uri="{FF2B5EF4-FFF2-40B4-BE49-F238E27FC236}">
+                <a16:creationId xmlns:a16="http://schemas.microsoft.com/office/drawing/2014/main" id="{30E3EB71-C593-925E-73EB-D9B83D7E9927}"/>
+              </a:ext>
+            </a:extLst>
+          </p:cNvPr>
+          <p:cNvSpPr>
+            <a:spLocks noGrp="1"/>
+          </p:cNvSpPr>
+          <p:nvPr>
+            <p:ph type="sldNum" sz="quarter" idx="12"/>
+          </p:nvPr>
+        </p:nvSpPr>
+        <p:spPr/>
+        <p:txBody>
+          <a:bodyPr/>
+          <a:lstStyle/>
+          <a:p>
+            <a:fld id="{E6FE59FF-D9EB-D545-90E6-CE90D1694C9B}" type="slidenum">
+              <a:rPr lang="en-US" smtClean="0"/>
+              <a:pPr/>
+              <a:t>13</a:t>
+            </a:fld>
+            <a:endParaRPr lang="en-US" dirty="0"/>
+          </a:p>
+        </p:txBody>
+      </p:sp>
+      <p:pic>
+        <p:nvPicPr>
+          <p:cNvPr id="6" name="Picture 5">
+            <a:extLst>
+              <a:ext uri="{FF2B5EF4-FFF2-40B4-BE49-F238E27FC236}">
+                <a16:creationId xmlns:a16="http://schemas.microsoft.com/office/drawing/2014/main" id="{FA851C62-2F5D-2AC0-E692-43A654983E0F}"/>
+              </a:ext>
+            </a:extLst>
+          </p:cNvPr>
+          <p:cNvPicPr>
+            <a:picLocks noChangeAspect="1"/>
+          </p:cNvPicPr>
+          <p:nvPr/>
+        </p:nvPicPr>
+        <p:blipFill>
+          <a:blip r:embed="rId2"/>
+          <a:stretch>
+            <a:fillRect/>
+          </a:stretch>
+        </p:blipFill>
+        <p:spPr>
+          <a:xfrm>
+            <a:off x="6687411" y="920750"/>
+            <a:ext cx="5016500" cy="5016500"/>
+          </a:xfrm>
+          <a:prstGeom prst="rect">
+            <a:avLst/>
+          </a:prstGeom>
+        </p:spPr>
+      </p:pic>
+    </p:spTree>
+    <p:extLst>
+      <p:ext uri="{BB962C8B-B14F-4D97-AF65-F5344CB8AC3E}">
+        <p14:creationId xmlns:p14="http://schemas.microsoft.com/office/powerpoint/2010/main" val="447957650"/>
+      </p:ext>
+    </p:extLst>
+  </p:cSld>
+  <p:clrMapOvr>
+    <a:masterClrMapping/>
+  </p:clrMapOvr>
+</p:sld>
+</file>
+
 <file path=ppt/slides/slide2.xml><?xml version="1.0" encoding="utf-8"?>
 <p:sld xmlns:a="http://schemas.openxmlformats.org/drawingml/2006/main" xmlns:r="http://schemas.openxmlformats.org/officeDocument/2006/relationships" xmlns:p="http://schemas.openxmlformats.org/presentationml/2006/main">
   <p:cSld>
@@ -5046,7 +5661,7 @@
           <a:p>
             <a:r>
               <a:rPr lang="en-US" dirty="0"/>
-              <a:t>Datasets used</a:t>
+              <a:t>Datasets</a:t>
             </a:r>
           </a:p>
         </p:txBody>
@@ -5094,7 +5709,7 @@
               <a:rPr lang="en-US" dirty="0">
                 <a:hlinkClick r:id="rId4"/>
               </a:rPr>
-              <a:t>Demand for Rental and Sold Flats</a:t>
+              <a:t>Number of Applications Registered for Resale Flats</a:t>
             </a:r>
             <a:endParaRPr lang="en-US" dirty="0"/>
           </a:p>
@@ -5136,8 +5751,8 @@
         </p:nvSpPr>
         <p:spPr>
           <a:xfrm>
-            <a:off x="9856099" y="6684020"/>
-            <a:ext cx="2335901" cy="133519"/>
+            <a:off x="9856099" y="6642340"/>
+            <a:ext cx="2335901" cy="175199"/>
           </a:xfrm>
           <a:prstGeom prst="rect">
             <a:avLst/>
@@ -5233,7 +5848,7 @@
         <p:spPr/>
         <p:txBody>
           <a:bodyPr>
-            <a:normAutofit fontScale="92500" lnSpcReduction="10000"/>
+            <a:normAutofit fontScale="92500" lnSpcReduction="20000"/>
           </a:bodyPr>
           <a:lstStyle/>
           <a:p>
@@ -5252,6 +5867,13 @@
             <a:pPr lvl="1"/>
             <a:r>
               <a:rPr lang="en-US" dirty="0"/>
+              <a:t>year &lt;class int64&gt;</a:t>
+            </a:r>
+          </a:p>
+          <a:p>
+            <a:pPr lvl="1"/>
+            <a:r>
+              <a:rPr lang="en-US" dirty="0"/>
               <a:t>month &lt;class &lt;U50&gt;</a:t>
             </a:r>
           </a:p>
@@ -5314,7 +5936,7 @@
             </a:r>
             <a:r>
               <a:rPr lang="en-US" dirty="0"/>
-              <a:t> &lt;class &lt;U50&gt;</a:t>
+              <a:t> &lt;class int64&gt;</a:t>
             </a:r>
           </a:p>
           <a:p>
@@ -5349,13 +5971,13 @@
         <p:spPr/>
         <p:txBody>
           <a:bodyPr>
-            <a:normAutofit fontScale="92500" lnSpcReduction="10000"/>
+            <a:normAutofit fontScale="92500" lnSpcReduction="20000"/>
           </a:bodyPr>
           <a:lstStyle/>
           <a:p>
             <a:r>
               <a:rPr lang="en-US" dirty="0"/>
-              <a:t>Data transformations:</a:t>
+              <a:t>Data transformation:</a:t>
             </a:r>
           </a:p>
           <a:p>
@@ -5367,7 +5989,33 @@
           </a:p>
           <a:p>
             <a:pPr lvl="1"/>
-            <a:endParaRPr lang="en-US" dirty="0"/>
+            <a:r>
+              <a:rPr lang="en-US" dirty="0"/>
+              <a:t>The ‘</a:t>
+            </a:r>
+            <a:r>
+              <a:rPr lang="en-US" dirty="0" err="1"/>
+              <a:t>storey_range</a:t>
+            </a:r>
+            <a:r>
+              <a:rPr lang="en-US" dirty="0"/>
+              <a:t>’ column was converted from numbered ranges to categorical levels of ‘low/mid/high’</a:t>
+            </a:r>
+          </a:p>
+          <a:p>
+            <a:pPr lvl="1"/>
+            <a:r>
+              <a:rPr lang="en-US" dirty="0"/>
+              <a:t>The initial ‘month’ column obtained from </a:t>
+            </a:r>
+            <a:r>
+              <a:rPr lang="en-US" dirty="0" err="1"/>
+              <a:t>data.gov.sg</a:t>
+            </a:r>
+            <a:r>
+              <a:rPr lang="en-US" dirty="0"/>
+              <a:t> was split into the ‘year’ and ‘month’ columns</a:t>
+            </a:r>
           </a:p>
         </p:txBody>
       </p:sp>
@@ -5403,10 +6051,10 @@
       </p:sp>
       <p:pic>
         <p:nvPicPr>
-          <p:cNvPr id="7" name="Picture 6">
-            <a:extLst>
-              <a:ext uri="{FF2B5EF4-FFF2-40B4-BE49-F238E27FC236}">
-                <a16:creationId xmlns:a16="http://schemas.microsoft.com/office/drawing/2014/main" id="{A92220CF-86F9-1F94-0724-62720EBB9451}"/>
+          <p:cNvPr id="8" name="Picture 7">
+            <a:extLst>
+              <a:ext uri="{FF2B5EF4-FFF2-40B4-BE49-F238E27FC236}">
+                <a16:creationId xmlns:a16="http://schemas.microsoft.com/office/drawing/2014/main" id="{92618EE4-005C-DC38-B6EF-1238F0B1C86E}"/>
               </a:ext>
             </a:extLst>
           </p:cNvPr>
@@ -5423,8 +6071,8 @@
         </p:blipFill>
         <p:spPr>
           <a:xfrm>
-            <a:off x="7013274" y="112768"/>
-            <a:ext cx="4340525" cy="1605860"/>
+            <a:off x="7047512" y="198507"/>
+            <a:ext cx="4306288" cy="1559649"/>
           </a:xfrm>
           <a:prstGeom prst="rect">
             <a:avLst/>
@@ -5435,6 +6083,2213 @@
     <p:extLst>
       <p:ext uri="{BB962C8B-B14F-4D97-AF65-F5344CB8AC3E}">
         <p14:creationId xmlns:p14="http://schemas.microsoft.com/office/powerpoint/2010/main" val="132333929"/>
+      </p:ext>
+    </p:extLst>
+  </p:cSld>
+  <p:clrMapOvr>
+    <a:masterClrMapping/>
+  </p:clrMapOvr>
+</p:sld>
+</file>
+
+<file path=ppt/slides/slide4.xml><?xml version="1.0" encoding="utf-8"?>
+<p:sld xmlns:a="http://schemas.openxmlformats.org/drawingml/2006/main" xmlns:r="http://schemas.openxmlformats.org/officeDocument/2006/relationships" xmlns:p="http://schemas.openxmlformats.org/presentationml/2006/main">
+  <p:cSld>
+    <p:spTree>
+      <p:nvGrpSpPr>
+        <p:cNvPr id="1" name=""/>
+        <p:cNvGrpSpPr/>
+        <p:nvPr/>
+      </p:nvGrpSpPr>
+      <p:grpSpPr>
+        <a:xfrm>
+          <a:off x="0" y="0"/>
+          <a:ext cx="0" cy="0"/>
+          <a:chOff x="0" y="0"/>
+          <a:chExt cx="0" cy="0"/>
+        </a:xfrm>
+      </p:grpSpPr>
+      <p:sp>
+        <p:nvSpPr>
+          <p:cNvPr id="2" name="Title 1">
+            <a:extLst>
+              <a:ext uri="{FF2B5EF4-FFF2-40B4-BE49-F238E27FC236}">
+                <a16:creationId xmlns:a16="http://schemas.microsoft.com/office/drawing/2014/main" id="{2E354D0D-A000-8EC1-04F5-F8E804FB51F2}"/>
+              </a:ext>
+            </a:extLst>
+          </p:cNvPr>
+          <p:cNvSpPr>
+            <a:spLocks noGrp="1"/>
+          </p:cNvSpPr>
+          <p:nvPr>
+            <p:ph type="title"/>
+          </p:nvPr>
+        </p:nvSpPr>
+        <p:spPr/>
+        <p:txBody>
+          <a:bodyPr/>
+          <a:lstStyle/>
+          <a:p>
+            <a:r>
+              <a:rPr lang="en-US" dirty="0"/>
+              <a:t>HDB Resale Price Index</a:t>
+            </a:r>
+          </a:p>
+        </p:txBody>
+      </p:sp>
+      <p:sp>
+        <p:nvSpPr>
+          <p:cNvPr id="3" name="Content Placeholder 2">
+            <a:extLst>
+              <a:ext uri="{FF2B5EF4-FFF2-40B4-BE49-F238E27FC236}">
+                <a16:creationId xmlns:a16="http://schemas.microsoft.com/office/drawing/2014/main" id="{A4A59543-8315-347F-3172-1277A0D153D3}"/>
+              </a:ext>
+            </a:extLst>
+          </p:cNvPr>
+          <p:cNvSpPr>
+            <a:spLocks noGrp="1"/>
+          </p:cNvSpPr>
+          <p:nvPr>
+            <p:ph sz="half" idx="1"/>
+          </p:nvPr>
+        </p:nvSpPr>
+        <p:spPr/>
+        <p:txBody>
+          <a:bodyPr>
+            <a:normAutofit lnSpcReduction="10000"/>
+          </a:bodyPr>
+          <a:lstStyle/>
+          <a:p>
+            <a:r>
+              <a:rPr lang="en-US" dirty="0"/>
+              <a:t>There are 131 rows and 3 columns in this dataset </a:t>
+            </a:r>
+          </a:p>
+          <a:p>
+            <a:r>
+              <a:rPr lang="en-US" dirty="0"/>
+              <a:t>The names of the columns are: </a:t>
+            </a:r>
+          </a:p>
+          <a:p>
+            <a:pPr lvl="1"/>
+            <a:r>
+              <a:rPr lang="en-US" dirty="0"/>
+              <a:t>quarter &lt;class &lt;U50&gt;</a:t>
+            </a:r>
+          </a:p>
+          <a:p>
+            <a:pPr lvl="1"/>
+            <a:r>
+              <a:rPr lang="en-US" dirty="0"/>
+              <a:t>index &lt;class float64&gt; </a:t>
+            </a:r>
+          </a:p>
+          <a:p>
+            <a:pPr lvl="1"/>
+            <a:r>
+              <a:rPr lang="en-US" dirty="0"/>
+              <a:t>year &lt;class int64&gt;</a:t>
+            </a:r>
+          </a:p>
+          <a:p>
+            <a:r>
+              <a:rPr lang="en-US" dirty="0"/>
+              <a:t>The index calculates the average quarterly resale price while accounting for flat types, towns, and models.</a:t>
+            </a:r>
+          </a:p>
+        </p:txBody>
+      </p:sp>
+      <p:sp>
+        <p:nvSpPr>
+          <p:cNvPr id="4" name="Content Placeholder 3">
+            <a:extLst>
+              <a:ext uri="{FF2B5EF4-FFF2-40B4-BE49-F238E27FC236}">
+                <a16:creationId xmlns:a16="http://schemas.microsoft.com/office/drawing/2014/main" id="{F95BE129-3F42-83F9-A70B-6D25CF7763DD}"/>
+              </a:ext>
+            </a:extLst>
+          </p:cNvPr>
+          <p:cNvSpPr>
+            <a:spLocks noGrp="1"/>
+          </p:cNvSpPr>
+          <p:nvPr>
+            <p:ph sz="half" idx="2"/>
+          </p:nvPr>
+        </p:nvSpPr>
+        <p:spPr/>
+        <p:txBody>
+          <a:bodyPr>
+            <a:normAutofit lnSpcReduction="10000"/>
+          </a:bodyPr>
+          <a:lstStyle/>
+          <a:p>
+            <a:r>
+              <a:rPr lang="en-US" dirty="0"/>
+              <a:t>Data transformation:</a:t>
+            </a:r>
+          </a:p>
+          <a:p>
+            <a:pPr lvl="1"/>
+            <a:r>
+              <a:rPr lang="en-US" dirty="0"/>
+              <a:t>The initial ‘quarter’ column obtained from </a:t>
+            </a:r>
+            <a:r>
+              <a:rPr lang="en-US" dirty="0" err="1"/>
+              <a:t>data.gov.sg</a:t>
+            </a:r>
+            <a:r>
+              <a:rPr lang="en-US" dirty="0"/>
+              <a:t> was split into the ‘quarter’ and ‘year’ columns</a:t>
+            </a:r>
+          </a:p>
+        </p:txBody>
+      </p:sp>
+      <p:sp>
+        <p:nvSpPr>
+          <p:cNvPr id="5" name="Slide Number Placeholder 4">
+            <a:extLst>
+              <a:ext uri="{FF2B5EF4-FFF2-40B4-BE49-F238E27FC236}">
+                <a16:creationId xmlns:a16="http://schemas.microsoft.com/office/drawing/2014/main" id="{C7554287-C8A1-6041-C185-062B58A8CE92}"/>
+              </a:ext>
+            </a:extLst>
+          </p:cNvPr>
+          <p:cNvSpPr>
+            <a:spLocks noGrp="1"/>
+          </p:cNvSpPr>
+          <p:nvPr>
+            <p:ph type="sldNum" sz="quarter" idx="12"/>
+          </p:nvPr>
+        </p:nvSpPr>
+        <p:spPr/>
+        <p:txBody>
+          <a:bodyPr/>
+          <a:lstStyle/>
+          <a:p>
+            <a:fld id="{E6FE59FF-D9EB-D545-90E6-CE90D1694C9B}" type="slidenum">
+              <a:rPr lang="en-US" smtClean="0"/>
+              <a:pPr/>
+              <a:t>4</a:t>
+            </a:fld>
+            <a:endParaRPr lang="en-US" dirty="0"/>
+          </a:p>
+        </p:txBody>
+      </p:sp>
+      <p:pic>
+        <p:nvPicPr>
+          <p:cNvPr id="7" name="Picture 6">
+            <a:extLst>
+              <a:ext uri="{FF2B5EF4-FFF2-40B4-BE49-F238E27FC236}">
+                <a16:creationId xmlns:a16="http://schemas.microsoft.com/office/drawing/2014/main" id="{DF158B3F-3791-CFE0-84DB-6F10D02A9629}"/>
+              </a:ext>
+            </a:extLst>
+          </p:cNvPr>
+          <p:cNvPicPr>
+            <a:picLocks noChangeAspect="1"/>
+          </p:cNvPicPr>
+          <p:nvPr/>
+        </p:nvPicPr>
+        <p:blipFill>
+          <a:blip r:embed="rId2"/>
+          <a:stretch>
+            <a:fillRect/>
+          </a:stretch>
+        </p:blipFill>
+        <p:spPr>
+          <a:xfrm>
+            <a:off x="7163494" y="681037"/>
+            <a:ext cx="4190306" cy="767570"/>
+          </a:xfrm>
+          <a:prstGeom prst="rect">
+            <a:avLst/>
+          </a:prstGeom>
+        </p:spPr>
+      </p:pic>
+    </p:spTree>
+    <p:extLst>
+      <p:ext uri="{BB962C8B-B14F-4D97-AF65-F5344CB8AC3E}">
+        <p14:creationId xmlns:p14="http://schemas.microsoft.com/office/powerpoint/2010/main" val="39956940"/>
+      </p:ext>
+    </p:extLst>
+  </p:cSld>
+  <p:clrMapOvr>
+    <a:masterClrMapping/>
+  </p:clrMapOvr>
+</p:sld>
+</file>
+
+<file path=ppt/slides/slide5.xml><?xml version="1.0" encoding="utf-8"?>
+<p:sld xmlns:a="http://schemas.openxmlformats.org/drawingml/2006/main" xmlns:r="http://schemas.openxmlformats.org/officeDocument/2006/relationships" xmlns:p="http://schemas.openxmlformats.org/presentationml/2006/main">
+  <p:cSld>
+    <p:spTree>
+      <p:nvGrpSpPr>
+        <p:cNvPr id="1" name=""/>
+        <p:cNvGrpSpPr/>
+        <p:nvPr/>
+      </p:nvGrpSpPr>
+      <p:grpSpPr>
+        <a:xfrm>
+          <a:off x="0" y="0"/>
+          <a:ext cx="0" cy="0"/>
+          <a:chOff x="0" y="0"/>
+          <a:chExt cx="0" cy="0"/>
+        </a:xfrm>
+      </p:grpSpPr>
+      <p:sp>
+        <p:nvSpPr>
+          <p:cNvPr id="2" name="Title 1">
+            <a:extLst>
+              <a:ext uri="{FF2B5EF4-FFF2-40B4-BE49-F238E27FC236}">
+                <a16:creationId xmlns:a16="http://schemas.microsoft.com/office/drawing/2014/main" id="{2E354D0D-A000-8EC1-04F5-F8E804FB51F2}"/>
+              </a:ext>
+            </a:extLst>
+          </p:cNvPr>
+          <p:cNvSpPr>
+            <a:spLocks noGrp="1"/>
+          </p:cNvSpPr>
+          <p:nvPr>
+            <p:ph type="title"/>
+          </p:nvPr>
+        </p:nvSpPr>
+        <p:spPr>
+          <a:xfrm>
+            <a:off x="838200" y="365125"/>
+            <a:ext cx="6325294" cy="1325563"/>
+          </a:xfrm>
+        </p:spPr>
+        <p:txBody>
+          <a:bodyPr>
+            <a:noAutofit/>
+          </a:bodyPr>
+          <a:lstStyle/>
+          <a:p>
+            <a:r>
+              <a:rPr lang="en-US" sz="3600" dirty="0"/>
+              <a:t>Number of Applications Registered for Resale Flats </a:t>
+            </a:r>
+          </a:p>
+        </p:txBody>
+      </p:sp>
+      <p:sp>
+        <p:nvSpPr>
+          <p:cNvPr id="3" name="Content Placeholder 2">
+            <a:extLst>
+              <a:ext uri="{FF2B5EF4-FFF2-40B4-BE49-F238E27FC236}">
+                <a16:creationId xmlns:a16="http://schemas.microsoft.com/office/drawing/2014/main" id="{A4A59543-8315-347F-3172-1277A0D153D3}"/>
+              </a:ext>
+            </a:extLst>
+          </p:cNvPr>
+          <p:cNvSpPr>
+            <a:spLocks noGrp="1"/>
+          </p:cNvSpPr>
+          <p:nvPr>
+            <p:ph sz="half" idx="1"/>
+          </p:nvPr>
+        </p:nvSpPr>
+        <p:spPr/>
+        <p:txBody>
+          <a:bodyPr>
+            <a:normAutofit/>
+          </a:bodyPr>
+          <a:lstStyle/>
+          <a:p>
+            <a:r>
+              <a:rPr lang="en-US" dirty="0"/>
+              <a:t>There are 7 rows and 3 columns in this dataset </a:t>
+            </a:r>
+          </a:p>
+          <a:p>
+            <a:r>
+              <a:rPr lang="en-US" dirty="0"/>
+              <a:t>The names of the columns are: </a:t>
+            </a:r>
+          </a:p>
+          <a:p>
+            <a:pPr lvl="1"/>
+            <a:r>
+              <a:rPr lang="en-US" dirty="0"/>
+              <a:t>year &lt;class &lt;int64&gt;</a:t>
+            </a:r>
+          </a:p>
+          <a:p>
+            <a:pPr lvl="1"/>
+            <a:r>
+              <a:rPr lang="en-US" dirty="0"/>
+              <a:t>type &lt;class &lt;U50&gt; </a:t>
+            </a:r>
+          </a:p>
+          <a:p>
+            <a:pPr lvl="1"/>
+            <a:r>
+              <a:rPr lang="en-US" dirty="0" err="1"/>
+              <a:t>applications_registered</a:t>
+            </a:r>
+            <a:r>
+              <a:rPr lang="en-US" dirty="0"/>
+              <a:t> &lt;class int64&gt;</a:t>
+            </a:r>
+          </a:p>
+        </p:txBody>
+      </p:sp>
+      <p:sp>
+        <p:nvSpPr>
+          <p:cNvPr id="4" name="Content Placeholder 3">
+            <a:extLst>
+              <a:ext uri="{FF2B5EF4-FFF2-40B4-BE49-F238E27FC236}">
+                <a16:creationId xmlns:a16="http://schemas.microsoft.com/office/drawing/2014/main" id="{F95BE129-3F42-83F9-A70B-6D25CF7763DD}"/>
+              </a:ext>
+            </a:extLst>
+          </p:cNvPr>
+          <p:cNvSpPr>
+            <a:spLocks noGrp="1"/>
+          </p:cNvSpPr>
+          <p:nvPr>
+            <p:ph sz="half" idx="2"/>
+          </p:nvPr>
+        </p:nvSpPr>
+        <p:spPr/>
+        <p:txBody>
+          <a:bodyPr>
+            <a:normAutofit/>
+          </a:bodyPr>
+          <a:lstStyle/>
+          <a:p>
+            <a:r>
+              <a:rPr lang="en-US" dirty="0"/>
+              <a:t>Data transformation:</a:t>
+            </a:r>
+          </a:p>
+          <a:p>
+            <a:pPr lvl="1"/>
+            <a:r>
+              <a:rPr lang="en-US" dirty="0"/>
+              <a:t>The dataset was filtered for only resale flats and excluded for rental flats</a:t>
+            </a:r>
+          </a:p>
+        </p:txBody>
+      </p:sp>
+      <p:sp>
+        <p:nvSpPr>
+          <p:cNvPr id="5" name="Slide Number Placeholder 4">
+            <a:extLst>
+              <a:ext uri="{FF2B5EF4-FFF2-40B4-BE49-F238E27FC236}">
+                <a16:creationId xmlns:a16="http://schemas.microsoft.com/office/drawing/2014/main" id="{C7554287-C8A1-6041-C185-062B58A8CE92}"/>
+              </a:ext>
+            </a:extLst>
+          </p:cNvPr>
+          <p:cNvSpPr>
+            <a:spLocks noGrp="1"/>
+          </p:cNvSpPr>
+          <p:nvPr>
+            <p:ph type="sldNum" sz="quarter" idx="12"/>
+          </p:nvPr>
+        </p:nvSpPr>
+        <p:spPr/>
+        <p:txBody>
+          <a:bodyPr/>
+          <a:lstStyle/>
+          <a:p>
+            <a:fld id="{E6FE59FF-D9EB-D545-90E6-CE90D1694C9B}" type="slidenum">
+              <a:rPr lang="en-US" smtClean="0"/>
+              <a:pPr/>
+              <a:t>5</a:t>
+            </a:fld>
+            <a:endParaRPr lang="en-US" dirty="0"/>
+          </a:p>
+        </p:txBody>
+      </p:sp>
+      <p:pic>
+        <p:nvPicPr>
+          <p:cNvPr id="6" name="Picture 5">
+            <a:extLst>
+              <a:ext uri="{FF2B5EF4-FFF2-40B4-BE49-F238E27FC236}">
+                <a16:creationId xmlns:a16="http://schemas.microsoft.com/office/drawing/2014/main" id="{3E06CE98-45F4-C59C-7717-14AEDEC1A66E}"/>
+              </a:ext>
+            </a:extLst>
+          </p:cNvPr>
+          <p:cNvPicPr>
+            <a:picLocks noChangeAspect="1"/>
+          </p:cNvPicPr>
+          <p:nvPr/>
+        </p:nvPicPr>
+        <p:blipFill>
+          <a:blip r:embed="rId2"/>
+          <a:stretch>
+            <a:fillRect/>
+          </a:stretch>
+        </p:blipFill>
+        <p:spPr>
+          <a:xfrm>
+            <a:off x="6698788" y="681037"/>
+            <a:ext cx="4655012" cy="543329"/>
+          </a:xfrm>
+          <a:prstGeom prst="rect">
+            <a:avLst/>
+          </a:prstGeom>
+        </p:spPr>
+      </p:pic>
+    </p:spTree>
+    <p:extLst>
+      <p:ext uri="{BB962C8B-B14F-4D97-AF65-F5344CB8AC3E}">
+        <p14:creationId xmlns:p14="http://schemas.microsoft.com/office/powerpoint/2010/main" val="1621911329"/>
+      </p:ext>
+    </p:extLst>
+  </p:cSld>
+  <p:clrMapOvr>
+    <a:masterClrMapping/>
+  </p:clrMapOvr>
+</p:sld>
+</file>
+
+<file path=ppt/slides/slide6.xml><?xml version="1.0" encoding="utf-8"?>
+<p:sld xmlns:a="http://schemas.openxmlformats.org/drawingml/2006/main" xmlns:r="http://schemas.openxmlformats.org/officeDocument/2006/relationships" xmlns:p="http://schemas.openxmlformats.org/presentationml/2006/main">
+  <p:cSld>
+    <p:spTree>
+      <p:nvGrpSpPr>
+        <p:cNvPr id="1" name=""/>
+        <p:cNvGrpSpPr/>
+        <p:nvPr/>
+      </p:nvGrpSpPr>
+      <p:grpSpPr>
+        <a:xfrm>
+          <a:off x="0" y="0"/>
+          <a:ext cx="0" cy="0"/>
+          <a:chOff x="0" y="0"/>
+          <a:chExt cx="0" cy="0"/>
+        </a:xfrm>
+      </p:grpSpPr>
+      <p:sp>
+        <p:nvSpPr>
+          <p:cNvPr id="2" name="Title 1">
+            <a:extLst>
+              <a:ext uri="{FF2B5EF4-FFF2-40B4-BE49-F238E27FC236}">
+                <a16:creationId xmlns:a16="http://schemas.microsoft.com/office/drawing/2014/main" id="{2E354D0D-A000-8EC1-04F5-F8E804FB51F2}"/>
+              </a:ext>
+            </a:extLst>
+          </p:cNvPr>
+          <p:cNvSpPr>
+            <a:spLocks noGrp="1"/>
+          </p:cNvSpPr>
+          <p:nvPr>
+            <p:ph type="title"/>
+          </p:nvPr>
+        </p:nvSpPr>
+        <p:spPr>
+          <a:xfrm>
+            <a:off x="838200" y="365125"/>
+            <a:ext cx="5921188" cy="1325563"/>
+          </a:xfrm>
+        </p:spPr>
+        <p:txBody>
+          <a:bodyPr>
+            <a:noAutofit/>
+          </a:bodyPr>
+          <a:lstStyle/>
+          <a:p>
+            <a:r>
+              <a:rPr lang="en-US" sz="3600" dirty="0"/>
+              <a:t>Completion Status of HDB Residential Developments</a:t>
+            </a:r>
+          </a:p>
+        </p:txBody>
+      </p:sp>
+      <p:sp>
+        <p:nvSpPr>
+          <p:cNvPr id="3" name="Content Placeholder 2">
+            <a:extLst>
+              <a:ext uri="{FF2B5EF4-FFF2-40B4-BE49-F238E27FC236}">
+                <a16:creationId xmlns:a16="http://schemas.microsoft.com/office/drawing/2014/main" id="{A4A59543-8315-347F-3172-1277A0D153D3}"/>
+              </a:ext>
+            </a:extLst>
+          </p:cNvPr>
+          <p:cNvSpPr>
+            <a:spLocks noGrp="1"/>
+          </p:cNvSpPr>
+          <p:nvPr>
+            <p:ph sz="half" idx="1"/>
+          </p:nvPr>
+        </p:nvSpPr>
+        <p:spPr/>
+        <p:txBody>
+          <a:bodyPr>
+            <a:normAutofit lnSpcReduction="10000"/>
+          </a:bodyPr>
+          <a:lstStyle/>
+          <a:p>
+            <a:r>
+              <a:rPr lang="en-US" dirty="0"/>
+              <a:t>There are 75 rows and 4 columns in this dataset </a:t>
+            </a:r>
+          </a:p>
+          <a:p>
+            <a:r>
+              <a:rPr lang="en-US" dirty="0"/>
+              <a:t>The names of the columns are: </a:t>
+            </a:r>
+          </a:p>
+          <a:p>
+            <a:pPr lvl="1"/>
+            <a:r>
+              <a:rPr lang="en-US" dirty="0"/>
+              <a:t>year &lt;class int64&gt;</a:t>
+            </a:r>
+          </a:p>
+          <a:p>
+            <a:pPr lvl="1"/>
+            <a:r>
+              <a:rPr lang="en-US" dirty="0"/>
+              <a:t>type &lt;class &lt;U50&gt; </a:t>
+            </a:r>
+          </a:p>
+          <a:p>
+            <a:pPr lvl="1"/>
+            <a:r>
+              <a:rPr lang="en-US" dirty="0"/>
+              <a:t>status &lt;class &lt;U50&gt; </a:t>
+            </a:r>
+          </a:p>
+          <a:p>
+            <a:pPr lvl="1"/>
+            <a:r>
+              <a:rPr lang="en-US" dirty="0" err="1"/>
+              <a:t>no_of_units</a:t>
+            </a:r>
+            <a:r>
+              <a:rPr lang="en-US" dirty="0"/>
+              <a:t> &lt;class int64&gt;</a:t>
+            </a:r>
+          </a:p>
+          <a:p>
+            <a:r>
+              <a:rPr lang="en-US" dirty="0"/>
+              <a:t>This dataset only includes new flats by HDB (incl. BTO, DBSS)</a:t>
+            </a:r>
+          </a:p>
+        </p:txBody>
+      </p:sp>
+      <p:sp>
+        <p:nvSpPr>
+          <p:cNvPr id="4" name="Content Placeholder 3">
+            <a:extLst>
+              <a:ext uri="{FF2B5EF4-FFF2-40B4-BE49-F238E27FC236}">
+                <a16:creationId xmlns:a16="http://schemas.microsoft.com/office/drawing/2014/main" id="{F95BE129-3F42-83F9-A70B-6D25CF7763DD}"/>
+              </a:ext>
+            </a:extLst>
+          </p:cNvPr>
+          <p:cNvSpPr>
+            <a:spLocks noGrp="1"/>
+          </p:cNvSpPr>
+          <p:nvPr>
+            <p:ph sz="half" idx="2"/>
+          </p:nvPr>
+        </p:nvSpPr>
+        <p:spPr/>
+        <p:txBody>
+          <a:bodyPr>
+            <a:normAutofit lnSpcReduction="10000"/>
+          </a:bodyPr>
+          <a:lstStyle/>
+          <a:p>
+            <a:r>
+              <a:rPr lang="en-US" dirty="0"/>
+              <a:t>Data transformation:</a:t>
+            </a:r>
+          </a:p>
+          <a:p>
+            <a:pPr lvl="1"/>
+            <a:r>
+              <a:rPr lang="en-US" dirty="0"/>
+              <a:t>The ‘</a:t>
+            </a:r>
+            <a:r>
+              <a:rPr lang="en-US" dirty="0" err="1"/>
+              <a:t>no_of_units</a:t>
+            </a:r>
+            <a:r>
+              <a:rPr lang="en-US" dirty="0"/>
+              <a:t>’ column had missing values indicated by ‘</a:t>
+            </a:r>
+            <a:r>
+              <a:rPr lang="en-US" dirty="0" err="1"/>
+              <a:t>na</a:t>
+            </a:r>
+            <a:r>
+              <a:rPr lang="en-US" dirty="0"/>
+              <a:t>’, which were filled with 0 values for ease of analysis</a:t>
+            </a:r>
+          </a:p>
+          <a:p>
+            <a:pPr lvl="1"/>
+            <a:endParaRPr lang="en-US" dirty="0"/>
+          </a:p>
+        </p:txBody>
+      </p:sp>
+      <p:sp>
+        <p:nvSpPr>
+          <p:cNvPr id="5" name="Slide Number Placeholder 4">
+            <a:extLst>
+              <a:ext uri="{FF2B5EF4-FFF2-40B4-BE49-F238E27FC236}">
+                <a16:creationId xmlns:a16="http://schemas.microsoft.com/office/drawing/2014/main" id="{C7554287-C8A1-6041-C185-062B58A8CE92}"/>
+              </a:ext>
+            </a:extLst>
+          </p:cNvPr>
+          <p:cNvSpPr>
+            <a:spLocks noGrp="1"/>
+          </p:cNvSpPr>
+          <p:nvPr>
+            <p:ph type="sldNum" sz="quarter" idx="12"/>
+          </p:nvPr>
+        </p:nvSpPr>
+        <p:spPr/>
+        <p:txBody>
+          <a:bodyPr/>
+          <a:lstStyle/>
+          <a:p>
+            <a:fld id="{E6FE59FF-D9EB-D545-90E6-CE90D1694C9B}" type="slidenum">
+              <a:rPr lang="en-US" smtClean="0"/>
+              <a:pPr/>
+              <a:t>6</a:t>
+            </a:fld>
+            <a:endParaRPr lang="en-US" dirty="0"/>
+          </a:p>
+        </p:txBody>
+      </p:sp>
+      <p:pic>
+        <p:nvPicPr>
+          <p:cNvPr id="6" name="Picture 5">
+            <a:extLst>
+              <a:ext uri="{FF2B5EF4-FFF2-40B4-BE49-F238E27FC236}">
+                <a16:creationId xmlns:a16="http://schemas.microsoft.com/office/drawing/2014/main" id="{52DB7671-3250-D1E5-A884-785F52328924}"/>
+              </a:ext>
+            </a:extLst>
+          </p:cNvPr>
+          <p:cNvPicPr>
+            <a:picLocks noChangeAspect="1"/>
+          </p:cNvPicPr>
+          <p:nvPr/>
+        </p:nvPicPr>
+        <p:blipFill>
+          <a:blip r:embed="rId2"/>
+          <a:stretch>
+            <a:fillRect/>
+          </a:stretch>
+        </p:blipFill>
+        <p:spPr>
+          <a:xfrm>
+            <a:off x="6759388" y="365125"/>
+            <a:ext cx="4587420" cy="1325563"/>
+          </a:xfrm>
+          <a:prstGeom prst="rect">
+            <a:avLst/>
+          </a:prstGeom>
+        </p:spPr>
+      </p:pic>
+    </p:spTree>
+    <p:extLst>
+      <p:ext uri="{BB962C8B-B14F-4D97-AF65-F5344CB8AC3E}">
+        <p14:creationId xmlns:p14="http://schemas.microsoft.com/office/powerpoint/2010/main" val="3158479011"/>
+      </p:ext>
+    </p:extLst>
+  </p:cSld>
+  <p:clrMapOvr>
+    <a:masterClrMapping/>
+  </p:clrMapOvr>
+</p:sld>
+</file>
+
+<file path=ppt/slides/slide7.xml><?xml version="1.0" encoding="utf-8"?>
+<p:sld xmlns:a="http://schemas.openxmlformats.org/drawingml/2006/main" xmlns:r="http://schemas.openxmlformats.org/officeDocument/2006/relationships" xmlns:p="http://schemas.openxmlformats.org/presentationml/2006/main">
+  <p:cSld>
+    <p:spTree>
+      <p:nvGrpSpPr>
+        <p:cNvPr id="1" name=""/>
+        <p:cNvGrpSpPr/>
+        <p:nvPr/>
+      </p:nvGrpSpPr>
+      <p:grpSpPr>
+        <a:xfrm>
+          <a:off x="0" y="0"/>
+          <a:ext cx="0" cy="0"/>
+          <a:chOff x="0" y="0"/>
+          <a:chExt cx="0" cy="0"/>
+        </a:xfrm>
+      </p:grpSpPr>
+      <p:sp>
+        <p:nvSpPr>
+          <p:cNvPr id="2" name="Title 1">
+            <a:extLst>
+              <a:ext uri="{FF2B5EF4-FFF2-40B4-BE49-F238E27FC236}">
+                <a16:creationId xmlns:a16="http://schemas.microsoft.com/office/drawing/2014/main" id="{2E354D0D-A000-8EC1-04F5-F8E804FB51F2}"/>
+              </a:ext>
+            </a:extLst>
+          </p:cNvPr>
+          <p:cNvSpPr>
+            <a:spLocks noGrp="1"/>
+          </p:cNvSpPr>
+          <p:nvPr>
+            <p:ph type="title"/>
+          </p:nvPr>
+        </p:nvSpPr>
+        <p:spPr/>
+        <p:txBody>
+          <a:bodyPr/>
+          <a:lstStyle/>
+          <a:p>
+            <a:r>
+              <a:rPr lang="en-US" dirty="0"/>
+              <a:t>Bookings for New Flats</a:t>
+            </a:r>
+          </a:p>
+        </p:txBody>
+      </p:sp>
+      <p:sp>
+        <p:nvSpPr>
+          <p:cNvPr id="3" name="Content Placeholder 2">
+            <a:extLst>
+              <a:ext uri="{FF2B5EF4-FFF2-40B4-BE49-F238E27FC236}">
+                <a16:creationId xmlns:a16="http://schemas.microsoft.com/office/drawing/2014/main" id="{A4A59543-8315-347F-3172-1277A0D153D3}"/>
+              </a:ext>
+            </a:extLst>
+          </p:cNvPr>
+          <p:cNvSpPr>
+            <a:spLocks noGrp="1"/>
+          </p:cNvSpPr>
+          <p:nvPr>
+            <p:ph sz="half" idx="1"/>
+          </p:nvPr>
+        </p:nvSpPr>
+        <p:spPr>
+          <a:xfrm>
+            <a:off x="838199" y="1825625"/>
+            <a:ext cx="10185849" cy="4351338"/>
+          </a:xfrm>
+        </p:spPr>
+        <p:txBody>
+          <a:bodyPr>
+            <a:normAutofit/>
+          </a:bodyPr>
+          <a:lstStyle/>
+          <a:p>
+            <a:r>
+              <a:rPr lang="en-US" dirty="0"/>
+              <a:t>There are 11 rows and 2 columns in this dataset </a:t>
+            </a:r>
+          </a:p>
+          <a:p>
+            <a:r>
+              <a:rPr lang="en-US" dirty="0"/>
+              <a:t>The names of the columns are: </a:t>
+            </a:r>
+          </a:p>
+          <a:p>
+            <a:pPr lvl="1"/>
+            <a:r>
+              <a:rPr lang="en-US" dirty="0"/>
+              <a:t>year &lt;class &lt;U50&gt;</a:t>
+            </a:r>
+          </a:p>
+          <a:p>
+            <a:pPr lvl="1"/>
+            <a:r>
+              <a:rPr lang="en-US" dirty="0" err="1"/>
+              <a:t>no_of_units</a:t>
+            </a:r>
+            <a:r>
+              <a:rPr lang="en-US" dirty="0"/>
+              <a:t> &lt;class int64&gt;</a:t>
+            </a:r>
+          </a:p>
+          <a:p>
+            <a:r>
+              <a:rPr lang="en-US" dirty="0"/>
+              <a:t>This dataset only includes applications for new flats by HDB (incl. BTO, DBSS)</a:t>
+            </a:r>
+          </a:p>
+        </p:txBody>
+      </p:sp>
+      <p:sp>
+        <p:nvSpPr>
+          <p:cNvPr id="5" name="Slide Number Placeholder 4">
+            <a:extLst>
+              <a:ext uri="{FF2B5EF4-FFF2-40B4-BE49-F238E27FC236}">
+                <a16:creationId xmlns:a16="http://schemas.microsoft.com/office/drawing/2014/main" id="{C7554287-C8A1-6041-C185-062B58A8CE92}"/>
+              </a:ext>
+            </a:extLst>
+          </p:cNvPr>
+          <p:cNvSpPr>
+            <a:spLocks noGrp="1"/>
+          </p:cNvSpPr>
+          <p:nvPr>
+            <p:ph type="sldNum" sz="quarter" idx="12"/>
+          </p:nvPr>
+        </p:nvSpPr>
+        <p:spPr/>
+        <p:txBody>
+          <a:bodyPr/>
+          <a:lstStyle/>
+          <a:p>
+            <a:fld id="{E6FE59FF-D9EB-D545-90E6-CE90D1694C9B}" type="slidenum">
+              <a:rPr lang="en-US" smtClean="0"/>
+              <a:pPr/>
+              <a:t>7</a:t>
+            </a:fld>
+            <a:endParaRPr lang="en-US" dirty="0"/>
+          </a:p>
+        </p:txBody>
+      </p:sp>
+      <p:pic>
+        <p:nvPicPr>
+          <p:cNvPr id="8" name="Picture 7">
+            <a:extLst>
+              <a:ext uri="{FF2B5EF4-FFF2-40B4-BE49-F238E27FC236}">
+                <a16:creationId xmlns:a16="http://schemas.microsoft.com/office/drawing/2014/main" id="{6B046046-4020-583D-A73A-5F4D3C4BA66B}"/>
+              </a:ext>
+            </a:extLst>
+          </p:cNvPr>
+          <p:cNvPicPr>
+            <a:picLocks noChangeAspect="1"/>
+          </p:cNvPicPr>
+          <p:nvPr/>
+        </p:nvPicPr>
+        <p:blipFill>
+          <a:blip r:embed="rId2"/>
+          <a:stretch>
+            <a:fillRect/>
+          </a:stretch>
+        </p:blipFill>
+        <p:spPr>
+          <a:xfrm>
+            <a:off x="7036249" y="405606"/>
+            <a:ext cx="3987800" cy="1244600"/>
+          </a:xfrm>
+          <a:prstGeom prst="rect">
+            <a:avLst/>
+          </a:prstGeom>
+        </p:spPr>
+      </p:pic>
+    </p:spTree>
+    <p:extLst>
+      <p:ext uri="{BB962C8B-B14F-4D97-AF65-F5344CB8AC3E}">
+        <p14:creationId xmlns:p14="http://schemas.microsoft.com/office/powerpoint/2010/main" val="3020573305"/>
+      </p:ext>
+    </p:extLst>
+  </p:cSld>
+  <p:clrMapOvr>
+    <a:masterClrMapping/>
+  </p:clrMapOvr>
+</p:sld>
+</file>
+
+<file path=ppt/slides/slide8.xml><?xml version="1.0" encoding="utf-8"?>
+<p:sld xmlns:a="http://schemas.openxmlformats.org/drawingml/2006/main" xmlns:r="http://schemas.openxmlformats.org/officeDocument/2006/relationships" xmlns:p="http://schemas.openxmlformats.org/presentationml/2006/main">
+  <p:cSld>
+    <p:bg>
+      <p:bgPr>
+        <a:solidFill>
+          <a:schemeClr val="bg1"/>
+        </a:solidFill>
+        <a:effectLst/>
+      </p:bgPr>
+    </p:bg>
+    <p:spTree>
+      <p:nvGrpSpPr>
+        <p:cNvPr id="1" name=""/>
+        <p:cNvGrpSpPr/>
+        <p:nvPr/>
+      </p:nvGrpSpPr>
+      <p:grpSpPr>
+        <a:xfrm>
+          <a:off x="0" y="0"/>
+          <a:ext cx="0" cy="0"/>
+          <a:chOff x="0" y="0"/>
+          <a:chExt cx="0" cy="0"/>
+        </a:xfrm>
+      </p:grpSpPr>
+      <p:sp useBgFill="1">
+        <p:nvSpPr>
+          <p:cNvPr id="10" name="Rectangle 9">
+            <a:extLst>
+              <a:ext uri="{FF2B5EF4-FFF2-40B4-BE49-F238E27FC236}">
+                <a16:creationId xmlns:a16="http://schemas.microsoft.com/office/drawing/2014/main" id="{2B97F24A-32CE-4C1C-A50D-3016B394DCFB}"/>
+              </a:ext>
+              <a:ext uri="{C183D7F6-B498-43B3-948B-1728B52AA6E4}">
+                <adec:decorative xmlns:adec="http://schemas.microsoft.com/office/drawing/2017/decorative" val="1"/>
+              </a:ext>
+            </a:extLst>
+          </p:cNvPr>
+          <p:cNvSpPr>
+            <a:spLocks noGrp="1" noRot="1" noChangeAspect="1" noMove="1" noResize="1" noEditPoints="1" noAdjustHandles="1" noChangeArrowheads="1" noChangeShapeType="1" noTextEdit="1"/>
+          </p:cNvSpPr>
+          <p:nvPr>
+            <p:extLst>
+              <p:ext uri="{386F3935-93C4-4BCD-93E2-E3B085C9AB24}">
+                <p16:designElem xmlns:p16="http://schemas.microsoft.com/office/powerpoint/2015/main" val="1"/>
+              </p:ext>
+            </p:extLst>
+          </p:nvPr>
+        </p:nvSpPr>
+        <p:spPr>
+          <a:xfrm>
+            <a:off x="0" y="0"/>
+            <a:ext cx="12192000" cy="6858000"/>
+          </a:xfrm>
+          <a:prstGeom prst="rect">
+            <a:avLst/>
+          </a:prstGeom>
+          <a:ln>
+            <a:noFill/>
+          </a:ln>
+        </p:spPr>
+        <p:style>
+          <a:lnRef idx="2">
+            <a:schemeClr val="accent1">
+              <a:shade val="50000"/>
+            </a:schemeClr>
+          </a:lnRef>
+          <a:fillRef idx="1">
+            <a:schemeClr val="accent1"/>
+          </a:fillRef>
+          <a:effectRef idx="0">
+            <a:schemeClr val="accent1"/>
+          </a:effectRef>
+          <a:fontRef idx="minor">
+            <a:schemeClr val="lt1"/>
+          </a:fontRef>
+        </p:style>
+        <p:txBody>
+          <a:bodyPr rtlCol="0" anchor="ctr"/>
+          <a:lstStyle/>
+          <a:p>
+            <a:pPr algn="ctr"/>
+            <a:endParaRPr lang="en-US"/>
+          </a:p>
+        </p:txBody>
+      </p:sp>
+      <p:sp>
+        <p:nvSpPr>
+          <p:cNvPr id="2" name="Title 1">
+            <a:extLst>
+              <a:ext uri="{FF2B5EF4-FFF2-40B4-BE49-F238E27FC236}">
+                <a16:creationId xmlns:a16="http://schemas.microsoft.com/office/drawing/2014/main" id="{E786EFF3-C0AF-4F38-10AC-45840E943700}"/>
+              </a:ext>
+            </a:extLst>
+          </p:cNvPr>
+          <p:cNvSpPr>
+            <a:spLocks noGrp="1"/>
+          </p:cNvSpPr>
+          <p:nvPr>
+            <p:ph type="title"/>
+          </p:nvPr>
+        </p:nvSpPr>
+        <p:spPr>
+          <a:xfrm>
+            <a:off x="630936" y="639520"/>
+            <a:ext cx="3429000" cy="1719072"/>
+          </a:xfrm>
+        </p:spPr>
+        <p:txBody>
+          <a:bodyPr anchor="b">
+            <a:noAutofit/>
+          </a:bodyPr>
+          <a:lstStyle/>
+          <a:p>
+            <a:r>
+              <a:rPr lang="en-US" dirty="0"/>
+              <a:t>HDB Resale Flat Prices</a:t>
+            </a:r>
+          </a:p>
+        </p:txBody>
+      </p:sp>
+      <p:sp>
+        <p:nvSpPr>
+          <p:cNvPr id="12" name="sketch line">
+            <a:extLst>
+              <a:ext uri="{FF2B5EF4-FFF2-40B4-BE49-F238E27FC236}">
+                <a16:creationId xmlns:a16="http://schemas.microsoft.com/office/drawing/2014/main" id="{CD8B4F24-440B-49E9-B85D-733523DC064B}"/>
+              </a:ext>
+              <a:ext uri="{C183D7F6-B498-43B3-948B-1728B52AA6E4}">
+                <adec:decorative xmlns:adec="http://schemas.microsoft.com/office/drawing/2017/decorative" val="1"/>
+              </a:ext>
+            </a:extLst>
+          </p:cNvPr>
+          <p:cNvSpPr>
+            <a:spLocks noGrp="1" noRot="1" noChangeAspect="1" noMove="1" noResize="1" noEditPoints="1" noAdjustHandles="1" noChangeArrowheads="1" noChangeShapeType="1" noTextEdit="1"/>
+          </p:cNvSpPr>
+          <p:nvPr>
+            <p:extLst>
+              <p:ext uri="{386F3935-93C4-4BCD-93E2-E3B085C9AB24}">
+                <p16:designElem xmlns:p16="http://schemas.microsoft.com/office/powerpoint/2015/main" val="1"/>
+              </p:ext>
+            </p:extLst>
+          </p:nvPr>
+        </p:nvSpPr>
+        <p:spPr>
+          <a:xfrm>
+            <a:off x="643278" y="2573756"/>
+            <a:ext cx="3255095" cy="18288"/>
+          </a:xfrm>
+          <a:custGeom>
+            <a:avLst/>
+            <a:gdLst>
+              <a:gd name="connsiteX0" fmla="*/ 0 w 3255095"/>
+              <a:gd name="connsiteY0" fmla="*/ 0 h 18288"/>
+              <a:gd name="connsiteX1" fmla="*/ 618468 w 3255095"/>
+              <a:gd name="connsiteY1" fmla="*/ 0 h 18288"/>
+              <a:gd name="connsiteX2" fmla="*/ 1269487 w 3255095"/>
+              <a:gd name="connsiteY2" fmla="*/ 0 h 18288"/>
+              <a:gd name="connsiteX3" fmla="*/ 1953057 w 3255095"/>
+              <a:gd name="connsiteY3" fmla="*/ 0 h 18288"/>
+              <a:gd name="connsiteX4" fmla="*/ 2636627 w 3255095"/>
+              <a:gd name="connsiteY4" fmla="*/ 0 h 18288"/>
+              <a:gd name="connsiteX5" fmla="*/ 3255095 w 3255095"/>
+              <a:gd name="connsiteY5" fmla="*/ 0 h 18288"/>
+              <a:gd name="connsiteX6" fmla="*/ 3255095 w 3255095"/>
+              <a:gd name="connsiteY6" fmla="*/ 18288 h 18288"/>
+              <a:gd name="connsiteX7" fmla="*/ 2538974 w 3255095"/>
+              <a:gd name="connsiteY7" fmla="*/ 18288 h 18288"/>
+              <a:gd name="connsiteX8" fmla="*/ 1822853 w 3255095"/>
+              <a:gd name="connsiteY8" fmla="*/ 18288 h 18288"/>
+              <a:gd name="connsiteX9" fmla="*/ 1171834 w 3255095"/>
+              <a:gd name="connsiteY9" fmla="*/ 18288 h 18288"/>
+              <a:gd name="connsiteX10" fmla="*/ 0 w 3255095"/>
+              <a:gd name="connsiteY10" fmla="*/ 18288 h 18288"/>
+              <a:gd name="connsiteX11" fmla="*/ 0 w 3255095"/>
+              <a:gd name="connsiteY11" fmla="*/ 0 h 18288"/>
+            </a:gdLst>
+            <a:ahLst/>
+            <a:cxnLst>
+              <a:cxn ang="0">
+                <a:pos x="connsiteX0" y="connsiteY0"/>
+              </a:cxn>
+              <a:cxn ang="0">
+                <a:pos x="connsiteX1" y="connsiteY1"/>
+              </a:cxn>
+              <a:cxn ang="0">
+                <a:pos x="connsiteX2" y="connsiteY2"/>
+              </a:cxn>
+              <a:cxn ang="0">
+                <a:pos x="connsiteX3" y="connsiteY3"/>
+              </a:cxn>
+              <a:cxn ang="0">
+                <a:pos x="connsiteX4" y="connsiteY4"/>
+              </a:cxn>
+              <a:cxn ang="0">
+                <a:pos x="connsiteX5" y="connsiteY5"/>
+              </a:cxn>
+              <a:cxn ang="0">
+                <a:pos x="connsiteX6" y="connsiteY6"/>
+              </a:cxn>
+              <a:cxn ang="0">
+                <a:pos x="connsiteX7" y="connsiteY7"/>
+              </a:cxn>
+              <a:cxn ang="0">
+                <a:pos x="connsiteX8" y="connsiteY8"/>
+              </a:cxn>
+              <a:cxn ang="0">
+                <a:pos x="connsiteX9" y="connsiteY9"/>
+              </a:cxn>
+              <a:cxn ang="0">
+                <a:pos x="connsiteX10" y="connsiteY10"/>
+              </a:cxn>
+              <a:cxn ang="0">
+                <a:pos x="connsiteX11" y="connsiteY11"/>
+              </a:cxn>
+            </a:cxnLst>
+            <a:rect l="l" t="t" r="r" b="b"/>
+            <a:pathLst>
+              <a:path w="3255095" h="18288" fill="none" extrusionOk="0">
+                <a:moveTo>
+                  <a:pt x="0" y="0"/>
+                </a:moveTo>
+                <a:cubicBezTo>
+                  <a:pt x="240201" y="-22123"/>
+                  <a:pt x="462021" y="-19623"/>
+                  <a:pt x="618468" y="0"/>
+                </a:cubicBezTo>
+                <a:cubicBezTo>
+                  <a:pt x="774915" y="19623"/>
+                  <a:pt x="974734" y="2035"/>
+                  <a:pt x="1269487" y="0"/>
+                </a:cubicBezTo>
+                <a:cubicBezTo>
+                  <a:pt x="1564240" y="-2035"/>
+                  <a:pt x="1733579" y="10639"/>
+                  <a:pt x="1953057" y="0"/>
+                </a:cubicBezTo>
+                <a:cubicBezTo>
+                  <a:pt x="2172535" y="-10639"/>
+                  <a:pt x="2453962" y="14018"/>
+                  <a:pt x="2636627" y="0"/>
+                </a:cubicBezTo>
+                <a:cubicBezTo>
+                  <a:pt x="2819292" y="-14018"/>
+                  <a:pt x="3121375" y="5399"/>
+                  <a:pt x="3255095" y="0"/>
+                </a:cubicBezTo>
+                <a:cubicBezTo>
+                  <a:pt x="3254386" y="8157"/>
+                  <a:pt x="3254682" y="12125"/>
+                  <a:pt x="3255095" y="18288"/>
+                </a:cubicBezTo>
+                <a:cubicBezTo>
+                  <a:pt x="3088545" y="23203"/>
+                  <a:pt x="2687475" y="7419"/>
+                  <a:pt x="2538974" y="18288"/>
+                </a:cubicBezTo>
+                <a:cubicBezTo>
+                  <a:pt x="2390473" y="29157"/>
+                  <a:pt x="2137381" y="-8959"/>
+                  <a:pt x="1822853" y="18288"/>
+                </a:cubicBezTo>
+                <a:cubicBezTo>
+                  <a:pt x="1508325" y="45535"/>
+                  <a:pt x="1466437" y="20385"/>
+                  <a:pt x="1171834" y="18288"/>
+                </a:cubicBezTo>
+                <a:cubicBezTo>
+                  <a:pt x="877231" y="16191"/>
+                  <a:pt x="561097" y="37643"/>
+                  <a:pt x="0" y="18288"/>
+                </a:cubicBezTo>
+                <a:cubicBezTo>
+                  <a:pt x="-46" y="12483"/>
+                  <a:pt x="-203" y="6491"/>
+                  <a:pt x="0" y="0"/>
+                </a:cubicBezTo>
+                <a:close/>
+              </a:path>
+              <a:path w="3255095" h="18288" stroke="0" extrusionOk="0">
+                <a:moveTo>
+                  <a:pt x="0" y="0"/>
+                </a:moveTo>
+                <a:cubicBezTo>
+                  <a:pt x="291965" y="19429"/>
+                  <a:pt x="363155" y="8568"/>
+                  <a:pt x="618468" y="0"/>
+                </a:cubicBezTo>
+                <a:cubicBezTo>
+                  <a:pt x="873781" y="-8568"/>
+                  <a:pt x="904459" y="-19505"/>
+                  <a:pt x="1171834" y="0"/>
+                </a:cubicBezTo>
+                <a:cubicBezTo>
+                  <a:pt x="1439209" y="19505"/>
+                  <a:pt x="1744369" y="9790"/>
+                  <a:pt x="1887955" y="0"/>
+                </a:cubicBezTo>
+                <a:cubicBezTo>
+                  <a:pt x="2031541" y="-9790"/>
+                  <a:pt x="2346378" y="21240"/>
+                  <a:pt x="2506423" y="0"/>
+                </a:cubicBezTo>
+                <a:cubicBezTo>
+                  <a:pt x="2666468" y="-21240"/>
+                  <a:pt x="2990257" y="30414"/>
+                  <a:pt x="3255095" y="0"/>
+                </a:cubicBezTo>
+                <a:cubicBezTo>
+                  <a:pt x="3254831" y="4493"/>
+                  <a:pt x="3255479" y="9472"/>
+                  <a:pt x="3255095" y="18288"/>
+                </a:cubicBezTo>
+                <a:cubicBezTo>
+                  <a:pt x="3120743" y="16690"/>
+                  <a:pt x="2759628" y="42462"/>
+                  <a:pt x="2604076" y="18288"/>
+                </a:cubicBezTo>
+                <a:cubicBezTo>
+                  <a:pt x="2448524" y="-5886"/>
+                  <a:pt x="2184336" y="19599"/>
+                  <a:pt x="1887955" y="18288"/>
+                </a:cubicBezTo>
+                <a:cubicBezTo>
+                  <a:pt x="1591574" y="16977"/>
+                  <a:pt x="1548845" y="6870"/>
+                  <a:pt x="1334589" y="18288"/>
+                </a:cubicBezTo>
+                <a:cubicBezTo>
+                  <a:pt x="1120333" y="29706"/>
+                  <a:pt x="996014" y="9662"/>
+                  <a:pt x="683570" y="18288"/>
+                </a:cubicBezTo>
+                <a:cubicBezTo>
+                  <a:pt x="371126" y="26914"/>
+                  <a:pt x="198687" y="16167"/>
+                  <a:pt x="0" y="18288"/>
+                </a:cubicBezTo>
+                <a:cubicBezTo>
+                  <a:pt x="843" y="9577"/>
+                  <a:pt x="371" y="6900"/>
+                  <a:pt x="0" y="0"/>
+                </a:cubicBezTo>
+                <a:close/>
+              </a:path>
+            </a:pathLst>
+          </a:custGeom>
+          <a:solidFill>
+            <a:schemeClr val="accent2"/>
+          </a:solidFill>
+          <a:ln w="38100" cap="rnd">
+            <a:solidFill>
+              <a:schemeClr val="accent2"/>
+            </a:solidFill>
+            <a:round/>
+            <a:extLst>
+              <a:ext uri="{C807C97D-BFC1-408E-A445-0C87EB9F89A2}">
+                <ask:lineSketchStyleProps xmlns:ask="http://schemas.microsoft.com/office/drawing/2018/sketchyshapes" sd="1219033472">
+                  <a:prstGeom prst="rect">
+                    <a:avLst/>
+                  </a:prstGeom>
+                  <ask:type>
+                    <ask:lineSketchFreehand/>
+                  </ask:type>
+                </ask:lineSketchStyleProps>
+              </a:ext>
+            </a:extLst>
+          </a:ln>
+        </p:spPr>
+        <p:style>
+          <a:lnRef idx="2">
+            <a:schemeClr val="accent1">
+              <a:shade val="50000"/>
+            </a:schemeClr>
+          </a:lnRef>
+          <a:fillRef idx="1">
+            <a:schemeClr val="accent1"/>
+          </a:fillRef>
+          <a:effectRef idx="0">
+            <a:schemeClr val="accent1"/>
+          </a:effectRef>
+          <a:fontRef idx="minor">
+            <a:schemeClr val="lt1"/>
+          </a:fontRef>
+        </p:style>
+        <p:txBody>
+          <a:bodyPr rtlCol="0" anchor="ctr"/>
+          <a:lstStyle/>
+          <a:p>
+            <a:pPr algn="ctr"/>
+            <a:endParaRPr lang="en-US"/>
+          </a:p>
+        </p:txBody>
+      </p:sp>
+      <p:sp>
+        <p:nvSpPr>
+          <p:cNvPr id="3" name="Content Placeholder 2">
+            <a:extLst>
+              <a:ext uri="{FF2B5EF4-FFF2-40B4-BE49-F238E27FC236}">
+                <a16:creationId xmlns:a16="http://schemas.microsoft.com/office/drawing/2014/main" id="{748D97A4-F501-7092-6120-024C33323899}"/>
+              </a:ext>
+            </a:extLst>
+          </p:cNvPr>
+          <p:cNvSpPr>
+            <a:spLocks noGrp="1"/>
+          </p:cNvSpPr>
+          <p:nvPr>
+            <p:ph idx="1"/>
+          </p:nvPr>
+        </p:nvSpPr>
+        <p:spPr>
+          <a:xfrm>
+            <a:off x="630936" y="2807208"/>
+            <a:ext cx="3429000" cy="3410712"/>
+          </a:xfrm>
+        </p:spPr>
+        <p:txBody>
+          <a:bodyPr anchor="t">
+            <a:normAutofit fontScale="92500" lnSpcReduction="20000"/>
+          </a:bodyPr>
+          <a:lstStyle/>
+          <a:p>
+            <a:r>
+              <a:rPr lang="en-US" sz="2200" dirty="0"/>
+              <a:t>As expected, the larger flat types see higher median prices than those of smaller types</a:t>
+            </a:r>
+          </a:p>
+          <a:p>
+            <a:r>
+              <a:rPr lang="en-US" sz="2200" dirty="0"/>
+              <a:t>Most flat types (except 1-room and Multi-Generation) are right-skewed with many outliers in the higher range of prices</a:t>
+            </a:r>
+          </a:p>
+          <a:p>
+            <a:r>
+              <a:rPr lang="en-US" sz="2200" dirty="0"/>
+              <a:t>The reason for skewness could be due to recent sales of resale flats hitting the price point of S$1m</a:t>
+            </a:r>
+          </a:p>
+        </p:txBody>
+      </p:sp>
+      <p:pic>
+        <p:nvPicPr>
+          <p:cNvPr id="5" name="Picture 4" descr="Chart, waterfall chart&#10;&#10;Description automatically generated">
+            <a:extLst>
+              <a:ext uri="{FF2B5EF4-FFF2-40B4-BE49-F238E27FC236}">
+                <a16:creationId xmlns:a16="http://schemas.microsoft.com/office/drawing/2014/main" id="{A1E48EF9-7B30-2298-1CA4-A7B445B9E451}"/>
+              </a:ext>
+            </a:extLst>
+          </p:cNvPr>
+          <p:cNvPicPr>
+            <a:picLocks noChangeAspect="1"/>
+          </p:cNvPicPr>
+          <p:nvPr/>
+        </p:nvPicPr>
+        <p:blipFill>
+          <a:blip r:embed="rId2"/>
+          <a:stretch>
+            <a:fillRect/>
+          </a:stretch>
+        </p:blipFill>
+        <p:spPr>
+          <a:xfrm>
+            <a:off x="4654296" y="1668551"/>
+            <a:ext cx="6903720" cy="3520897"/>
+          </a:xfrm>
+          <a:prstGeom prst="rect">
+            <a:avLst/>
+          </a:prstGeom>
+        </p:spPr>
+      </p:pic>
+      <p:sp>
+        <p:nvSpPr>
+          <p:cNvPr id="9" name="Rectangle 8">
+            <a:extLst>
+              <a:ext uri="{FF2B5EF4-FFF2-40B4-BE49-F238E27FC236}">
+                <a16:creationId xmlns:a16="http://schemas.microsoft.com/office/drawing/2014/main" id="{EBED2B7A-932F-C667-A3EA-2E1B4690BB66}"/>
+              </a:ext>
+            </a:extLst>
+          </p:cNvPr>
+          <p:cNvSpPr/>
+          <p:nvPr/>
+        </p:nvSpPr>
+        <p:spPr>
+          <a:xfrm>
+            <a:off x="0" y="6643561"/>
+            <a:ext cx="12192000" cy="214439"/>
+          </a:xfrm>
+          <a:prstGeom prst="rect">
+            <a:avLst/>
+          </a:prstGeom>
+          <a:solidFill>
+            <a:srgbClr val="E93327"/>
+          </a:solidFill>
+          <a:ln>
+            <a:solidFill>
+              <a:srgbClr val="E93327"/>
+            </a:solidFill>
+          </a:ln>
+        </p:spPr>
+        <p:style>
+          <a:lnRef idx="2">
+            <a:schemeClr val="accent1">
+              <a:shade val="50000"/>
+            </a:schemeClr>
+          </a:lnRef>
+          <a:fillRef idx="1">
+            <a:schemeClr val="accent1"/>
+          </a:fillRef>
+          <a:effectRef idx="0">
+            <a:schemeClr val="accent1"/>
+          </a:effectRef>
+          <a:fontRef idx="minor">
+            <a:schemeClr val="lt1"/>
+          </a:fontRef>
+        </p:style>
+        <p:txBody>
+          <a:bodyPr rtlCol="0" anchor="ctr"/>
+          <a:lstStyle/>
+          <a:p>
+            <a:pPr algn="ctr"/>
+            <a:endParaRPr lang="en-US">
+              <a:latin typeface=""/>
+            </a:endParaRPr>
+          </a:p>
+        </p:txBody>
+      </p:sp>
+      <p:sp>
+        <p:nvSpPr>
+          <p:cNvPr id="11" name="Rectangle 10">
+            <a:extLst>
+              <a:ext uri="{FF2B5EF4-FFF2-40B4-BE49-F238E27FC236}">
+                <a16:creationId xmlns:a16="http://schemas.microsoft.com/office/drawing/2014/main" id="{E0F62F3E-0D2D-81E9-6B11-CA57FB0A5BCC}"/>
+              </a:ext>
+            </a:extLst>
+          </p:cNvPr>
+          <p:cNvSpPr/>
+          <p:nvPr/>
+        </p:nvSpPr>
+        <p:spPr>
+          <a:xfrm>
+            <a:off x="0" y="-12572"/>
+            <a:ext cx="12192000" cy="53034"/>
+          </a:xfrm>
+          <a:prstGeom prst="rect">
+            <a:avLst/>
+          </a:prstGeom>
+          <a:solidFill>
+            <a:srgbClr val="E93327"/>
+          </a:solidFill>
+          <a:ln>
+            <a:solidFill>
+              <a:srgbClr val="E93327"/>
+            </a:solidFill>
+          </a:ln>
+        </p:spPr>
+        <p:style>
+          <a:lnRef idx="2">
+            <a:schemeClr val="accent1">
+              <a:shade val="50000"/>
+            </a:schemeClr>
+          </a:lnRef>
+          <a:fillRef idx="1">
+            <a:schemeClr val="accent1"/>
+          </a:fillRef>
+          <a:effectRef idx="0">
+            <a:schemeClr val="accent1"/>
+          </a:effectRef>
+          <a:fontRef idx="minor">
+            <a:schemeClr val="lt1"/>
+          </a:fontRef>
+        </p:style>
+        <p:txBody>
+          <a:bodyPr rtlCol="0" anchor="ctr"/>
+          <a:lstStyle/>
+          <a:p>
+            <a:pPr algn="ctr"/>
+            <a:endParaRPr lang="en-US"/>
+          </a:p>
+        </p:txBody>
+      </p:sp>
+      <p:sp>
+        <p:nvSpPr>
+          <p:cNvPr id="13" name="TextBox 12">
+            <a:extLst>
+              <a:ext uri="{FF2B5EF4-FFF2-40B4-BE49-F238E27FC236}">
+                <a16:creationId xmlns:a16="http://schemas.microsoft.com/office/drawing/2014/main" id="{17C01FC7-82F3-57D5-410D-56C9181DA0C3}"/>
+              </a:ext>
+            </a:extLst>
+          </p:cNvPr>
+          <p:cNvSpPr txBox="1"/>
+          <p:nvPr/>
+        </p:nvSpPr>
+        <p:spPr>
+          <a:xfrm>
+            <a:off x="11506873" y="6424490"/>
+            <a:ext cx="752560" cy="246221"/>
+          </a:xfrm>
+          <a:prstGeom prst="rect">
+            <a:avLst/>
+          </a:prstGeom>
+          <a:noFill/>
+        </p:spPr>
+        <p:txBody>
+          <a:bodyPr wrap="square" rtlCol="0">
+            <a:spAutoFit/>
+          </a:bodyPr>
+          <a:lstStyle/>
+          <a:p>
+            <a:pPr algn="ctr"/>
+            <a:r>
+              <a:rPr lang="en-US" sz="1000" dirty="0">
+                <a:solidFill>
+                  <a:schemeClr val="tx1">
+                    <a:lumMod val="50000"/>
+                    <a:lumOff val="50000"/>
+                  </a:schemeClr>
+                </a:solidFill>
+                <a:latin typeface=""/>
+              </a:rPr>
+              <a:t>Iylia Hutta</a:t>
+            </a:r>
+          </a:p>
+        </p:txBody>
+      </p:sp>
+      <p:sp>
+        <p:nvSpPr>
+          <p:cNvPr id="4" name="Slide Number Placeholder 3">
+            <a:extLst>
+              <a:ext uri="{FF2B5EF4-FFF2-40B4-BE49-F238E27FC236}">
+                <a16:creationId xmlns:a16="http://schemas.microsoft.com/office/drawing/2014/main" id="{A02034CE-CFAC-700B-73D8-D4AB879FFD30}"/>
+              </a:ext>
+            </a:extLst>
+          </p:cNvPr>
+          <p:cNvSpPr>
+            <a:spLocks noGrp="1"/>
+          </p:cNvSpPr>
+          <p:nvPr>
+            <p:ph type="sldNum" sz="quarter" idx="12"/>
+          </p:nvPr>
+        </p:nvSpPr>
+        <p:spPr>
+          <a:xfrm>
+            <a:off x="9448800" y="6634974"/>
+            <a:ext cx="2743200" cy="365125"/>
+          </a:xfrm>
+        </p:spPr>
+        <p:txBody>
+          <a:bodyPr>
+            <a:normAutofit/>
+          </a:bodyPr>
+          <a:lstStyle/>
+          <a:p>
+            <a:pPr>
+              <a:spcAft>
+                <a:spcPts val="600"/>
+              </a:spcAft>
+            </a:pPr>
+            <a:fld id="{E6FE59FF-D9EB-D545-90E6-CE90D1694C9B}" type="slidenum">
+              <a:rPr lang="en-US" smtClean="0"/>
+              <a:pPr>
+                <a:spcAft>
+                  <a:spcPts val="600"/>
+                </a:spcAft>
+              </a:pPr>
+              <a:t>8</a:t>
+            </a:fld>
+            <a:endParaRPr lang="en-US"/>
+          </a:p>
+        </p:txBody>
+      </p:sp>
+    </p:spTree>
+    <p:extLst>
+      <p:ext uri="{BB962C8B-B14F-4D97-AF65-F5344CB8AC3E}">
+        <p14:creationId xmlns:p14="http://schemas.microsoft.com/office/powerpoint/2010/main" val="3557038343"/>
+      </p:ext>
+    </p:extLst>
+  </p:cSld>
+  <p:clrMapOvr>
+    <a:masterClrMapping/>
+  </p:clrMapOvr>
+</p:sld>
+</file>
+
+<file path=ppt/slides/slide9.xml><?xml version="1.0" encoding="utf-8"?>
+<p:sld xmlns:a="http://schemas.openxmlformats.org/drawingml/2006/main" xmlns:r="http://schemas.openxmlformats.org/officeDocument/2006/relationships" xmlns:p="http://schemas.openxmlformats.org/presentationml/2006/main">
+  <p:cSld>
+    <p:bg>
+      <p:bgPr>
+        <a:solidFill>
+          <a:schemeClr val="bg1"/>
+        </a:solidFill>
+        <a:effectLst/>
+      </p:bgPr>
+    </p:bg>
+    <p:spTree>
+      <p:nvGrpSpPr>
+        <p:cNvPr id="1" name=""/>
+        <p:cNvGrpSpPr/>
+        <p:nvPr/>
+      </p:nvGrpSpPr>
+      <p:grpSpPr>
+        <a:xfrm>
+          <a:off x="0" y="0"/>
+          <a:ext cx="0" cy="0"/>
+          <a:chOff x="0" y="0"/>
+          <a:chExt cx="0" cy="0"/>
+        </a:xfrm>
+      </p:grpSpPr>
+      <p:sp useBgFill="1">
+        <p:nvSpPr>
+          <p:cNvPr id="11" name="Rectangle 10">
+            <a:extLst>
+              <a:ext uri="{FF2B5EF4-FFF2-40B4-BE49-F238E27FC236}">
+                <a16:creationId xmlns:a16="http://schemas.microsoft.com/office/drawing/2014/main" id="{385E1BDC-A9B0-4A87-82E3-F3187F69A802}"/>
+              </a:ext>
+              <a:ext uri="{C183D7F6-B498-43B3-948B-1728B52AA6E4}">
+                <adec:decorative xmlns:adec="http://schemas.microsoft.com/office/drawing/2017/decorative" val="1"/>
+              </a:ext>
+            </a:extLst>
+          </p:cNvPr>
+          <p:cNvSpPr>
+            <a:spLocks noGrp="1" noRot="1" noChangeAspect="1" noMove="1" noResize="1" noEditPoints="1" noAdjustHandles="1" noChangeArrowheads="1" noChangeShapeType="1" noTextEdit="1"/>
+          </p:cNvSpPr>
+          <p:nvPr>
+            <p:extLst>
+              <p:ext uri="{386F3935-93C4-4BCD-93E2-E3B085C9AB24}">
+                <p16:designElem xmlns:p16="http://schemas.microsoft.com/office/powerpoint/2015/main" val="1"/>
+              </p:ext>
+            </p:extLst>
+          </p:nvPr>
+        </p:nvSpPr>
+        <p:spPr>
+          <a:xfrm>
+            <a:off x="0" y="0"/>
+            <a:ext cx="12192000" cy="6858000"/>
+          </a:xfrm>
+          <a:prstGeom prst="rect">
+            <a:avLst/>
+          </a:prstGeom>
+          <a:ln>
+            <a:noFill/>
+          </a:ln>
+        </p:spPr>
+        <p:style>
+          <a:lnRef idx="2">
+            <a:schemeClr val="accent1">
+              <a:shade val="50000"/>
+            </a:schemeClr>
+          </a:lnRef>
+          <a:fillRef idx="1">
+            <a:schemeClr val="accent1"/>
+          </a:fillRef>
+          <a:effectRef idx="0">
+            <a:schemeClr val="accent1"/>
+          </a:effectRef>
+          <a:fontRef idx="minor">
+            <a:schemeClr val="lt1"/>
+          </a:fontRef>
+        </p:style>
+        <p:txBody>
+          <a:bodyPr rtlCol="0" anchor="ctr"/>
+          <a:lstStyle/>
+          <a:p>
+            <a:pPr algn="ctr"/>
+            <a:endParaRPr lang="en-US"/>
+          </a:p>
+        </p:txBody>
+      </p:sp>
+      <p:sp useBgFill="1">
+        <p:nvSpPr>
+          <p:cNvPr id="13" name="Rectangle 12">
+            <a:extLst>
+              <a:ext uri="{FF2B5EF4-FFF2-40B4-BE49-F238E27FC236}">
+                <a16:creationId xmlns:a16="http://schemas.microsoft.com/office/drawing/2014/main" id="{0990C621-3B8B-4820-8328-D47EF7CE823C}"/>
+              </a:ext>
+              <a:ext uri="{C183D7F6-B498-43B3-948B-1728B52AA6E4}">
+                <adec:decorative xmlns:adec="http://schemas.microsoft.com/office/drawing/2017/decorative" val="1"/>
+              </a:ext>
+            </a:extLst>
+          </p:cNvPr>
+          <p:cNvSpPr>
+            <a:spLocks noGrp="1" noRot="1" noChangeAspect="1" noMove="1" noResize="1" noEditPoints="1" noAdjustHandles="1" noChangeArrowheads="1" noChangeShapeType="1" noTextEdit="1"/>
+          </p:cNvSpPr>
+          <p:nvPr>
+            <p:extLst>
+              <p:ext uri="{386F3935-93C4-4BCD-93E2-E3B085C9AB24}">
+                <p16:designElem xmlns:p16="http://schemas.microsoft.com/office/powerpoint/2015/main" val="1"/>
+              </p:ext>
+            </p:extLst>
+          </p:nvPr>
+        </p:nvSpPr>
+        <p:spPr>
+          <a:xfrm>
+            <a:off x="554416" y="365125"/>
+            <a:ext cx="11167447" cy="2089317"/>
+          </a:xfrm>
+          <a:prstGeom prst="rect">
+            <a:avLst/>
+          </a:prstGeom>
+          <a:ln w="12700">
+            <a:solidFill>
+              <a:srgbClr val="DEDEDE"/>
+            </a:solidFill>
+          </a:ln>
+          <a:effectLst>
+            <a:outerShdw blurRad="50800" dist="38100" dir="2700000" algn="tl" rotWithShape="0">
+              <a:schemeClr val="bg2">
+                <a:lumMod val="85000"/>
+                <a:alpha val="50000"/>
+              </a:schemeClr>
+            </a:outerShdw>
+          </a:effectLst>
+        </p:spPr>
+        <p:style>
+          <a:lnRef idx="2">
+            <a:schemeClr val="accent1">
+              <a:shade val="50000"/>
+            </a:schemeClr>
+          </a:lnRef>
+          <a:fillRef idx="1">
+            <a:schemeClr val="accent1"/>
+          </a:fillRef>
+          <a:effectRef idx="0">
+            <a:schemeClr val="accent1"/>
+          </a:effectRef>
+          <a:fontRef idx="minor">
+            <a:schemeClr val="lt1"/>
+          </a:fontRef>
+        </p:style>
+        <p:txBody>
+          <a:bodyPr rtlCol="0" anchor="ctr"/>
+          <a:lstStyle/>
+          <a:p>
+            <a:pPr marL="0" marR="0" lvl="0" indent="0" algn="ctr" defTabSz="914400" rtl="0" eaLnBrk="1" fontAlgn="auto" latinLnBrk="0" hangingPunct="1">
+              <a:lnSpc>
+                <a:spcPct val="100000"/>
+              </a:lnSpc>
+              <a:spcBef>
+                <a:spcPts val="0"/>
+              </a:spcBef>
+              <a:spcAft>
+                <a:spcPts val="0"/>
+              </a:spcAft>
+              <a:buClrTx/>
+              <a:buSzTx/>
+              <a:buFontTx/>
+              <a:buNone/>
+              <a:tabLst/>
+              <a:defRPr/>
+            </a:pPr>
+            <a:endParaRPr kumimoji="0" lang="en-US" sz="1800" b="0" i="0" u="none" strike="noStrike" kern="1200" cap="none" spc="0" normalizeH="0" baseline="0" noProof="0">
+              <a:ln>
+                <a:noFill/>
+              </a:ln>
+              <a:solidFill>
+                <a:prstClr val="white"/>
+              </a:solidFill>
+              <a:effectLst/>
+              <a:uLnTx/>
+              <a:uFillTx/>
+              <a:latin typeface="Calibri" panose="020F0502020204030204"/>
+              <a:ea typeface="+mn-ea"/>
+              <a:cs typeface="+mn-cs"/>
+            </a:endParaRPr>
+          </a:p>
+        </p:txBody>
+      </p:sp>
+      <p:sp>
+        <p:nvSpPr>
+          <p:cNvPr id="2" name="Title 1">
+            <a:extLst>
+              <a:ext uri="{FF2B5EF4-FFF2-40B4-BE49-F238E27FC236}">
+                <a16:creationId xmlns:a16="http://schemas.microsoft.com/office/drawing/2014/main" id="{6B38F90B-4F4A-58D9-0CE0-7B55E1CDDC48}"/>
+              </a:ext>
+            </a:extLst>
+          </p:cNvPr>
+          <p:cNvSpPr>
+            <a:spLocks noGrp="1"/>
+          </p:cNvSpPr>
+          <p:nvPr>
+            <p:ph type="title"/>
+          </p:nvPr>
+        </p:nvSpPr>
+        <p:spPr>
+          <a:xfrm>
+            <a:off x="1051560" y="586822"/>
+            <a:ext cx="3657600" cy="1645920"/>
+          </a:xfrm>
+        </p:spPr>
+        <p:txBody>
+          <a:bodyPr>
+            <a:normAutofit/>
+          </a:bodyPr>
+          <a:lstStyle/>
+          <a:p>
+            <a:endParaRPr lang="en-US" sz="3200"/>
+          </a:p>
+        </p:txBody>
+      </p:sp>
+      <p:sp>
+        <p:nvSpPr>
+          <p:cNvPr id="15" name="Rectangle 14">
+            <a:extLst>
+              <a:ext uri="{FF2B5EF4-FFF2-40B4-BE49-F238E27FC236}">
+                <a16:creationId xmlns:a16="http://schemas.microsoft.com/office/drawing/2014/main" id="{C1A2385B-1D2A-4E17-84FA-6CB7F0AAE473}"/>
+              </a:ext>
+              <a:ext uri="{C183D7F6-B498-43B3-948B-1728B52AA6E4}">
+                <adec:decorative xmlns:adec="http://schemas.microsoft.com/office/drawing/2017/decorative" val="1"/>
+              </a:ext>
+            </a:extLst>
+          </p:cNvPr>
+          <p:cNvSpPr>
+            <a:spLocks noGrp="1" noRot="1" noChangeAspect="1" noMove="1" noResize="1" noEditPoints="1" noAdjustHandles="1" noChangeArrowheads="1" noChangeShapeType="1" noTextEdit="1"/>
+          </p:cNvSpPr>
+          <p:nvPr>
+            <p:extLst>
+              <p:ext uri="{386F3935-93C4-4BCD-93E2-E3B085C9AB24}">
+                <p16:designElem xmlns:p16="http://schemas.microsoft.com/office/powerpoint/2015/main" val="1"/>
+              </p:ext>
+            </p:extLst>
+          </p:nvPr>
+        </p:nvSpPr>
+        <p:spPr>
+          <a:xfrm>
+            <a:off x="490408" y="1057739"/>
+            <a:ext cx="128016" cy="704088"/>
+          </a:xfrm>
+          <a:prstGeom prst="rect">
+            <a:avLst/>
+          </a:prstGeom>
+          <a:solidFill>
+            <a:schemeClr val="accent2"/>
+          </a:solidFill>
+          <a:ln>
+            <a:noFill/>
+          </a:ln>
+        </p:spPr>
+        <p:style>
+          <a:lnRef idx="2">
+            <a:schemeClr val="accent1">
+              <a:shade val="50000"/>
+            </a:schemeClr>
+          </a:lnRef>
+          <a:fillRef idx="1">
+            <a:schemeClr val="accent1"/>
+          </a:fillRef>
+          <a:effectRef idx="0">
+            <a:schemeClr val="accent1"/>
+          </a:effectRef>
+          <a:fontRef idx="minor">
+            <a:schemeClr val="lt1"/>
+          </a:fontRef>
+        </p:style>
+        <p:txBody>
+          <a:bodyPr rtlCol="0" anchor="ctr"/>
+          <a:lstStyle/>
+          <a:p>
+            <a:pPr algn="ctr"/>
+            <a:endParaRPr lang="en-US" dirty="0">
+              <a:solidFill>
+                <a:prstClr val="white"/>
+              </a:solidFill>
+              <a:latin typeface="Calibri" panose="020F0502020204030204"/>
+            </a:endParaRPr>
+          </a:p>
+        </p:txBody>
+      </p:sp>
+      <p:sp>
+        <p:nvSpPr>
+          <p:cNvPr id="17" name="Rectangle 16">
+            <a:extLst>
+              <a:ext uri="{FF2B5EF4-FFF2-40B4-BE49-F238E27FC236}">
+                <a16:creationId xmlns:a16="http://schemas.microsoft.com/office/drawing/2014/main" id="{5E791F2F-79DB-4CC0-9FA1-001E3E91E8B7}"/>
+              </a:ext>
+              <a:ext uri="{C183D7F6-B498-43B3-948B-1728B52AA6E4}">
+                <adec:decorative xmlns:adec="http://schemas.microsoft.com/office/drawing/2017/decorative" val="1"/>
+              </a:ext>
+            </a:extLst>
+          </p:cNvPr>
+          <p:cNvSpPr>
+            <a:spLocks noGrp="1" noRot="1" noChangeAspect="1" noMove="1" noResize="1" noEditPoints="1" noAdjustHandles="1" noChangeArrowheads="1" noChangeShapeType="1" noTextEdit="1"/>
+          </p:cNvSpPr>
+          <p:nvPr>
+            <p:extLst>
+              <p:ext uri="{386F3935-93C4-4BCD-93E2-E3B085C9AB24}">
+                <p16:designElem xmlns:p16="http://schemas.microsoft.com/office/powerpoint/2015/main" val="1"/>
+              </p:ext>
+            </p:extLst>
+          </p:nvPr>
+        </p:nvSpPr>
+        <p:spPr>
+          <a:xfrm rot="5400000">
+            <a:off x="4243541" y="1400638"/>
+            <a:ext cx="1463040" cy="18288"/>
+          </a:xfrm>
+          <a:prstGeom prst="rect">
+            <a:avLst/>
+          </a:prstGeom>
+          <a:solidFill>
+            <a:srgbClr val="D5D5D5"/>
+          </a:solidFill>
+          <a:ln w="3175">
+            <a:noFill/>
+          </a:ln>
+          <a:effectLst/>
+        </p:spPr>
+        <p:style>
+          <a:lnRef idx="2">
+            <a:schemeClr val="accent1">
+              <a:shade val="50000"/>
+            </a:schemeClr>
+          </a:lnRef>
+          <a:fillRef idx="1">
+            <a:schemeClr val="accent1"/>
+          </a:fillRef>
+          <a:effectRef idx="0">
+            <a:schemeClr val="accent1"/>
+          </a:effectRef>
+          <a:fontRef idx="minor">
+            <a:schemeClr val="lt1"/>
+          </a:fontRef>
+        </p:style>
+        <p:txBody>
+          <a:bodyPr rtlCol="0" anchor="ctr"/>
+          <a:lstStyle/>
+          <a:p>
+            <a:pPr marL="0" marR="0" lvl="0" indent="0" algn="ctr" defTabSz="914400" rtl="0" eaLnBrk="1" fontAlgn="auto" latinLnBrk="0" hangingPunct="1">
+              <a:lnSpc>
+                <a:spcPct val="100000"/>
+              </a:lnSpc>
+              <a:spcBef>
+                <a:spcPts val="0"/>
+              </a:spcBef>
+              <a:spcAft>
+                <a:spcPts val="0"/>
+              </a:spcAft>
+              <a:buClrTx/>
+              <a:buSzTx/>
+              <a:buFontTx/>
+              <a:buNone/>
+              <a:tabLst/>
+              <a:defRPr/>
+            </a:pPr>
+            <a:endParaRPr kumimoji="0" lang="en-US" sz="1800" b="0" i="0" u="none" strike="noStrike" kern="1200" cap="none" spc="0" normalizeH="0" baseline="0" noProof="0">
+              <a:ln>
+                <a:noFill/>
+              </a:ln>
+              <a:solidFill>
+                <a:prstClr val="white"/>
+              </a:solidFill>
+              <a:effectLst/>
+              <a:uLnTx/>
+              <a:uFillTx/>
+              <a:latin typeface="Calibri" panose="020F0502020204030204"/>
+              <a:ea typeface="+mn-ea"/>
+              <a:cs typeface="+mn-cs"/>
+            </a:endParaRPr>
+          </a:p>
+        </p:txBody>
+      </p:sp>
+      <p:sp>
+        <p:nvSpPr>
+          <p:cNvPr id="3" name="Content Placeholder 2">
+            <a:extLst>
+              <a:ext uri="{FF2B5EF4-FFF2-40B4-BE49-F238E27FC236}">
+                <a16:creationId xmlns:a16="http://schemas.microsoft.com/office/drawing/2014/main" id="{F6CEFA4D-B508-DFAA-3A5C-802375A548F3}"/>
+              </a:ext>
+            </a:extLst>
+          </p:cNvPr>
+          <p:cNvSpPr>
+            <a:spLocks noGrp="1"/>
+          </p:cNvSpPr>
+          <p:nvPr>
+            <p:ph idx="1"/>
+          </p:nvPr>
+        </p:nvSpPr>
+        <p:spPr>
+          <a:xfrm>
+            <a:off x="5250106" y="586822"/>
+            <a:ext cx="6106742" cy="1645920"/>
+          </a:xfrm>
+        </p:spPr>
+        <p:txBody>
+          <a:bodyPr anchor="ctr">
+            <a:normAutofit/>
+          </a:bodyPr>
+          <a:lstStyle/>
+          <a:p>
+            <a:endParaRPr lang="en-US" sz="1800"/>
+          </a:p>
+        </p:txBody>
+      </p:sp>
+      <p:sp>
+        <p:nvSpPr>
+          <p:cNvPr id="8" name="Rectangle 7">
+            <a:extLst>
+              <a:ext uri="{FF2B5EF4-FFF2-40B4-BE49-F238E27FC236}">
+                <a16:creationId xmlns:a16="http://schemas.microsoft.com/office/drawing/2014/main" id="{CA52831C-DA7A-3266-95DB-46B3CDD0FA31}"/>
+              </a:ext>
+            </a:extLst>
+          </p:cNvPr>
+          <p:cNvSpPr/>
+          <p:nvPr/>
+        </p:nvSpPr>
+        <p:spPr>
+          <a:xfrm>
+            <a:off x="0" y="6643561"/>
+            <a:ext cx="12192000" cy="214439"/>
+          </a:xfrm>
+          <a:prstGeom prst="rect">
+            <a:avLst/>
+          </a:prstGeom>
+          <a:solidFill>
+            <a:srgbClr val="E93327"/>
+          </a:solidFill>
+          <a:ln>
+            <a:solidFill>
+              <a:srgbClr val="E93327"/>
+            </a:solidFill>
+          </a:ln>
+        </p:spPr>
+        <p:style>
+          <a:lnRef idx="2">
+            <a:schemeClr val="accent1">
+              <a:shade val="50000"/>
+            </a:schemeClr>
+          </a:lnRef>
+          <a:fillRef idx="1">
+            <a:schemeClr val="accent1"/>
+          </a:fillRef>
+          <a:effectRef idx="0">
+            <a:schemeClr val="accent1"/>
+          </a:effectRef>
+          <a:fontRef idx="minor">
+            <a:schemeClr val="lt1"/>
+          </a:fontRef>
+        </p:style>
+        <p:txBody>
+          <a:bodyPr rtlCol="0" anchor="ctr"/>
+          <a:lstStyle/>
+          <a:p>
+            <a:pPr algn="ctr"/>
+            <a:endParaRPr lang="en-US">
+              <a:latin typeface=""/>
+            </a:endParaRPr>
+          </a:p>
+        </p:txBody>
+      </p:sp>
+      <p:sp>
+        <p:nvSpPr>
+          <p:cNvPr id="9" name="Rectangle 8">
+            <a:extLst>
+              <a:ext uri="{FF2B5EF4-FFF2-40B4-BE49-F238E27FC236}">
+                <a16:creationId xmlns:a16="http://schemas.microsoft.com/office/drawing/2014/main" id="{A85FD028-9B6E-1EC4-BC35-9F0A3CA2ABF7}"/>
+              </a:ext>
+            </a:extLst>
+          </p:cNvPr>
+          <p:cNvSpPr/>
+          <p:nvPr/>
+        </p:nvSpPr>
+        <p:spPr>
+          <a:xfrm>
+            <a:off x="0" y="-12572"/>
+            <a:ext cx="12192000" cy="53034"/>
+          </a:xfrm>
+          <a:prstGeom prst="rect">
+            <a:avLst/>
+          </a:prstGeom>
+          <a:solidFill>
+            <a:srgbClr val="E93327"/>
+          </a:solidFill>
+          <a:ln>
+            <a:solidFill>
+              <a:srgbClr val="E93327"/>
+            </a:solidFill>
+          </a:ln>
+        </p:spPr>
+        <p:style>
+          <a:lnRef idx="2">
+            <a:schemeClr val="accent1">
+              <a:shade val="50000"/>
+            </a:schemeClr>
+          </a:lnRef>
+          <a:fillRef idx="1">
+            <a:schemeClr val="accent1"/>
+          </a:fillRef>
+          <a:effectRef idx="0">
+            <a:schemeClr val="accent1"/>
+          </a:effectRef>
+          <a:fontRef idx="minor">
+            <a:schemeClr val="lt1"/>
+          </a:fontRef>
+        </p:style>
+        <p:txBody>
+          <a:bodyPr rtlCol="0" anchor="ctr"/>
+          <a:lstStyle/>
+          <a:p>
+            <a:pPr algn="ctr"/>
+            <a:endParaRPr lang="en-US"/>
+          </a:p>
+        </p:txBody>
+      </p:sp>
+      <p:sp>
+        <p:nvSpPr>
+          <p:cNvPr id="10" name="TextBox 9">
+            <a:extLst>
+              <a:ext uri="{FF2B5EF4-FFF2-40B4-BE49-F238E27FC236}">
+                <a16:creationId xmlns:a16="http://schemas.microsoft.com/office/drawing/2014/main" id="{6CBF13E2-6233-8F16-0E45-0ACD8C4866B0}"/>
+              </a:ext>
+            </a:extLst>
+          </p:cNvPr>
+          <p:cNvSpPr txBox="1"/>
+          <p:nvPr/>
+        </p:nvSpPr>
+        <p:spPr>
+          <a:xfrm>
+            <a:off x="11506873" y="6424490"/>
+            <a:ext cx="752560" cy="246221"/>
+          </a:xfrm>
+          <a:prstGeom prst="rect">
+            <a:avLst/>
+          </a:prstGeom>
+          <a:noFill/>
+        </p:spPr>
+        <p:txBody>
+          <a:bodyPr wrap="square" rtlCol="0">
+            <a:spAutoFit/>
+          </a:bodyPr>
+          <a:lstStyle/>
+          <a:p>
+            <a:pPr algn="ctr"/>
+            <a:r>
+              <a:rPr lang="en-US" sz="1000" dirty="0">
+                <a:solidFill>
+                  <a:schemeClr val="tx1">
+                    <a:lumMod val="50000"/>
+                    <a:lumOff val="50000"/>
+                  </a:schemeClr>
+                </a:solidFill>
+                <a:latin typeface=""/>
+              </a:rPr>
+              <a:t>Iylia Hutta</a:t>
+            </a:r>
+          </a:p>
+        </p:txBody>
+      </p:sp>
+      <p:sp>
+        <p:nvSpPr>
+          <p:cNvPr id="12" name="Slide Number Placeholder 11">
+            <a:extLst>
+              <a:ext uri="{FF2B5EF4-FFF2-40B4-BE49-F238E27FC236}">
+                <a16:creationId xmlns:a16="http://schemas.microsoft.com/office/drawing/2014/main" id="{8EABC2C4-E746-C390-7190-2259D8283952}"/>
+              </a:ext>
+            </a:extLst>
+          </p:cNvPr>
+          <p:cNvSpPr>
+            <a:spLocks noGrp="1"/>
+          </p:cNvSpPr>
+          <p:nvPr>
+            <p:ph type="sldNum" sz="quarter" idx="12"/>
+          </p:nvPr>
+        </p:nvSpPr>
+        <p:spPr/>
+        <p:txBody>
+          <a:bodyPr/>
+          <a:lstStyle/>
+          <a:p>
+            <a:fld id="{E6FE59FF-D9EB-D545-90E6-CE90D1694C9B}" type="slidenum">
+              <a:rPr lang="en-US" smtClean="0"/>
+              <a:pPr/>
+              <a:t>9</a:t>
+            </a:fld>
+            <a:endParaRPr lang="en-US" dirty="0"/>
+          </a:p>
+        </p:txBody>
+      </p:sp>
+      <p:pic>
+        <p:nvPicPr>
+          <p:cNvPr id="18" name="Picture 17">
+            <a:extLst>
+              <a:ext uri="{FF2B5EF4-FFF2-40B4-BE49-F238E27FC236}">
+                <a16:creationId xmlns:a16="http://schemas.microsoft.com/office/drawing/2014/main" id="{86DD1100-1D7D-CF1A-3596-E7C6218E2EBD}"/>
+              </a:ext>
+            </a:extLst>
+          </p:cNvPr>
+          <p:cNvPicPr>
+            <a:picLocks noChangeAspect="1"/>
+          </p:cNvPicPr>
+          <p:nvPr/>
+        </p:nvPicPr>
+        <p:blipFill>
+          <a:blip r:embed="rId2"/>
+          <a:stretch>
+            <a:fillRect/>
+          </a:stretch>
+        </p:blipFill>
+        <p:spPr>
+          <a:xfrm>
+            <a:off x="544280" y="2673513"/>
+            <a:ext cx="11103439" cy="3676389"/>
+          </a:xfrm>
+          <a:prstGeom prst="rect">
+            <a:avLst/>
+          </a:prstGeom>
+        </p:spPr>
+      </p:pic>
+    </p:spTree>
+    <p:extLst>
+      <p:ext uri="{BB962C8B-B14F-4D97-AF65-F5344CB8AC3E}">
+        <p14:creationId xmlns:p14="http://schemas.microsoft.com/office/powerpoint/2010/main" val="3476523779"/>
       </p:ext>
     </p:extLst>
   </p:cSld>

</xml_diff>

<commit_message>
changed volume and price of resale charts
</commit_message>
<xml_diff>
--- a/CA1/CA1 Slides.pptx
+++ b/CA1/CA1 Slides.pptx
@@ -16,7 +16,7 @@
     <p:sldId id="259" r:id="rId7"/>
     <p:sldId id="262" r:id="rId8"/>
     <p:sldId id="264" r:id="rId9"/>
-    <p:sldId id="265" r:id="rId10"/>
+    <p:sldId id="270" r:id="rId10"/>
     <p:sldId id="269" r:id="rId11"/>
     <p:sldId id="266" r:id="rId12"/>
     <p:sldId id="267" r:id="rId13"/>
@@ -209,7 +209,7 @@
           <a:p>
             <a:fld id="{58EC6A0E-6D6F-BF4E-B73A-3B7719E08116}" type="datetimeFigureOut">
               <a:rPr lang="en-US" smtClean="0"/>
-              <a:t>12/29/22</a:t>
+              <a:t>1/1/23</a:t>
             </a:fld>
             <a:endParaRPr lang="en-US"/>
           </a:p>
@@ -7666,14 +7666,6 @@
 <file path=ppt/slides/slide9.xml><?xml version="1.0" encoding="utf-8"?>
 <p:sld xmlns:a="http://schemas.openxmlformats.org/drawingml/2006/main" xmlns:r="http://schemas.openxmlformats.org/officeDocument/2006/relationships" xmlns:p="http://schemas.openxmlformats.org/presentationml/2006/main">
   <p:cSld>
-    <p:bg>
-      <p:bgPr>
-        <a:solidFill>
-          <a:schemeClr val="bg1"/>
-        </a:solidFill>
-        <a:effectLst/>
-      </p:bgPr>
-    </p:bg>
     <p:spTree>
       <p:nvGrpSpPr>
         <p:cNvPr id="1" name=""/>
@@ -7688,550 +7680,72 @@
           <a:chExt cx="0" cy="0"/>
         </a:xfrm>
       </p:grpSpPr>
-      <p:sp useBgFill="1">
-        <p:nvSpPr>
-          <p:cNvPr id="11" name="Rectangle 10">
-            <a:extLst>
-              <a:ext uri="{FF2B5EF4-FFF2-40B4-BE49-F238E27FC236}">
-                <a16:creationId xmlns:a16="http://schemas.microsoft.com/office/drawing/2014/main" id="{385E1BDC-A9B0-4A87-82E3-F3187F69A802}"/>
-              </a:ext>
-              <a:ext uri="{C183D7F6-B498-43B3-948B-1728B52AA6E4}">
-                <adec:decorative xmlns:adec="http://schemas.microsoft.com/office/drawing/2017/decorative" val="1"/>
-              </a:ext>
-            </a:extLst>
-          </p:cNvPr>
-          <p:cNvSpPr>
-            <a:spLocks noGrp="1" noRot="1" noChangeAspect="1" noMove="1" noResize="1" noEditPoints="1" noAdjustHandles="1" noChangeArrowheads="1" noChangeShapeType="1" noTextEdit="1"/>
-          </p:cNvSpPr>
-          <p:nvPr>
-            <p:extLst>
-              <p:ext uri="{386F3935-93C4-4BCD-93E2-E3B085C9AB24}">
-                <p16:designElem xmlns:p16="http://schemas.microsoft.com/office/powerpoint/2015/main" val="1"/>
-              </p:ext>
-            </p:extLst>
-          </p:nvPr>
-        </p:nvSpPr>
-        <p:spPr>
-          <a:xfrm>
-            <a:off x="0" y="0"/>
-            <a:ext cx="12192000" cy="6858000"/>
-          </a:xfrm>
-          <a:prstGeom prst="rect">
-            <a:avLst/>
-          </a:prstGeom>
-          <a:ln>
-            <a:noFill/>
-          </a:ln>
-        </p:spPr>
-        <p:style>
-          <a:lnRef idx="2">
-            <a:schemeClr val="accent1">
-              <a:shade val="50000"/>
-            </a:schemeClr>
-          </a:lnRef>
-          <a:fillRef idx="1">
-            <a:schemeClr val="accent1"/>
-          </a:fillRef>
-          <a:effectRef idx="0">
-            <a:schemeClr val="accent1"/>
-          </a:effectRef>
-          <a:fontRef idx="minor">
-            <a:schemeClr val="lt1"/>
-          </a:fontRef>
-        </p:style>
-        <p:txBody>
-          <a:bodyPr rtlCol="0" anchor="ctr"/>
+      <p:sp>
+        <p:nvSpPr>
+          <p:cNvPr id="2" name="Title 1">
+            <a:extLst>
+              <a:ext uri="{FF2B5EF4-FFF2-40B4-BE49-F238E27FC236}">
+                <a16:creationId xmlns:a16="http://schemas.microsoft.com/office/drawing/2014/main" id="{3A436372-877C-A4E4-296D-9DB75EA087C4}"/>
+              </a:ext>
+            </a:extLst>
+          </p:cNvPr>
+          <p:cNvSpPr>
+            <a:spLocks noGrp="1"/>
+          </p:cNvSpPr>
+          <p:nvPr>
+            <p:ph type="title"/>
+          </p:nvPr>
+        </p:nvSpPr>
+        <p:spPr>
+          <a:xfrm>
+            <a:off x="311728" y="311087"/>
+            <a:ext cx="3581400" cy="2935874"/>
+          </a:xfrm>
+        </p:spPr>
+        <p:txBody>
+          <a:bodyPr/>
           <a:lstStyle/>
           <a:p>
-            <a:pPr algn="ctr"/>
-            <a:endParaRPr lang="en-US"/>
-          </a:p>
-        </p:txBody>
-      </p:sp>
-      <p:sp useBgFill="1">
-        <p:nvSpPr>
-          <p:cNvPr id="13" name="Rectangle 12">
-            <a:extLst>
-              <a:ext uri="{FF2B5EF4-FFF2-40B4-BE49-F238E27FC236}">
-                <a16:creationId xmlns:a16="http://schemas.microsoft.com/office/drawing/2014/main" id="{0990C621-3B8B-4820-8328-D47EF7CE823C}"/>
-              </a:ext>
-              <a:ext uri="{C183D7F6-B498-43B3-948B-1728B52AA6E4}">
-                <adec:decorative xmlns:adec="http://schemas.microsoft.com/office/drawing/2017/decorative" val="1"/>
-              </a:ext>
-            </a:extLst>
-          </p:cNvPr>
-          <p:cNvSpPr>
-            <a:spLocks noGrp="1" noRot="1" noChangeAspect="1" noMove="1" noResize="1" noEditPoints="1" noAdjustHandles="1" noChangeArrowheads="1" noChangeShapeType="1" noTextEdit="1"/>
-          </p:cNvSpPr>
-          <p:nvPr>
-            <p:extLst>
-              <p:ext uri="{386F3935-93C4-4BCD-93E2-E3B085C9AB24}">
-                <p16:designElem xmlns:p16="http://schemas.microsoft.com/office/powerpoint/2015/main" val="1"/>
-              </p:ext>
-            </p:extLst>
-          </p:nvPr>
-        </p:nvSpPr>
-        <p:spPr>
-          <a:xfrm>
-            <a:off x="554416" y="365125"/>
-            <a:ext cx="11167447" cy="2089317"/>
-          </a:xfrm>
-          <a:prstGeom prst="rect">
-            <a:avLst/>
-          </a:prstGeom>
-          <a:ln w="12700">
-            <a:solidFill>
-              <a:srgbClr val="DEDEDE"/>
-            </a:solidFill>
-          </a:ln>
-          <a:effectLst>
-            <a:outerShdw blurRad="50800" dist="38100" dir="2700000" algn="tl" rotWithShape="0">
-              <a:schemeClr val="bg2">
-                <a:lumMod val="85000"/>
-                <a:alpha val="50000"/>
-              </a:schemeClr>
-            </a:outerShdw>
-          </a:effectLst>
-        </p:spPr>
-        <p:style>
-          <a:lnRef idx="2">
-            <a:schemeClr val="accent1">
-              <a:shade val="50000"/>
-            </a:schemeClr>
-          </a:lnRef>
-          <a:fillRef idx="1">
-            <a:schemeClr val="accent1"/>
-          </a:fillRef>
-          <a:effectRef idx="0">
-            <a:schemeClr val="accent1"/>
-          </a:effectRef>
-          <a:fontRef idx="minor">
-            <a:schemeClr val="lt1"/>
-          </a:fontRef>
-        </p:style>
-        <p:txBody>
-          <a:bodyPr rtlCol="0" anchor="ctr"/>
+            <a:endParaRPr lang="en-US" dirty="0"/>
+          </a:p>
+        </p:txBody>
+      </p:sp>
+      <p:sp>
+        <p:nvSpPr>
+          <p:cNvPr id="3" name="Content Placeholder 2">
+            <a:extLst>
+              <a:ext uri="{FF2B5EF4-FFF2-40B4-BE49-F238E27FC236}">
+                <a16:creationId xmlns:a16="http://schemas.microsoft.com/office/drawing/2014/main" id="{2BC1008E-1EE7-B20A-4B9F-97C7A4610B77}"/>
+              </a:ext>
+            </a:extLst>
+          </p:cNvPr>
+          <p:cNvSpPr>
+            <a:spLocks noGrp="1"/>
+          </p:cNvSpPr>
+          <p:nvPr>
+            <p:ph idx="1"/>
+          </p:nvPr>
+        </p:nvSpPr>
+        <p:spPr>
+          <a:xfrm>
+            <a:off x="4107872" y="335621"/>
+            <a:ext cx="7571851" cy="2935874"/>
+          </a:xfrm>
+        </p:spPr>
+        <p:txBody>
+          <a:bodyPr/>
           <a:lstStyle/>
           <a:p>
-            <a:pPr marL="0" marR="0" lvl="0" indent="0" algn="ctr" defTabSz="914400" rtl="0" eaLnBrk="1" fontAlgn="auto" latinLnBrk="0" hangingPunct="1">
-              <a:lnSpc>
-                <a:spcPct val="100000"/>
-              </a:lnSpc>
-              <a:spcBef>
-                <a:spcPts val="0"/>
-              </a:spcBef>
-              <a:spcAft>
-                <a:spcPts val="0"/>
-              </a:spcAft>
-              <a:buClrTx/>
-              <a:buSzTx/>
-              <a:buFontTx/>
-              <a:buNone/>
-              <a:tabLst/>
-              <a:defRPr/>
-            </a:pPr>
-            <a:endParaRPr kumimoji="0" lang="en-US" sz="1800" b="0" i="0" u="none" strike="noStrike" kern="1200" cap="none" spc="0" normalizeH="0" baseline="0" noProof="0">
-              <a:ln>
-                <a:noFill/>
-              </a:ln>
-              <a:solidFill>
-                <a:prstClr val="white"/>
-              </a:solidFill>
-              <a:effectLst/>
-              <a:uLnTx/>
-              <a:uFillTx/>
-              <a:latin typeface="Calibri" panose="020F0502020204030204"/>
-              <a:ea typeface="+mn-ea"/>
-              <a:cs typeface="+mn-cs"/>
-            </a:endParaRPr>
-          </a:p>
-        </p:txBody>
-      </p:sp>
-      <p:sp>
-        <p:nvSpPr>
-          <p:cNvPr id="2" name="Title 1">
-            <a:extLst>
-              <a:ext uri="{FF2B5EF4-FFF2-40B4-BE49-F238E27FC236}">
-                <a16:creationId xmlns:a16="http://schemas.microsoft.com/office/drawing/2014/main" id="{6B38F90B-4F4A-58D9-0CE0-7B55E1CDDC48}"/>
-              </a:ext>
-            </a:extLst>
-          </p:cNvPr>
-          <p:cNvSpPr>
-            <a:spLocks noGrp="1"/>
-          </p:cNvSpPr>
-          <p:nvPr>
-            <p:ph type="title"/>
-          </p:nvPr>
-        </p:nvSpPr>
-        <p:spPr>
-          <a:xfrm>
-            <a:off x="1051560" y="586822"/>
-            <a:ext cx="3657600" cy="1645920"/>
-          </a:xfrm>
-        </p:spPr>
-        <p:txBody>
-          <a:bodyPr>
-            <a:normAutofit/>
-          </a:bodyPr>
-          <a:lstStyle/>
-          <a:p>
-            <a:endParaRPr lang="en-US" sz="3200"/>
-          </a:p>
-        </p:txBody>
-      </p:sp>
-      <p:sp>
-        <p:nvSpPr>
-          <p:cNvPr id="15" name="Rectangle 14">
-            <a:extLst>
-              <a:ext uri="{FF2B5EF4-FFF2-40B4-BE49-F238E27FC236}">
-                <a16:creationId xmlns:a16="http://schemas.microsoft.com/office/drawing/2014/main" id="{C1A2385B-1D2A-4E17-84FA-6CB7F0AAE473}"/>
-              </a:ext>
-              <a:ext uri="{C183D7F6-B498-43B3-948B-1728B52AA6E4}">
-                <adec:decorative xmlns:adec="http://schemas.microsoft.com/office/drawing/2017/decorative" val="1"/>
-              </a:ext>
-            </a:extLst>
-          </p:cNvPr>
-          <p:cNvSpPr>
-            <a:spLocks noGrp="1" noRot="1" noChangeAspect="1" noMove="1" noResize="1" noEditPoints="1" noAdjustHandles="1" noChangeArrowheads="1" noChangeShapeType="1" noTextEdit="1"/>
-          </p:cNvSpPr>
-          <p:nvPr>
-            <p:extLst>
-              <p:ext uri="{386F3935-93C4-4BCD-93E2-E3B085C9AB24}">
-                <p16:designElem xmlns:p16="http://schemas.microsoft.com/office/powerpoint/2015/main" val="1"/>
-              </p:ext>
-            </p:extLst>
-          </p:nvPr>
-        </p:nvSpPr>
-        <p:spPr>
-          <a:xfrm>
-            <a:off x="490408" y="1057739"/>
-            <a:ext cx="128016" cy="704088"/>
-          </a:xfrm>
-          <a:prstGeom prst="rect">
-            <a:avLst/>
-          </a:prstGeom>
-          <a:solidFill>
-            <a:schemeClr val="accent2"/>
-          </a:solidFill>
-          <a:ln>
-            <a:noFill/>
-          </a:ln>
-        </p:spPr>
-        <p:style>
-          <a:lnRef idx="2">
-            <a:schemeClr val="accent1">
-              <a:shade val="50000"/>
-            </a:schemeClr>
-          </a:lnRef>
-          <a:fillRef idx="1">
-            <a:schemeClr val="accent1"/>
-          </a:fillRef>
-          <a:effectRef idx="0">
-            <a:schemeClr val="accent1"/>
-          </a:effectRef>
-          <a:fontRef idx="minor">
-            <a:schemeClr val="lt1"/>
-          </a:fontRef>
-        </p:style>
-        <p:txBody>
-          <a:bodyPr rtlCol="0" anchor="ctr"/>
-          <a:lstStyle/>
-          <a:p>
-            <a:pPr algn="ctr"/>
-            <a:endParaRPr lang="en-US" dirty="0">
-              <a:solidFill>
-                <a:prstClr val="white"/>
-              </a:solidFill>
-              <a:latin typeface="Calibri" panose="020F0502020204030204"/>
-            </a:endParaRPr>
-          </a:p>
-        </p:txBody>
-      </p:sp>
-      <p:sp>
-        <p:nvSpPr>
-          <p:cNvPr id="17" name="Rectangle 16">
-            <a:extLst>
-              <a:ext uri="{FF2B5EF4-FFF2-40B4-BE49-F238E27FC236}">
-                <a16:creationId xmlns:a16="http://schemas.microsoft.com/office/drawing/2014/main" id="{5E791F2F-79DB-4CC0-9FA1-001E3E91E8B7}"/>
-              </a:ext>
-              <a:ext uri="{C183D7F6-B498-43B3-948B-1728B52AA6E4}">
-                <adec:decorative xmlns:adec="http://schemas.microsoft.com/office/drawing/2017/decorative" val="1"/>
-              </a:ext>
-            </a:extLst>
-          </p:cNvPr>
-          <p:cNvSpPr>
-            <a:spLocks noGrp="1" noRot="1" noChangeAspect="1" noMove="1" noResize="1" noEditPoints="1" noAdjustHandles="1" noChangeArrowheads="1" noChangeShapeType="1" noTextEdit="1"/>
-          </p:cNvSpPr>
-          <p:nvPr>
-            <p:extLst>
-              <p:ext uri="{386F3935-93C4-4BCD-93E2-E3B085C9AB24}">
-                <p16:designElem xmlns:p16="http://schemas.microsoft.com/office/powerpoint/2015/main" val="1"/>
-              </p:ext>
-            </p:extLst>
-          </p:nvPr>
-        </p:nvSpPr>
-        <p:spPr>
-          <a:xfrm rot="5400000">
-            <a:off x="4243541" y="1400638"/>
-            <a:ext cx="1463040" cy="18288"/>
-          </a:xfrm>
-          <a:prstGeom prst="rect">
-            <a:avLst/>
-          </a:prstGeom>
-          <a:solidFill>
-            <a:srgbClr val="D5D5D5"/>
-          </a:solidFill>
-          <a:ln w="3175">
-            <a:noFill/>
-          </a:ln>
-          <a:effectLst/>
-        </p:spPr>
-        <p:style>
-          <a:lnRef idx="2">
-            <a:schemeClr val="accent1">
-              <a:shade val="50000"/>
-            </a:schemeClr>
-          </a:lnRef>
-          <a:fillRef idx="1">
-            <a:schemeClr val="accent1"/>
-          </a:fillRef>
-          <a:effectRef idx="0">
-            <a:schemeClr val="accent1"/>
-          </a:effectRef>
-          <a:fontRef idx="minor">
-            <a:schemeClr val="lt1"/>
-          </a:fontRef>
-        </p:style>
-        <p:txBody>
-          <a:bodyPr rtlCol="0" anchor="ctr"/>
-          <a:lstStyle/>
-          <a:p>
-            <a:pPr marL="0" marR="0" lvl="0" indent="0" algn="ctr" defTabSz="914400" rtl="0" eaLnBrk="1" fontAlgn="auto" latinLnBrk="0" hangingPunct="1">
-              <a:lnSpc>
-                <a:spcPct val="100000"/>
-              </a:lnSpc>
-              <a:spcBef>
-                <a:spcPts val="0"/>
-              </a:spcBef>
-              <a:spcAft>
-                <a:spcPts val="0"/>
-              </a:spcAft>
-              <a:buClrTx/>
-              <a:buSzTx/>
-              <a:buFontTx/>
-              <a:buNone/>
-              <a:tabLst/>
-              <a:defRPr/>
-            </a:pPr>
-            <a:endParaRPr kumimoji="0" lang="en-US" sz="1800" b="0" i="0" u="none" strike="noStrike" kern="1200" cap="none" spc="0" normalizeH="0" baseline="0" noProof="0">
-              <a:ln>
-                <a:noFill/>
-              </a:ln>
-              <a:solidFill>
-                <a:prstClr val="white"/>
-              </a:solidFill>
-              <a:effectLst/>
-              <a:uLnTx/>
-              <a:uFillTx/>
-              <a:latin typeface="Calibri" panose="020F0502020204030204"/>
-              <a:ea typeface="+mn-ea"/>
-              <a:cs typeface="+mn-cs"/>
-            </a:endParaRPr>
-          </a:p>
-        </p:txBody>
-      </p:sp>
-      <p:sp>
-        <p:nvSpPr>
-          <p:cNvPr id="3" name="Content Placeholder 2">
-            <a:extLst>
-              <a:ext uri="{FF2B5EF4-FFF2-40B4-BE49-F238E27FC236}">
-                <a16:creationId xmlns:a16="http://schemas.microsoft.com/office/drawing/2014/main" id="{F6CEFA4D-B508-DFAA-3A5C-802375A548F3}"/>
-              </a:ext>
-            </a:extLst>
-          </p:cNvPr>
-          <p:cNvSpPr>
-            <a:spLocks noGrp="1"/>
-          </p:cNvSpPr>
-          <p:nvPr>
-            <p:ph idx="1"/>
-          </p:nvPr>
-        </p:nvSpPr>
-        <p:spPr>
-          <a:xfrm>
-            <a:off x="5250106" y="586822"/>
-            <a:ext cx="6106742" cy="1645920"/>
-          </a:xfrm>
-        </p:spPr>
-        <p:txBody>
-          <a:bodyPr anchor="ctr">
-            <a:normAutofit/>
-          </a:bodyPr>
-          <a:lstStyle/>
-          <a:p>
-            <a:endParaRPr lang="en-US" sz="1800"/>
-          </a:p>
-        </p:txBody>
-      </p:sp>
-      <p:sp>
-        <p:nvSpPr>
-          <p:cNvPr id="8" name="Rectangle 7">
-            <a:extLst>
-              <a:ext uri="{FF2B5EF4-FFF2-40B4-BE49-F238E27FC236}">
-                <a16:creationId xmlns:a16="http://schemas.microsoft.com/office/drawing/2014/main" id="{CA52831C-DA7A-3266-95DB-46B3CDD0FA31}"/>
-              </a:ext>
-            </a:extLst>
-          </p:cNvPr>
-          <p:cNvSpPr/>
-          <p:nvPr/>
-        </p:nvSpPr>
-        <p:spPr>
-          <a:xfrm>
-            <a:off x="0" y="6643561"/>
-            <a:ext cx="12192000" cy="214439"/>
-          </a:xfrm>
-          <a:prstGeom prst="rect">
-            <a:avLst/>
-          </a:prstGeom>
-          <a:solidFill>
-            <a:srgbClr val="E93327"/>
-          </a:solidFill>
-          <a:ln>
-            <a:solidFill>
-              <a:srgbClr val="E93327"/>
-            </a:solidFill>
-          </a:ln>
-        </p:spPr>
-        <p:style>
-          <a:lnRef idx="2">
-            <a:schemeClr val="accent1">
-              <a:shade val="50000"/>
-            </a:schemeClr>
-          </a:lnRef>
-          <a:fillRef idx="1">
-            <a:schemeClr val="accent1"/>
-          </a:fillRef>
-          <a:effectRef idx="0">
-            <a:schemeClr val="accent1"/>
-          </a:effectRef>
-          <a:fontRef idx="minor">
-            <a:schemeClr val="lt1"/>
-          </a:fontRef>
-        </p:style>
-        <p:txBody>
-          <a:bodyPr rtlCol="0" anchor="ctr"/>
-          <a:lstStyle/>
-          <a:p>
-            <a:pPr algn="ctr"/>
-            <a:endParaRPr lang="en-US">
-              <a:latin typeface=""/>
-            </a:endParaRPr>
-          </a:p>
-        </p:txBody>
-      </p:sp>
-      <p:sp>
-        <p:nvSpPr>
-          <p:cNvPr id="9" name="Rectangle 8">
-            <a:extLst>
-              <a:ext uri="{FF2B5EF4-FFF2-40B4-BE49-F238E27FC236}">
-                <a16:creationId xmlns:a16="http://schemas.microsoft.com/office/drawing/2014/main" id="{A85FD028-9B6E-1EC4-BC35-9F0A3CA2ABF7}"/>
-              </a:ext>
-            </a:extLst>
-          </p:cNvPr>
-          <p:cNvSpPr/>
-          <p:nvPr/>
-        </p:nvSpPr>
-        <p:spPr>
-          <a:xfrm>
-            <a:off x="0" y="-12572"/>
-            <a:ext cx="12192000" cy="53034"/>
-          </a:xfrm>
-          <a:prstGeom prst="rect">
-            <a:avLst/>
-          </a:prstGeom>
-          <a:solidFill>
-            <a:srgbClr val="E93327"/>
-          </a:solidFill>
-          <a:ln>
-            <a:solidFill>
-              <a:srgbClr val="E93327"/>
-            </a:solidFill>
-          </a:ln>
-        </p:spPr>
-        <p:style>
-          <a:lnRef idx="2">
-            <a:schemeClr val="accent1">
-              <a:shade val="50000"/>
-            </a:schemeClr>
-          </a:lnRef>
-          <a:fillRef idx="1">
-            <a:schemeClr val="accent1"/>
-          </a:fillRef>
-          <a:effectRef idx="0">
-            <a:schemeClr val="accent1"/>
-          </a:effectRef>
-          <a:fontRef idx="minor">
-            <a:schemeClr val="lt1"/>
-          </a:fontRef>
-        </p:style>
-        <p:txBody>
-          <a:bodyPr rtlCol="0" anchor="ctr"/>
-          <a:lstStyle/>
-          <a:p>
-            <a:pPr algn="ctr"/>
-            <a:endParaRPr lang="en-US"/>
-          </a:p>
-        </p:txBody>
-      </p:sp>
-      <p:sp>
-        <p:nvSpPr>
-          <p:cNvPr id="10" name="TextBox 9">
-            <a:extLst>
-              <a:ext uri="{FF2B5EF4-FFF2-40B4-BE49-F238E27FC236}">
-                <a16:creationId xmlns:a16="http://schemas.microsoft.com/office/drawing/2014/main" id="{6CBF13E2-6233-8F16-0E45-0ACD8C4866B0}"/>
-              </a:ext>
-            </a:extLst>
-          </p:cNvPr>
-          <p:cNvSpPr txBox="1"/>
-          <p:nvPr/>
-        </p:nvSpPr>
-        <p:spPr>
-          <a:xfrm>
-            <a:off x="11506873" y="6424490"/>
-            <a:ext cx="752560" cy="246221"/>
-          </a:xfrm>
-          <a:prstGeom prst="rect">
-            <a:avLst/>
-          </a:prstGeom>
-          <a:noFill/>
-        </p:spPr>
-        <p:txBody>
-          <a:bodyPr wrap="square" rtlCol="0">
-            <a:spAutoFit/>
-          </a:bodyPr>
-          <a:lstStyle/>
-          <a:p>
-            <a:pPr algn="ctr"/>
-            <a:r>
-              <a:rPr lang="en-US" sz="1000" dirty="0">
-                <a:solidFill>
-                  <a:schemeClr val="tx1">
-                    <a:lumMod val="50000"/>
-                    <a:lumOff val="50000"/>
-                  </a:schemeClr>
-                </a:solidFill>
-                <a:latin typeface=""/>
-              </a:rPr>
-              <a:t>Iylia Hutta</a:t>
-            </a:r>
-          </a:p>
-        </p:txBody>
-      </p:sp>
-      <p:sp>
-        <p:nvSpPr>
-          <p:cNvPr id="12" name="Slide Number Placeholder 11">
-            <a:extLst>
-              <a:ext uri="{FF2B5EF4-FFF2-40B4-BE49-F238E27FC236}">
-                <a16:creationId xmlns:a16="http://schemas.microsoft.com/office/drawing/2014/main" id="{8EABC2C4-E746-C390-7190-2259D8283952}"/>
+            <a:endParaRPr lang="en-US" dirty="0"/>
+          </a:p>
+        </p:txBody>
+      </p:sp>
+      <p:sp>
+        <p:nvSpPr>
+          <p:cNvPr id="4" name="Slide Number Placeholder 3">
+            <a:extLst>
+              <a:ext uri="{FF2B5EF4-FFF2-40B4-BE49-F238E27FC236}">
+                <a16:creationId xmlns:a16="http://schemas.microsoft.com/office/drawing/2014/main" id="{D3AD5A38-4171-F2D2-6DD8-CCE83CC2BFB8}"/>
               </a:ext>
             </a:extLst>
           </p:cNvPr>
@@ -8258,10 +7772,10 @@
       </p:sp>
       <p:pic>
         <p:nvPicPr>
-          <p:cNvPr id="18" name="Picture 17">
-            <a:extLst>
-              <a:ext uri="{FF2B5EF4-FFF2-40B4-BE49-F238E27FC236}">
-                <a16:creationId xmlns:a16="http://schemas.microsoft.com/office/drawing/2014/main" id="{86DD1100-1D7D-CF1A-3596-E7C6218E2EBD}"/>
+          <p:cNvPr id="6" name="Picture 5">
+            <a:extLst>
+              <a:ext uri="{FF2B5EF4-FFF2-40B4-BE49-F238E27FC236}">
+                <a16:creationId xmlns:a16="http://schemas.microsoft.com/office/drawing/2014/main" id="{4AD7523C-0DFB-0CCD-C702-469BF5998A77}"/>
               </a:ext>
             </a:extLst>
           </p:cNvPr>
@@ -8272,14 +7786,13 @@
         </p:nvPicPr>
         <p:blipFill>
           <a:blip r:embed="rId2"/>
-          <a:stretch>
-            <a:fillRect/>
-          </a:stretch>
+          <a:srcRect/>
+          <a:stretch/>
         </p:blipFill>
         <p:spPr>
           <a:xfrm>
-            <a:off x="544280" y="2673513"/>
-            <a:ext cx="11103439" cy="3676389"/>
+            <a:off x="435584" y="3586505"/>
+            <a:ext cx="11320832" cy="2767797"/>
           </a:xfrm>
           <a:prstGeom prst="rect">
             <a:avLst/>
@@ -8289,7 +7802,7 @@
     </p:spTree>
     <p:extLst>
       <p:ext uri="{BB962C8B-B14F-4D97-AF65-F5344CB8AC3E}">
-        <p14:creationId xmlns:p14="http://schemas.microsoft.com/office/powerpoint/2010/main" val="3476523779"/>
+        <p14:creationId xmlns:p14="http://schemas.microsoft.com/office/powerpoint/2010/main" val="2774634539"/>
       </p:ext>
     </p:extLst>
   </p:cSld>

</xml_diff>

<commit_message>
added legend for resale prices and index chart
</commit_message>
<xml_diff>
--- a/CA1/CA1 Slides.pptx
+++ b/CA1/CA1 Slides.pptx
@@ -5280,7 +5280,7 @@
       </p:sp>
       <p:pic>
         <p:nvPicPr>
-          <p:cNvPr id="5" name="Picture 4" descr="Chart, line chart&#10;&#10;Description automatically generated">
+          <p:cNvPr id="5" name="Picture 4">
             <a:extLst>
               <a:ext uri="{FF2B5EF4-FFF2-40B4-BE49-F238E27FC236}">
                 <a16:creationId xmlns:a16="http://schemas.microsoft.com/office/drawing/2014/main" id="{E7EABACD-2C7E-DE0C-5F10-F1CFD4A048FF}"/>
@@ -5294,14 +5294,13 @@
         </p:nvPicPr>
         <p:blipFill>
           <a:blip r:embed="rId2"/>
-          <a:stretch>
-            <a:fillRect/>
-          </a:stretch>
+          <a:srcRect/>
+          <a:stretch/>
         </p:blipFill>
         <p:spPr>
           <a:xfrm>
-            <a:off x="5377912" y="981189"/>
-            <a:ext cx="6549325" cy="4895621"/>
+            <a:off x="5381670" y="981189"/>
+            <a:ext cx="6541809" cy="4895621"/>
           </a:xfrm>
           <a:prstGeom prst="rect">
             <a:avLst/>

</xml_diff>

<commit_message>
add code snippet and process description
</commit_message>
<xml_diff>
--- a/CA1/CA1 Slides.pptx
+++ b/CA1/CA1 Slides.pptx
@@ -5,7 +5,7 @@
     <p:sldMasterId id="2147483648" r:id="rId1"/>
   </p:sldMasterIdLst>
   <p:notesMasterIdLst>
-    <p:notesMasterId r:id="rId15"/>
+    <p:notesMasterId r:id="rId16"/>
   </p:notesMasterIdLst>
   <p:sldIdLst>
     <p:sldId id="256" r:id="rId2"/>
@@ -16,11 +16,12 @@
     <p:sldId id="259" r:id="rId7"/>
     <p:sldId id="262" r:id="rId8"/>
     <p:sldId id="264" r:id="rId9"/>
-    <p:sldId id="270" r:id="rId10"/>
-    <p:sldId id="269" r:id="rId11"/>
-    <p:sldId id="266" r:id="rId12"/>
-    <p:sldId id="267" r:id="rId13"/>
-    <p:sldId id="268" r:id="rId14"/>
+    <p:sldId id="271" r:id="rId10"/>
+    <p:sldId id="270" r:id="rId11"/>
+    <p:sldId id="269" r:id="rId12"/>
+    <p:sldId id="266" r:id="rId13"/>
+    <p:sldId id="267" r:id="rId14"/>
+    <p:sldId id="268" r:id="rId15"/>
   </p:sldIdLst>
   <p:sldSz cx="12192000" cy="6858000"/>
   <p:notesSz cx="6858000" cy="9144000"/>
@@ -5043,7 +5044,7 @@
           <p:cNvPr id="2" name="Title 1">
             <a:extLst>
               <a:ext uri="{FF2B5EF4-FFF2-40B4-BE49-F238E27FC236}">
-                <a16:creationId xmlns:a16="http://schemas.microsoft.com/office/drawing/2014/main" id="{6AA6D162-3792-C1DD-3411-EEF61C233EC6}"/>
+                <a16:creationId xmlns:a16="http://schemas.microsoft.com/office/drawing/2014/main" id="{3A436372-877C-A4E4-296D-9DB75EA087C4}"/>
               </a:ext>
             </a:extLst>
           </p:cNvPr>
@@ -5056,8 +5057,8 @@
         </p:nvSpPr>
         <p:spPr>
           <a:xfrm>
-            <a:off x="838200" y="365125"/>
-            <a:ext cx="5857068" cy="1325563"/>
+            <a:off x="311728" y="311087"/>
+            <a:ext cx="3581400" cy="2935874"/>
           </a:xfrm>
         </p:spPr>
         <p:txBody>
@@ -5073,7 +5074,7 @@
           <p:cNvPr id="3" name="Content Placeholder 2">
             <a:extLst>
               <a:ext uri="{FF2B5EF4-FFF2-40B4-BE49-F238E27FC236}">
-                <a16:creationId xmlns:a16="http://schemas.microsoft.com/office/drawing/2014/main" id="{F8F5BA37-534C-3525-8A90-76F4E0BE1FE1}"/>
+                <a16:creationId xmlns:a16="http://schemas.microsoft.com/office/drawing/2014/main" id="{2BC1008E-1EE7-B20A-4B9F-97C7A4610B77}"/>
               </a:ext>
             </a:extLst>
           </p:cNvPr>
@@ -5086,8 +5087,8 @@
         </p:nvSpPr>
         <p:spPr>
           <a:xfrm>
-            <a:off x="838200" y="1825625"/>
-            <a:ext cx="5857068" cy="4351338"/>
+            <a:off x="4107872" y="335621"/>
+            <a:ext cx="7571851" cy="2935874"/>
           </a:xfrm>
         </p:spPr>
         <p:txBody>
@@ -5103,7 +5104,7 @@
           <p:cNvPr id="4" name="Slide Number Placeholder 3">
             <a:extLst>
               <a:ext uri="{FF2B5EF4-FFF2-40B4-BE49-F238E27FC236}">
-                <a16:creationId xmlns:a16="http://schemas.microsoft.com/office/drawing/2014/main" id="{AD5ABD77-EBE2-5386-06B6-7CC422E72F01}"/>
+                <a16:creationId xmlns:a16="http://schemas.microsoft.com/office/drawing/2014/main" id="{D3AD5A38-4171-F2D2-6DD8-CCE83CC2BFB8}"/>
               </a:ext>
             </a:extLst>
           </p:cNvPr>
@@ -5133,7 +5134,7 @@
           <p:cNvPr id="6" name="Picture 5">
             <a:extLst>
               <a:ext uri="{FF2B5EF4-FFF2-40B4-BE49-F238E27FC236}">
-                <a16:creationId xmlns:a16="http://schemas.microsoft.com/office/drawing/2014/main" id="{5DD47241-F288-21E8-88CB-A6F28FCB8960}"/>
+                <a16:creationId xmlns:a16="http://schemas.microsoft.com/office/drawing/2014/main" id="{4AD7523C-0DFB-0CCD-C702-469BF5998A77}"/>
               </a:ext>
             </a:extLst>
           </p:cNvPr>
@@ -5144,14 +5145,13 @@
         </p:nvPicPr>
         <p:blipFill>
           <a:blip r:embed="rId2"/>
-          <a:stretch>
-            <a:fillRect/>
-          </a:stretch>
+          <a:srcRect/>
+          <a:stretch/>
         </p:blipFill>
         <p:spPr>
           <a:xfrm>
-            <a:off x="6865749" y="392724"/>
-            <a:ext cx="5181100" cy="5931984"/>
+            <a:off x="435584" y="3586505"/>
+            <a:ext cx="11320832" cy="2767797"/>
           </a:xfrm>
           <a:prstGeom prst="rect">
             <a:avLst/>
@@ -5161,7 +5161,7 @@
     </p:spTree>
     <p:extLst>
       <p:ext uri="{BB962C8B-B14F-4D97-AF65-F5344CB8AC3E}">
-        <p14:creationId xmlns:p14="http://schemas.microsoft.com/office/powerpoint/2010/main" val="3308921364"/>
+        <p14:creationId xmlns:p14="http://schemas.microsoft.com/office/powerpoint/2010/main" val="2774634539"/>
       </p:ext>
     </p:extLst>
   </p:cSld>
@@ -5193,7 +5193,7 @@
           <p:cNvPr id="2" name="Title 1">
             <a:extLst>
               <a:ext uri="{FF2B5EF4-FFF2-40B4-BE49-F238E27FC236}">
-                <a16:creationId xmlns:a16="http://schemas.microsoft.com/office/drawing/2014/main" id="{11DBBA12-6E02-21FB-9470-5A7FAEEDC054}"/>
+                <a16:creationId xmlns:a16="http://schemas.microsoft.com/office/drawing/2014/main" id="{6AA6D162-3792-C1DD-3411-EEF61C233EC6}"/>
               </a:ext>
             </a:extLst>
           </p:cNvPr>
@@ -5207,7 +5207,7 @@
         <p:spPr>
           <a:xfrm>
             <a:off x="838200" y="365125"/>
-            <a:ext cx="4245244" cy="1325563"/>
+            <a:ext cx="5857068" cy="1325563"/>
           </a:xfrm>
         </p:spPr>
         <p:txBody>
@@ -5223,7 +5223,7 @@
           <p:cNvPr id="3" name="Content Placeholder 2">
             <a:extLst>
               <a:ext uri="{FF2B5EF4-FFF2-40B4-BE49-F238E27FC236}">
-                <a16:creationId xmlns:a16="http://schemas.microsoft.com/office/drawing/2014/main" id="{CE84337D-3D74-248F-711D-B55D3962994C}"/>
+                <a16:creationId xmlns:a16="http://schemas.microsoft.com/office/drawing/2014/main" id="{F8F5BA37-534C-3525-8A90-76F4E0BE1FE1}"/>
               </a:ext>
             </a:extLst>
           </p:cNvPr>
@@ -5237,7 +5237,7 @@
         <p:spPr>
           <a:xfrm>
             <a:off x="838200" y="1825625"/>
-            <a:ext cx="4245244" cy="4351338"/>
+            <a:ext cx="5857068" cy="4351338"/>
           </a:xfrm>
         </p:spPr>
         <p:txBody>
@@ -5253,7 +5253,7 @@
           <p:cNvPr id="4" name="Slide Number Placeholder 3">
             <a:extLst>
               <a:ext uri="{FF2B5EF4-FFF2-40B4-BE49-F238E27FC236}">
-                <a16:creationId xmlns:a16="http://schemas.microsoft.com/office/drawing/2014/main" id="{D79CC5E2-9BD9-56C9-BCE1-07015755B40D}"/>
+                <a16:creationId xmlns:a16="http://schemas.microsoft.com/office/drawing/2014/main" id="{AD5ABD77-EBE2-5386-06B6-7CC422E72F01}"/>
               </a:ext>
             </a:extLst>
           </p:cNvPr>
@@ -5280,10 +5280,10 @@
       </p:sp>
       <p:pic>
         <p:nvPicPr>
-          <p:cNvPr id="5" name="Picture 4">
-            <a:extLst>
-              <a:ext uri="{FF2B5EF4-FFF2-40B4-BE49-F238E27FC236}">
-                <a16:creationId xmlns:a16="http://schemas.microsoft.com/office/drawing/2014/main" id="{E7EABACD-2C7E-DE0C-5F10-F1CFD4A048FF}"/>
+          <p:cNvPr id="6" name="Picture 5">
+            <a:extLst>
+              <a:ext uri="{FF2B5EF4-FFF2-40B4-BE49-F238E27FC236}">
+                <a16:creationId xmlns:a16="http://schemas.microsoft.com/office/drawing/2014/main" id="{5DD47241-F288-21E8-88CB-A6F28FCB8960}"/>
               </a:ext>
             </a:extLst>
           </p:cNvPr>
@@ -5294,13 +5294,14 @@
         </p:nvPicPr>
         <p:blipFill>
           <a:blip r:embed="rId2"/>
-          <a:srcRect/>
-          <a:stretch/>
+          <a:stretch>
+            <a:fillRect/>
+          </a:stretch>
         </p:blipFill>
         <p:spPr>
           <a:xfrm>
-            <a:off x="5381670" y="981189"/>
-            <a:ext cx="6541809" cy="4895621"/>
+            <a:off x="6865749" y="392724"/>
+            <a:ext cx="5181100" cy="5931984"/>
           </a:xfrm>
           <a:prstGeom prst="rect">
             <a:avLst/>
@@ -5310,7 +5311,7 @@
     </p:spTree>
     <p:extLst>
       <p:ext uri="{BB962C8B-B14F-4D97-AF65-F5344CB8AC3E}">
-        <p14:creationId xmlns:p14="http://schemas.microsoft.com/office/powerpoint/2010/main" val="2638041493"/>
+        <p14:creationId xmlns:p14="http://schemas.microsoft.com/office/powerpoint/2010/main" val="3308921364"/>
       </p:ext>
     </p:extLst>
   </p:cSld>
@@ -5342,7 +5343,7 @@
           <p:cNvPr id="2" name="Title 1">
             <a:extLst>
               <a:ext uri="{FF2B5EF4-FFF2-40B4-BE49-F238E27FC236}">
-                <a16:creationId xmlns:a16="http://schemas.microsoft.com/office/drawing/2014/main" id="{EC4B782B-6B1F-16F5-7582-475E887D20D9}"/>
+                <a16:creationId xmlns:a16="http://schemas.microsoft.com/office/drawing/2014/main" id="{11DBBA12-6E02-21FB-9470-5A7FAEEDC054}"/>
               </a:ext>
             </a:extLst>
           </p:cNvPr>
@@ -5355,8 +5356,8 @@
         </p:nvSpPr>
         <p:spPr>
           <a:xfrm>
-            <a:off x="838199" y="365125"/>
-            <a:ext cx="5066655" cy="1325563"/>
+            <a:off x="838200" y="365125"/>
+            <a:ext cx="4245244" cy="1325563"/>
           </a:xfrm>
         </p:spPr>
         <p:txBody>
@@ -5372,7 +5373,7 @@
           <p:cNvPr id="3" name="Content Placeholder 2">
             <a:extLst>
               <a:ext uri="{FF2B5EF4-FFF2-40B4-BE49-F238E27FC236}">
-                <a16:creationId xmlns:a16="http://schemas.microsoft.com/office/drawing/2014/main" id="{2D21537C-8050-0B9C-B9E0-2076DCEDC41B}"/>
+                <a16:creationId xmlns:a16="http://schemas.microsoft.com/office/drawing/2014/main" id="{CE84337D-3D74-248F-711D-B55D3962994C}"/>
               </a:ext>
             </a:extLst>
           </p:cNvPr>
@@ -5385,8 +5386,8 @@
         </p:nvSpPr>
         <p:spPr>
           <a:xfrm>
-            <a:off x="838199" y="1825625"/>
-            <a:ext cx="5066655" cy="4351338"/>
+            <a:off x="838200" y="1825625"/>
+            <a:ext cx="4245244" cy="4351338"/>
           </a:xfrm>
         </p:spPr>
         <p:txBody>
@@ -5402,7 +5403,7 @@
           <p:cNvPr id="4" name="Slide Number Placeholder 3">
             <a:extLst>
               <a:ext uri="{FF2B5EF4-FFF2-40B4-BE49-F238E27FC236}">
-                <a16:creationId xmlns:a16="http://schemas.microsoft.com/office/drawing/2014/main" id="{E997AB43-4AAD-B4DA-E158-D945270FC108}"/>
+                <a16:creationId xmlns:a16="http://schemas.microsoft.com/office/drawing/2014/main" id="{D79CC5E2-9BD9-56C9-BCE1-07015755B40D}"/>
               </a:ext>
             </a:extLst>
           </p:cNvPr>
@@ -5429,10 +5430,10 @@
       </p:sp>
       <p:pic>
         <p:nvPicPr>
-          <p:cNvPr id="6" name="Picture 5">
-            <a:extLst>
-              <a:ext uri="{FF2B5EF4-FFF2-40B4-BE49-F238E27FC236}">
-                <a16:creationId xmlns:a16="http://schemas.microsoft.com/office/drawing/2014/main" id="{02508BBA-7536-E325-E2BF-0B5DD2B18C6D}"/>
+          <p:cNvPr id="5" name="Picture 4">
+            <a:extLst>
+              <a:ext uri="{FF2B5EF4-FFF2-40B4-BE49-F238E27FC236}">
+                <a16:creationId xmlns:a16="http://schemas.microsoft.com/office/drawing/2014/main" id="{E7EABACD-2C7E-DE0C-5F10-F1CFD4A048FF}"/>
               </a:ext>
             </a:extLst>
           </p:cNvPr>
@@ -5443,14 +5444,13 @@
         </p:nvPicPr>
         <p:blipFill>
           <a:blip r:embed="rId2"/>
-          <a:stretch>
-            <a:fillRect/>
-          </a:stretch>
+          <a:srcRect/>
+          <a:stretch/>
         </p:blipFill>
         <p:spPr>
           <a:xfrm>
-            <a:off x="6044337" y="425557"/>
-            <a:ext cx="6006885" cy="6006885"/>
+            <a:off x="5381670" y="981189"/>
+            <a:ext cx="6541809" cy="4895621"/>
           </a:xfrm>
           <a:prstGeom prst="rect">
             <a:avLst/>
@@ -5460,7 +5460,7 @@
     </p:spTree>
     <p:extLst>
       <p:ext uri="{BB962C8B-B14F-4D97-AF65-F5344CB8AC3E}">
-        <p14:creationId xmlns:p14="http://schemas.microsoft.com/office/powerpoint/2010/main" val="928219461"/>
+        <p14:creationId xmlns:p14="http://schemas.microsoft.com/office/powerpoint/2010/main" val="2638041493"/>
       </p:ext>
     </p:extLst>
   </p:cSld>
@@ -5492,7 +5492,7 @@
           <p:cNvPr id="2" name="Title 1">
             <a:extLst>
               <a:ext uri="{FF2B5EF4-FFF2-40B4-BE49-F238E27FC236}">
-                <a16:creationId xmlns:a16="http://schemas.microsoft.com/office/drawing/2014/main" id="{C4A634B8-030A-4482-12C1-692EE51B6997}"/>
+                <a16:creationId xmlns:a16="http://schemas.microsoft.com/office/drawing/2014/main" id="{EC4B782B-6B1F-16F5-7582-475E887D20D9}"/>
               </a:ext>
             </a:extLst>
           </p:cNvPr>
@@ -5505,15 +5505,15 @@
         </p:nvSpPr>
         <p:spPr>
           <a:xfrm>
-            <a:off x="838200" y="365125"/>
-            <a:ext cx="5717583" cy="1325563"/>
+            <a:off x="838199" y="365125"/>
+            <a:ext cx="5066655" cy="1325563"/>
           </a:xfrm>
         </p:spPr>
         <p:txBody>
           <a:bodyPr/>
           <a:lstStyle/>
           <a:p>
-            <a:endParaRPr lang="en-US"/>
+            <a:endParaRPr lang="en-US" dirty="0"/>
           </a:p>
         </p:txBody>
       </p:sp>
@@ -5522,7 +5522,7 @@
           <p:cNvPr id="3" name="Content Placeholder 2">
             <a:extLst>
               <a:ext uri="{FF2B5EF4-FFF2-40B4-BE49-F238E27FC236}">
-                <a16:creationId xmlns:a16="http://schemas.microsoft.com/office/drawing/2014/main" id="{BDE36D69-B8B0-C3E8-84ED-BA08459C3658}"/>
+                <a16:creationId xmlns:a16="http://schemas.microsoft.com/office/drawing/2014/main" id="{2D21537C-8050-0B9C-B9E0-2076DCEDC41B}"/>
               </a:ext>
             </a:extLst>
           </p:cNvPr>
@@ -5535,15 +5535,15 @@
         </p:nvSpPr>
         <p:spPr>
           <a:xfrm>
-            <a:off x="838200" y="1825625"/>
-            <a:ext cx="5717583" cy="4351338"/>
+            <a:off x="838199" y="1825625"/>
+            <a:ext cx="5066655" cy="4351338"/>
           </a:xfrm>
         </p:spPr>
         <p:txBody>
           <a:bodyPr/>
           <a:lstStyle/>
           <a:p>
-            <a:endParaRPr lang="en-US"/>
+            <a:endParaRPr lang="en-US" dirty="0"/>
           </a:p>
         </p:txBody>
       </p:sp>
@@ -5552,7 +5552,7 @@
           <p:cNvPr id="4" name="Slide Number Placeholder 3">
             <a:extLst>
               <a:ext uri="{FF2B5EF4-FFF2-40B4-BE49-F238E27FC236}">
-                <a16:creationId xmlns:a16="http://schemas.microsoft.com/office/drawing/2014/main" id="{30E3EB71-C593-925E-73EB-D9B83D7E9927}"/>
+                <a16:creationId xmlns:a16="http://schemas.microsoft.com/office/drawing/2014/main" id="{E997AB43-4AAD-B4DA-E158-D945270FC108}"/>
               </a:ext>
             </a:extLst>
           </p:cNvPr>
@@ -5572,6 +5572,156 @@
               <a:rPr lang="en-US" smtClean="0"/>
               <a:pPr/>
               <a:t>13</a:t>
+            </a:fld>
+            <a:endParaRPr lang="en-US" dirty="0"/>
+          </a:p>
+        </p:txBody>
+      </p:sp>
+      <p:pic>
+        <p:nvPicPr>
+          <p:cNvPr id="6" name="Picture 5">
+            <a:extLst>
+              <a:ext uri="{FF2B5EF4-FFF2-40B4-BE49-F238E27FC236}">
+                <a16:creationId xmlns:a16="http://schemas.microsoft.com/office/drawing/2014/main" id="{02508BBA-7536-E325-E2BF-0B5DD2B18C6D}"/>
+              </a:ext>
+            </a:extLst>
+          </p:cNvPr>
+          <p:cNvPicPr>
+            <a:picLocks noChangeAspect="1"/>
+          </p:cNvPicPr>
+          <p:nvPr/>
+        </p:nvPicPr>
+        <p:blipFill>
+          <a:blip r:embed="rId2"/>
+          <a:stretch>
+            <a:fillRect/>
+          </a:stretch>
+        </p:blipFill>
+        <p:spPr>
+          <a:xfrm>
+            <a:off x="6044337" y="425557"/>
+            <a:ext cx="6006885" cy="6006885"/>
+          </a:xfrm>
+          <a:prstGeom prst="rect">
+            <a:avLst/>
+          </a:prstGeom>
+        </p:spPr>
+      </p:pic>
+    </p:spTree>
+    <p:extLst>
+      <p:ext uri="{BB962C8B-B14F-4D97-AF65-F5344CB8AC3E}">
+        <p14:creationId xmlns:p14="http://schemas.microsoft.com/office/powerpoint/2010/main" val="928219461"/>
+      </p:ext>
+    </p:extLst>
+  </p:cSld>
+  <p:clrMapOvr>
+    <a:masterClrMapping/>
+  </p:clrMapOvr>
+</p:sld>
+</file>
+
+<file path=ppt/slides/slide14.xml><?xml version="1.0" encoding="utf-8"?>
+<p:sld xmlns:a="http://schemas.openxmlformats.org/drawingml/2006/main" xmlns:r="http://schemas.openxmlformats.org/officeDocument/2006/relationships" xmlns:p="http://schemas.openxmlformats.org/presentationml/2006/main">
+  <p:cSld>
+    <p:spTree>
+      <p:nvGrpSpPr>
+        <p:cNvPr id="1" name=""/>
+        <p:cNvGrpSpPr/>
+        <p:nvPr/>
+      </p:nvGrpSpPr>
+      <p:grpSpPr>
+        <a:xfrm>
+          <a:off x="0" y="0"/>
+          <a:ext cx="0" cy="0"/>
+          <a:chOff x="0" y="0"/>
+          <a:chExt cx="0" cy="0"/>
+        </a:xfrm>
+      </p:grpSpPr>
+      <p:sp>
+        <p:nvSpPr>
+          <p:cNvPr id="2" name="Title 1">
+            <a:extLst>
+              <a:ext uri="{FF2B5EF4-FFF2-40B4-BE49-F238E27FC236}">
+                <a16:creationId xmlns:a16="http://schemas.microsoft.com/office/drawing/2014/main" id="{C4A634B8-030A-4482-12C1-692EE51B6997}"/>
+              </a:ext>
+            </a:extLst>
+          </p:cNvPr>
+          <p:cNvSpPr>
+            <a:spLocks noGrp="1"/>
+          </p:cNvSpPr>
+          <p:nvPr>
+            <p:ph type="title"/>
+          </p:nvPr>
+        </p:nvSpPr>
+        <p:spPr>
+          <a:xfrm>
+            <a:off x="838200" y="365125"/>
+            <a:ext cx="5717583" cy="1325563"/>
+          </a:xfrm>
+        </p:spPr>
+        <p:txBody>
+          <a:bodyPr/>
+          <a:lstStyle/>
+          <a:p>
+            <a:endParaRPr lang="en-US"/>
+          </a:p>
+        </p:txBody>
+      </p:sp>
+      <p:sp>
+        <p:nvSpPr>
+          <p:cNvPr id="3" name="Content Placeholder 2">
+            <a:extLst>
+              <a:ext uri="{FF2B5EF4-FFF2-40B4-BE49-F238E27FC236}">
+                <a16:creationId xmlns:a16="http://schemas.microsoft.com/office/drawing/2014/main" id="{BDE36D69-B8B0-C3E8-84ED-BA08459C3658}"/>
+              </a:ext>
+            </a:extLst>
+          </p:cNvPr>
+          <p:cNvSpPr>
+            <a:spLocks noGrp="1"/>
+          </p:cNvSpPr>
+          <p:nvPr>
+            <p:ph idx="1"/>
+          </p:nvPr>
+        </p:nvSpPr>
+        <p:spPr>
+          <a:xfrm>
+            <a:off x="838200" y="1825625"/>
+            <a:ext cx="5717583" cy="4351338"/>
+          </a:xfrm>
+        </p:spPr>
+        <p:txBody>
+          <a:bodyPr/>
+          <a:lstStyle/>
+          <a:p>
+            <a:endParaRPr lang="en-US"/>
+          </a:p>
+        </p:txBody>
+      </p:sp>
+      <p:sp>
+        <p:nvSpPr>
+          <p:cNvPr id="4" name="Slide Number Placeholder 3">
+            <a:extLst>
+              <a:ext uri="{FF2B5EF4-FFF2-40B4-BE49-F238E27FC236}">
+                <a16:creationId xmlns:a16="http://schemas.microsoft.com/office/drawing/2014/main" id="{30E3EB71-C593-925E-73EB-D9B83D7E9927}"/>
+              </a:ext>
+            </a:extLst>
+          </p:cNvPr>
+          <p:cNvSpPr>
+            <a:spLocks noGrp="1"/>
+          </p:cNvSpPr>
+          <p:nvPr>
+            <p:ph type="sldNum" sz="quarter" idx="12"/>
+          </p:nvPr>
+        </p:nvSpPr>
+        <p:spPr/>
+        <p:txBody>
+          <a:bodyPr/>
+          <a:lstStyle/>
+          <a:p>
+            <a:fld id="{E6FE59FF-D9EB-D545-90E6-CE90D1694C9B}" type="slidenum">
+              <a:rPr lang="en-US" smtClean="0"/>
+              <a:pPr/>
+              <a:t>14</a:t>
             </a:fld>
             <a:endParaRPr lang="en-US" dirty="0"/>
           </a:p>
@@ -7391,31 +7541,51 @@
         <p:spPr>
           <a:xfrm>
             <a:off x="630936" y="2807208"/>
-            <a:ext cx="3429000" cy="3410712"/>
+            <a:ext cx="5465064" cy="3410712"/>
           </a:xfrm>
         </p:spPr>
         <p:txBody>
           <a:bodyPr anchor="t">
-            <a:normAutofit fontScale="92500" lnSpcReduction="20000"/>
+            <a:normAutofit/>
           </a:bodyPr>
           <a:lstStyle/>
           <a:p>
             <a:r>
               <a:rPr lang="en-US" sz="2200" dirty="0"/>
-              <a:t>As expected, the larger flat types see higher median prices than those of smaller types</a:t>
-            </a:r>
-          </a:p>
-          <a:p>
+              <a:t>Two lists were created for the Flat Type labels (‘labels’) and the range of prices for each flat type (‘</a:t>
+            </a:r>
+            <a:r>
+              <a:rPr lang="en-US" sz="2200" dirty="0" err="1"/>
+              <a:t>prices_combined</a:t>
+            </a:r>
             <a:r>
               <a:rPr lang="en-US" sz="2200" dirty="0"/>
-              <a:t>Most flat types (except 1-room and Multi-Generation) are right-skewed with many outliers in the higher range of prices</a:t>
+              <a:t>’)</a:t>
+            </a:r>
+          </a:p>
+          <a:p>
+            <a:pPr lvl="1"/>
+            <a:r>
+              <a:rPr lang="en-US" sz="1800" dirty="0"/>
+              <a:t>Using the set() function and list comprehension respectively</a:t>
             </a:r>
           </a:p>
           <a:p>
             <a:r>
               <a:rPr lang="en-US" sz="2200" dirty="0"/>
-              <a:t>The reason for skewness could be due to recent sales of resale flats hitting the price point of S$1m</a:t>
-            </a:r>
+              <a:t>The lists were used to create a boxplot of the spread of HDB Resale Flat Prices by Flat Types</a:t>
+            </a:r>
+          </a:p>
+          <a:p>
+            <a:r>
+              <a:rPr lang="en-US" sz="2200" dirty="0"/>
+              <a:t>Design and label attributes were added to the boxplot for better </a:t>
+            </a:r>
+            <a:r>
+              <a:rPr lang="en-US" sz="2200"/>
+              <a:t>visualisation</a:t>
+            </a:r>
+            <a:endParaRPr lang="en-US" sz="2200" dirty="0"/>
           </a:p>
         </p:txBody>
       </p:sp>
@@ -7441,8 +7611,8 @@
         </p:blipFill>
         <p:spPr>
           <a:xfrm>
-            <a:off x="4654296" y="1668551"/>
-            <a:ext cx="6903720" cy="3520897"/>
+            <a:off x="8168998" y="4852857"/>
+            <a:ext cx="3080167" cy="1570885"/>
           </a:xfrm>
           <a:prstGeom prst="rect">
             <a:avLst/>
@@ -7649,6 +7819,36 @@
           </a:p>
         </p:txBody>
       </p:sp>
+      <p:pic>
+        <p:nvPicPr>
+          <p:cNvPr id="7" name="Picture 6" descr="Text&#10;&#10;Description automatically generated">
+            <a:extLst>
+              <a:ext uri="{FF2B5EF4-FFF2-40B4-BE49-F238E27FC236}">
+                <a16:creationId xmlns:a16="http://schemas.microsoft.com/office/drawing/2014/main" id="{7BAFC007-3150-A938-5A52-1377D651437D}"/>
+              </a:ext>
+            </a:extLst>
+          </p:cNvPr>
+          <p:cNvPicPr>
+            <a:picLocks noChangeAspect="1"/>
+          </p:cNvPicPr>
+          <p:nvPr/>
+        </p:nvPicPr>
+        <p:blipFill>
+          <a:blip r:embed="rId3"/>
+          <a:stretch>
+            <a:fillRect/>
+          </a:stretch>
+        </p:blipFill>
+        <p:spPr>
+          <a:xfrm>
+            <a:off x="7408505" y="243107"/>
+            <a:ext cx="4601154" cy="4457132"/>
+          </a:xfrm>
+          <a:prstGeom prst="rect">
+            <a:avLst/>
+          </a:prstGeom>
+        </p:spPr>
+      </p:pic>
     </p:spTree>
     <p:extLst>
       <p:ext uri="{BB962C8B-B14F-4D97-AF65-F5344CB8AC3E}">
@@ -7665,6 +7865,14 @@
 <file path=ppt/slides/slide9.xml><?xml version="1.0" encoding="utf-8"?>
 <p:sld xmlns:a="http://schemas.openxmlformats.org/drawingml/2006/main" xmlns:r="http://schemas.openxmlformats.org/officeDocument/2006/relationships" xmlns:p="http://schemas.openxmlformats.org/presentationml/2006/main">
   <p:cSld>
+    <p:bg>
+      <p:bgPr>
+        <a:solidFill>
+          <a:schemeClr val="bg1"/>
+        </a:solidFill>
+        <a:effectLst/>
+      </p:bgPr>
+    </p:bg>
     <p:spTree>
       <p:nvGrpSpPr>
         <p:cNvPr id="1" name=""/>
@@ -7679,12 +7887,72 @@
           <a:chExt cx="0" cy="0"/>
         </a:xfrm>
       </p:grpSpPr>
+      <p:sp useBgFill="1">
+        <p:nvSpPr>
+          <p:cNvPr id="10" name="Rectangle 9">
+            <a:extLst>
+              <a:ext uri="{FF2B5EF4-FFF2-40B4-BE49-F238E27FC236}">
+                <a16:creationId xmlns:a16="http://schemas.microsoft.com/office/drawing/2014/main" id="{2B97F24A-32CE-4C1C-A50D-3016B394DCFB}"/>
+              </a:ext>
+              <a:ext uri="{C183D7F6-B498-43B3-948B-1728B52AA6E4}">
+                <adec:decorative xmlns:adec="http://schemas.microsoft.com/office/drawing/2017/decorative" val="1"/>
+              </a:ext>
+            </a:extLst>
+          </p:cNvPr>
+          <p:cNvSpPr>
+            <a:spLocks noGrp="1" noRot="1" noChangeAspect="1" noMove="1" noResize="1" noEditPoints="1" noAdjustHandles="1" noChangeArrowheads="1" noChangeShapeType="1" noTextEdit="1"/>
+          </p:cNvSpPr>
+          <p:nvPr>
+            <p:extLst>
+              <p:ext uri="{386F3935-93C4-4BCD-93E2-E3B085C9AB24}">
+                <p16:designElem xmlns:p16="http://schemas.microsoft.com/office/powerpoint/2015/main" val="1"/>
+              </p:ext>
+            </p:extLst>
+          </p:nvPr>
+        </p:nvSpPr>
+        <p:spPr>
+          <a:xfrm>
+            <a:off x="0" y="0"/>
+            <a:ext cx="12192000" cy="6858000"/>
+          </a:xfrm>
+          <a:prstGeom prst="rect">
+            <a:avLst/>
+          </a:prstGeom>
+          <a:ln>
+            <a:noFill/>
+          </a:ln>
+        </p:spPr>
+        <p:style>
+          <a:lnRef idx="2">
+            <a:schemeClr val="accent1">
+              <a:shade val="50000"/>
+            </a:schemeClr>
+          </a:lnRef>
+          <a:fillRef idx="1">
+            <a:schemeClr val="accent1"/>
+          </a:fillRef>
+          <a:effectRef idx="0">
+            <a:schemeClr val="accent1"/>
+          </a:effectRef>
+          <a:fontRef idx="minor">
+            <a:schemeClr val="lt1"/>
+          </a:fontRef>
+        </p:style>
+        <p:txBody>
+          <a:bodyPr rtlCol="0" anchor="ctr"/>
+          <a:lstStyle/>
+          <a:p>
+            <a:pPr algn="ctr"/>
+            <a:endParaRPr lang="en-US"/>
+          </a:p>
+        </p:txBody>
+      </p:sp>
       <p:sp>
         <p:nvSpPr>
           <p:cNvPr id="2" name="Title 1">
             <a:extLst>
               <a:ext uri="{FF2B5EF4-FFF2-40B4-BE49-F238E27FC236}">
-                <a16:creationId xmlns:a16="http://schemas.microsoft.com/office/drawing/2014/main" id="{3A436372-877C-A4E4-296D-9DB75EA087C4}"/>
+                <a16:creationId xmlns:a16="http://schemas.microsoft.com/office/drawing/2014/main" id="{E786EFF3-C0AF-4F38-10AC-45840E943700}"/>
               </a:ext>
             </a:extLst>
           </p:cNvPr>
@@ -7697,15 +7965,293 @@
         </p:nvSpPr>
         <p:spPr>
           <a:xfrm>
-            <a:off x="311728" y="311087"/>
-            <a:ext cx="3581400" cy="2935874"/>
-          </a:xfrm>
-        </p:spPr>
-        <p:txBody>
-          <a:bodyPr/>
+            <a:off x="630936" y="639520"/>
+            <a:ext cx="3429000" cy="1719072"/>
+          </a:xfrm>
+        </p:spPr>
+        <p:txBody>
+          <a:bodyPr anchor="b">
+            <a:noAutofit/>
+          </a:bodyPr>
           <a:lstStyle/>
           <a:p>
-            <a:endParaRPr lang="en-US" dirty="0"/>
+            <a:r>
+              <a:rPr lang="en-US" dirty="0"/>
+              <a:t>HDB Resale Flat Prices</a:t>
+            </a:r>
+          </a:p>
+        </p:txBody>
+      </p:sp>
+      <p:sp>
+        <p:nvSpPr>
+          <p:cNvPr id="12" name="sketch line">
+            <a:extLst>
+              <a:ext uri="{FF2B5EF4-FFF2-40B4-BE49-F238E27FC236}">
+                <a16:creationId xmlns:a16="http://schemas.microsoft.com/office/drawing/2014/main" id="{CD8B4F24-440B-49E9-B85D-733523DC064B}"/>
+              </a:ext>
+              <a:ext uri="{C183D7F6-B498-43B3-948B-1728B52AA6E4}">
+                <adec:decorative xmlns:adec="http://schemas.microsoft.com/office/drawing/2017/decorative" val="1"/>
+              </a:ext>
+            </a:extLst>
+          </p:cNvPr>
+          <p:cNvSpPr>
+            <a:spLocks noGrp="1" noRot="1" noChangeAspect="1" noMove="1" noResize="1" noEditPoints="1" noAdjustHandles="1" noChangeArrowheads="1" noChangeShapeType="1" noTextEdit="1"/>
+          </p:cNvSpPr>
+          <p:nvPr>
+            <p:extLst>
+              <p:ext uri="{386F3935-93C4-4BCD-93E2-E3B085C9AB24}">
+                <p16:designElem xmlns:p16="http://schemas.microsoft.com/office/powerpoint/2015/main" val="1"/>
+              </p:ext>
+            </p:extLst>
+          </p:nvPr>
+        </p:nvSpPr>
+        <p:spPr>
+          <a:xfrm>
+            <a:off x="643278" y="2573756"/>
+            <a:ext cx="3255095" cy="18288"/>
+          </a:xfrm>
+          <a:custGeom>
+            <a:avLst/>
+            <a:gdLst>
+              <a:gd name="connsiteX0" fmla="*/ 0 w 3255095"/>
+              <a:gd name="connsiteY0" fmla="*/ 0 h 18288"/>
+              <a:gd name="connsiteX1" fmla="*/ 618468 w 3255095"/>
+              <a:gd name="connsiteY1" fmla="*/ 0 h 18288"/>
+              <a:gd name="connsiteX2" fmla="*/ 1269487 w 3255095"/>
+              <a:gd name="connsiteY2" fmla="*/ 0 h 18288"/>
+              <a:gd name="connsiteX3" fmla="*/ 1953057 w 3255095"/>
+              <a:gd name="connsiteY3" fmla="*/ 0 h 18288"/>
+              <a:gd name="connsiteX4" fmla="*/ 2636627 w 3255095"/>
+              <a:gd name="connsiteY4" fmla="*/ 0 h 18288"/>
+              <a:gd name="connsiteX5" fmla="*/ 3255095 w 3255095"/>
+              <a:gd name="connsiteY5" fmla="*/ 0 h 18288"/>
+              <a:gd name="connsiteX6" fmla="*/ 3255095 w 3255095"/>
+              <a:gd name="connsiteY6" fmla="*/ 18288 h 18288"/>
+              <a:gd name="connsiteX7" fmla="*/ 2538974 w 3255095"/>
+              <a:gd name="connsiteY7" fmla="*/ 18288 h 18288"/>
+              <a:gd name="connsiteX8" fmla="*/ 1822853 w 3255095"/>
+              <a:gd name="connsiteY8" fmla="*/ 18288 h 18288"/>
+              <a:gd name="connsiteX9" fmla="*/ 1171834 w 3255095"/>
+              <a:gd name="connsiteY9" fmla="*/ 18288 h 18288"/>
+              <a:gd name="connsiteX10" fmla="*/ 0 w 3255095"/>
+              <a:gd name="connsiteY10" fmla="*/ 18288 h 18288"/>
+              <a:gd name="connsiteX11" fmla="*/ 0 w 3255095"/>
+              <a:gd name="connsiteY11" fmla="*/ 0 h 18288"/>
+            </a:gdLst>
+            <a:ahLst/>
+            <a:cxnLst>
+              <a:cxn ang="0">
+                <a:pos x="connsiteX0" y="connsiteY0"/>
+              </a:cxn>
+              <a:cxn ang="0">
+                <a:pos x="connsiteX1" y="connsiteY1"/>
+              </a:cxn>
+              <a:cxn ang="0">
+                <a:pos x="connsiteX2" y="connsiteY2"/>
+              </a:cxn>
+              <a:cxn ang="0">
+                <a:pos x="connsiteX3" y="connsiteY3"/>
+              </a:cxn>
+              <a:cxn ang="0">
+                <a:pos x="connsiteX4" y="connsiteY4"/>
+              </a:cxn>
+              <a:cxn ang="0">
+                <a:pos x="connsiteX5" y="connsiteY5"/>
+              </a:cxn>
+              <a:cxn ang="0">
+                <a:pos x="connsiteX6" y="connsiteY6"/>
+              </a:cxn>
+              <a:cxn ang="0">
+                <a:pos x="connsiteX7" y="connsiteY7"/>
+              </a:cxn>
+              <a:cxn ang="0">
+                <a:pos x="connsiteX8" y="connsiteY8"/>
+              </a:cxn>
+              <a:cxn ang="0">
+                <a:pos x="connsiteX9" y="connsiteY9"/>
+              </a:cxn>
+              <a:cxn ang="0">
+                <a:pos x="connsiteX10" y="connsiteY10"/>
+              </a:cxn>
+              <a:cxn ang="0">
+                <a:pos x="connsiteX11" y="connsiteY11"/>
+              </a:cxn>
+            </a:cxnLst>
+            <a:rect l="l" t="t" r="r" b="b"/>
+            <a:pathLst>
+              <a:path w="3255095" h="18288" fill="none" extrusionOk="0">
+                <a:moveTo>
+                  <a:pt x="0" y="0"/>
+                </a:moveTo>
+                <a:cubicBezTo>
+                  <a:pt x="240201" y="-22123"/>
+                  <a:pt x="462021" y="-19623"/>
+                  <a:pt x="618468" y="0"/>
+                </a:cubicBezTo>
+                <a:cubicBezTo>
+                  <a:pt x="774915" y="19623"/>
+                  <a:pt x="974734" y="2035"/>
+                  <a:pt x="1269487" y="0"/>
+                </a:cubicBezTo>
+                <a:cubicBezTo>
+                  <a:pt x="1564240" y="-2035"/>
+                  <a:pt x="1733579" y="10639"/>
+                  <a:pt x="1953057" y="0"/>
+                </a:cubicBezTo>
+                <a:cubicBezTo>
+                  <a:pt x="2172535" y="-10639"/>
+                  <a:pt x="2453962" y="14018"/>
+                  <a:pt x="2636627" y="0"/>
+                </a:cubicBezTo>
+                <a:cubicBezTo>
+                  <a:pt x="2819292" y="-14018"/>
+                  <a:pt x="3121375" y="5399"/>
+                  <a:pt x="3255095" y="0"/>
+                </a:cubicBezTo>
+                <a:cubicBezTo>
+                  <a:pt x="3254386" y="8157"/>
+                  <a:pt x="3254682" y="12125"/>
+                  <a:pt x="3255095" y="18288"/>
+                </a:cubicBezTo>
+                <a:cubicBezTo>
+                  <a:pt x="3088545" y="23203"/>
+                  <a:pt x="2687475" y="7419"/>
+                  <a:pt x="2538974" y="18288"/>
+                </a:cubicBezTo>
+                <a:cubicBezTo>
+                  <a:pt x="2390473" y="29157"/>
+                  <a:pt x="2137381" y="-8959"/>
+                  <a:pt x="1822853" y="18288"/>
+                </a:cubicBezTo>
+                <a:cubicBezTo>
+                  <a:pt x="1508325" y="45535"/>
+                  <a:pt x="1466437" y="20385"/>
+                  <a:pt x="1171834" y="18288"/>
+                </a:cubicBezTo>
+                <a:cubicBezTo>
+                  <a:pt x="877231" y="16191"/>
+                  <a:pt x="561097" y="37643"/>
+                  <a:pt x="0" y="18288"/>
+                </a:cubicBezTo>
+                <a:cubicBezTo>
+                  <a:pt x="-46" y="12483"/>
+                  <a:pt x="-203" y="6491"/>
+                  <a:pt x="0" y="0"/>
+                </a:cubicBezTo>
+                <a:close/>
+              </a:path>
+              <a:path w="3255095" h="18288" stroke="0" extrusionOk="0">
+                <a:moveTo>
+                  <a:pt x="0" y="0"/>
+                </a:moveTo>
+                <a:cubicBezTo>
+                  <a:pt x="291965" y="19429"/>
+                  <a:pt x="363155" y="8568"/>
+                  <a:pt x="618468" y="0"/>
+                </a:cubicBezTo>
+                <a:cubicBezTo>
+                  <a:pt x="873781" y="-8568"/>
+                  <a:pt x="904459" y="-19505"/>
+                  <a:pt x="1171834" y="0"/>
+                </a:cubicBezTo>
+                <a:cubicBezTo>
+                  <a:pt x="1439209" y="19505"/>
+                  <a:pt x="1744369" y="9790"/>
+                  <a:pt x="1887955" y="0"/>
+                </a:cubicBezTo>
+                <a:cubicBezTo>
+                  <a:pt x="2031541" y="-9790"/>
+                  <a:pt x="2346378" y="21240"/>
+                  <a:pt x="2506423" y="0"/>
+                </a:cubicBezTo>
+                <a:cubicBezTo>
+                  <a:pt x="2666468" y="-21240"/>
+                  <a:pt x="2990257" y="30414"/>
+                  <a:pt x="3255095" y="0"/>
+                </a:cubicBezTo>
+                <a:cubicBezTo>
+                  <a:pt x="3254831" y="4493"/>
+                  <a:pt x="3255479" y="9472"/>
+                  <a:pt x="3255095" y="18288"/>
+                </a:cubicBezTo>
+                <a:cubicBezTo>
+                  <a:pt x="3120743" y="16690"/>
+                  <a:pt x="2759628" y="42462"/>
+                  <a:pt x="2604076" y="18288"/>
+                </a:cubicBezTo>
+                <a:cubicBezTo>
+                  <a:pt x="2448524" y="-5886"/>
+                  <a:pt x="2184336" y="19599"/>
+                  <a:pt x="1887955" y="18288"/>
+                </a:cubicBezTo>
+                <a:cubicBezTo>
+                  <a:pt x="1591574" y="16977"/>
+                  <a:pt x="1548845" y="6870"/>
+                  <a:pt x="1334589" y="18288"/>
+                </a:cubicBezTo>
+                <a:cubicBezTo>
+                  <a:pt x="1120333" y="29706"/>
+                  <a:pt x="996014" y="9662"/>
+                  <a:pt x="683570" y="18288"/>
+                </a:cubicBezTo>
+                <a:cubicBezTo>
+                  <a:pt x="371126" y="26914"/>
+                  <a:pt x="198687" y="16167"/>
+                  <a:pt x="0" y="18288"/>
+                </a:cubicBezTo>
+                <a:cubicBezTo>
+                  <a:pt x="843" y="9577"/>
+                  <a:pt x="371" y="6900"/>
+                  <a:pt x="0" y="0"/>
+                </a:cubicBezTo>
+                <a:close/>
+              </a:path>
+            </a:pathLst>
+          </a:custGeom>
+          <a:solidFill>
+            <a:schemeClr val="accent2"/>
+          </a:solidFill>
+          <a:ln w="38100" cap="rnd">
+            <a:solidFill>
+              <a:schemeClr val="accent2"/>
+            </a:solidFill>
+            <a:round/>
+            <a:extLst>
+              <a:ext uri="{C807C97D-BFC1-408E-A445-0C87EB9F89A2}">
+                <ask:lineSketchStyleProps xmlns:ask="http://schemas.microsoft.com/office/drawing/2018/sketchyshapes" sd="1219033472">
+                  <a:prstGeom prst="rect">
+                    <a:avLst/>
+                  </a:prstGeom>
+                  <ask:type>
+                    <ask:lineSketchFreehand/>
+                  </ask:type>
+                </ask:lineSketchStyleProps>
+              </a:ext>
+            </a:extLst>
+          </a:ln>
+        </p:spPr>
+        <p:style>
+          <a:lnRef idx="2">
+            <a:schemeClr val="accent1">
+              <a:shade val="50000"/>
+            </a:schemeClr>
+          </a:lnRef>
+          <a:fillRef idx="1">
+            <a:schemeClr val="accent1"/>
+          </a:fillRef>
+          <a:effectRef idx="0">
+            <a:schemeClr val="accent1"/>
+          </a:effectRef>
+          <a:fontRef idx="minor">
+            <a:schemeClr val="lt1"/>
+          </a:fontRef>
+        </p:style>
+        <p:txBody>
+          <a:bodyPr rtlCol="0" anchor="ctr"/>
+          <a:lstStyle/>
+          <a:p>
+            <a:pPr algn="ctr"/>
+            <a:endParaRPr lang="en-US"/>
           </a:p>
         </p:txBody>
       </p:sp>
@@ -7714,7 +8260,7 @@
           <p:cNvPr id="3" name="Content Placeholder 2">
             <a:extLst>
               <a:ext uri="{FF2B5EF4-FFF2-40B4-BE49-F238E27FC236}">
-                <a16:creationId xmlns:a16="http://schemas.microsoft.com/office/drawing/2014/main" id="{2BC1008E-1EE7-B20A-4B9F-97C7A4610B77}"/>
+                <a16:creationId xmlns:a16="http://schemas.microsoft.com/office/drawing/2014/main" id="{748D97A4-F501-7092-6120-024C33323899}"/>
               </a:ext>
             </a:extLst>
           </p:cNvPr>
@@ -7727,54 +8273,41 @@
         </p:nvSpPr>
         <p:spPr>
           <a:xfrm>
-            <a:off x="4107872" y="335621"/>
-            <a:ext cx="7571851" cy="2935874"/>
-          </a:xfrm>
-        </p:spPr>
-        <p:txBody>
-          <a:bodyPr/>
+            <a:off x="630936" y="2807208"/>
+            <a:ext cx="3429000" cy="3410712"/>
+          </a:xfrm>
+        </p:spPr>
+        <p:txBody>
+          <a:bodyPr anchor="t">
+            <a:normAutofit fontScale="92500" lnSpcReduction="20000"/>
+          </a:bodyPr>
           <a:lstStyle/>
           <a:p>
-            <a:endParaRPr lang="en-US" dirty="0"/>
-          </a:p>
-        </p:txBody>
-      </p:sp>
-      <p:sp>
-        <p:nvSpPr>
-          <p:cNvPr id="4" name="Slide Number Placeholder 3">
-            <a:extLst>
-              <a:ext uri="{FF2B5EF4-FFF2-40B4-BE49-F238E27FC236}">
-                <a16:creationId xmlns:a16="http://schemas.microsoft.com/office/drawing/2014/main" id="{D3AD5A38-4171-F2D2-6DD8-CCE83CC2BFB8}"/>
-              </a:ext>
-            </a:extLst>
-          </p:cNvPr>
-          <p:cNvSpPr>
-            <a:spLocks noGrp="1"/>
-          </p:cNvSpPr>
-          <p:nvPr>
-            <p:ph type="sldNum" sz="quarter" idx="12"/>
-          </p:nvPr>
-        </p:nvSpPr>
-        <p:spPr/>
-        <p:txBody>
-          <a:bodyPr/>
-          <a:lstStyle/>
-          <a:p>
-            <a:fld id="{E6FE59FF-D9EB-D545-90E6-CE90D1694C9B}" type="slidenum">
-              <a:rPr lang="en-US" smtClean="0"/>
-              <a:pPr/>
-              <a:t>9</a:t>
-            </a:fld>
-            <a:endParaRPr lang="en-US" dirty="0"/>
+            <a:r>
+              <a:rPr lang="en-US" sz="2200" dirty="0"/>
+              <a:t>As expected, the larger flat types see higher median prices than those of smaller types</a:t>
+            </a:r>
+          </a:p>
+          <a:p>
+            <a:r>
+              <a:rPr lang="en-US" sz="2200" dirty="0"/>
+              <a:t>Most flat types (except 1-room and Multi-Generation) are right-skewed with many outliers in the higher range of prices</a:t>
+            </a:r>
+          </a:p>
+          <a:p>
+            <a:r>
+              <a:rPr lang="en-US" sz="2200" dirty="0"/>
+              <a:t>The reason for skewness could be due to recent sales of resale flats hitting the price point of S$1m</a:t>
+            </a:r>
           </a:p>
         </p:txBody>
       </p:sp>
       <p:pic>
         <p:nvPicPr>
-          <p:cNvPr id="6" name="Picture 5">
-            <a:extLst>
-              <a:ext uri="{FF2B5EF4-FFF2-40B4-BE49-F238E27FC236}">
-                <a16:creationId xmlns:a16="http://schemas.microsoft.com/office/drawing/2014/main" id="{4AD7523C-0DFB-0CCD-C702-469BF5998A77}"/>
+          <p:cNvPr id="5" name="Picture 4" descr="Chart, waterfall chart&#10;&#10;Description automatically generated">
+            <a:extLst>
+              <a:ext uri="{FF2B5EF4-FFF2-40B4-BE49-F238E27FC236}">
+                <a16:creationId xmlns:a16="http://schemas.microsoft.com/office/drawing/2014/main" id="{A1E48EF9-7B30-2298-1CA4-A7B445B9E451}"/>
               </a:ext>
             </a:extLst>
           </p:cNvPr>
@@ -7785,23 +8318,224 @@
         </p:nvPicPr>
         <p:blipFill>
           <a:blip r:embed="rId2"/>
-          <a:srcRect/>
-          <a:stretch/>
+          <a:stretch>
+            <a:fillRect/>
+          </a:stretch>
         </p:blipFill>
         <p:spPr>
           <a:xfrm>
-            <a:off x="435584" y="3586505"/>
-            <a:ext cx="11320832" cy="2767797"/>
+            <a:off x="4654296" y="1668551"/>
+            <a:ext cx="6903720" cy="3520897"/>
           </a:xfrm>
           <a:prstGeom prst="rect">
             <a:avLst/>
           </a:prstGeom>
         </p:spPr>
       </p:pic>
+      <p:sp>
+        <p:nvSpPr>
+          <p:cNvPr id="9" name="Rectangle 8">
+            <a:extLst>
+              <a:ext uri="{FF2B5EF4-FFF2-40B4-BE49-F238E27FC236}">
+                <a16:creationId xmlns:a16="http://schemas.microsoft.com/office/drawing/2014/main" id="{EBED2B7A-932F-C667-A3EA-2E1B4690BB66}"/>
+              </a:ext>
+            </a:extLst>
+          </p:cNvPr>
+          <p:cNvSpPr/>
+          <p:nvPr/>
+        </p:nvSpPr>
+        <p:spPr>
+          <a:xfrm>
+            <a:off x="0" y="6643561"/>
+            <a:ext cx="12192000" cy="214439"/>
+          </a:xfrm>
+          <a:prstGeom prst="rect">
+            <a:avLst/>
+          </a:prstGeom>
+          <a:solidFill>
+            <a:srgbClr val="E93327"/>
+          </a:solidFill>
+          <a:ln>
+            <a:solidFill>
+              <a:srgbClr val="E93327"/>
+            </a:solidFill>
+          </a:ln>
+        </p:spPr>
+        <p:style>
+          <a:lnRef idx="2">
+            <a:schemeClr val="accent1">
+              <a:shade val="50000"/>
+            </a:schemeClr>
+          </a:lnRef>
+          <a:fillRef idx="1">
+            <a:schemeClr val="accent1"/>
+          </a:fillRef>
+          <a:effectRef idx="0">
+            <a:schemeClr val="accent1"/>
+          </a:effectRef>
+          <a:fontRef idx="minor">
+            <a:schemeClr val="lt1"/>
+          </a:fontRef>
+        </p:style>
+        <p:txBody>
+          <a:bodyPr rtlCol="0" anchor="ctr"/>
+          <a:lstStyle/>
+          <a:p>
+            <a:pPr algn="ctr"/>
+            <a:endParaRPr lang="en-US">
+              <a:latin typeface=""/>
+            </a:endParaRPr>
+          </a:p>
+        </p:txBody>
+      </p:sp>
+      <p:sp>
+        <p:nvSpPr>
+          <p:cNvPr id="11" name="Rectangle 10">
+            <a:extLst>
+              <a:ext uri="{FF2B5EF4-FFF2-40B4-BE49-F238E27FC236}">
+                <a16:creationId xmlns:a16="http://schemas.microsoft.com/office/drawing/2014/main" id="{E0F62F3E-0D2D-81E9-6B11-CA57FB0A5BCC}"/>
+              </a:ext>
+            </a:extLst>
+          </p:cNvPr>
+          <p:cNvSpPr/>
+          <p:nvPr/>
+        </p:nvSpPr>
+        <p:spPr>
+          <a:xfrm>
+            <a:off x="0" y="-12572"/>
+            <a:ext cx="12192000" cy="53034"/>
+          </a:xfrm>
+          <a:prstGeom prst="rect">
+            <a:avLst/>
+          </a:prstGeom>
+          <a:solidFill>
+            <a:srgbClr val="E93327"/>
+          </a:solidFill>
+          <a:ln>
+            <a:solidFill>
+              <a:srgbClr val="E93327"/>
+            </a:solidFill>
+          </a:ln>
+        </p:spPr>
+        <p:style>
+          <a:lnRef idx="2">
+            <a:schemeClr val="accent1">
+              <a:shade val="50000"/>
+            </a:schemeClr>
+          </a:lnRef>
+          <a:fillRef idx="1">
+            <a:schemeClr val="accent1"/>
+          </a:fillRef>
+          <a:effectRef idx="0">
+            <a:schemeClr val="accent1"/>
+          </a:effectRef>
+          <a:fontRef idx="minor">
+            <a:schemeClr val="lt1"/>
+          </a:fontRef>
+        </p:style>
+        <p:txBody>
+          <a:bodyPr rtlCol="0" anchor="ctr"/>
+          <a:lstStyle/>
+          <a:p>
+            <a:pPr algn="ctr"/>
+            <a:endParaRPr lang="en-US"/>
+          </a:p>
+        </p:txBody>
+      </p:sp>
+      <p:sp>
+        <p:nvSpPr>
+          <p:cNvPr id="13" name="TextBox 12">
+            <a:extLst>
+              <a:ext uri="{FF2B5EF4-FFF2-40B4-BE49-F238E27FC236}">
+                <a16:creationId xmlns:a16="http://schemas.microsoft.com/office/drawing/2014/main" id="{17C01FC7-82F3-57D5-410D-56C9181DA0C3}"/>
+              </a:ext>
+            </a:extLst>
+          </p:cNvPr>
+          <p:cNvSpPr txBox="1"/>
+          <p:nvPr/>
+        </p:nvSpPr>
+        <p:spPr>
+          <a:xfrm>
+            <a:off x="11506873" y="6424490"/>
+            <a:ext cx="752560" cy="246221"/>
+          </a:xfrm>
+          <a:prstGeom prst="rect">
+            <a:avLst/>
+          </a:prstGeom>
+          <a:noFill/>
+        </p:spPr>
+        <p:txBody>
+          <a:bodyPr wrap="square" rtlCol="0">
+            <a:spAutoFit/>
+          </a:bodyPr>
+          <a:lstStyle/>
+          <a:p>
+            <a:pPr algn="ctr"/>
+            <a:r>
+              <a:rPr lang="en-US" sz="1000" dirty="0">
+                <a:solidFill>
+                  <a:schemeClr val="tx1">
+                    <a:lumMod val="50000"/>
+                    <a:lumOff val="50000"/>
+                  </a:schemeClr>
+                </a:solidFill>
+                <a:latin typeface=""/>
+              </a:rPr>
+              <a:t>Iylia Hutta</a:t>
+            </a:r>
+          </a:p>
+        </p:txBody>
+      </p:sp>
+      <p:sp>
+        <p:nvSpPr>
+          <p:cNvPr id="4" name="Slide Number Placeholder 3">
+            <a:extLst>
+              <a:ext uri="{FF2B5EF4-FFF2-40B4-BE49-F238E27FC236}">
+                <a16:creationId xmlns:a16="http://schemas.microsoft.com/office/drawing/2014/main" id="{A02034CE-CFAC-700B-73D8-D4AB879FFD30}"/>
+              </a:ext>
+            </a:extLst>
+          </p:cNvPr>
+          <p:cNvSpPr>
+            <a:spLocks noGrp="1"/>
+          </p:cNvSpPr>
+          <p:nvPr>
+            <p:ph type="sldNum" sz="quarter" idx="12"/>
+          </p:nvPr>
+        </p:nvSpPr>
+        <p:spPr>
+          <a:xfrm>
+            <a:off x="9448800" y="6634974"/>
+            <a:ext cx="2743200" cy="365125"/>
+          </a:xfrm>
+        </p:spPr>
+        <p:txBody>
+          <a:bodyPr>
+            <a:normAutofit/>
+          </a:bodyPr>
+          <a:lstStyle/>
+          <a:p>
+            <a:pPr>
+              <a:spcAft>
+                <a:spcPts val="600"/>
+              </a:spcAft>
+            </a:pPr>
+            <a:fld id="{E6FE59FF-D9EB-D545-90E6-CE90D1694C9B}" type="slidenum">
+              <a:rPr lang="en-US" smtClean="0"/>
+              <a:pPr>
+                <a:spcAft>
+                  <a:spcPts val="600"/>
+                </a:spcAft>
+              </a:pPr>
+              <a:t>9</a:t>
+            </a:fld>
+            <a:endParaRPr lang="en-US"/>
+          </a:p>
+        </p:txBody>
+      </p:sp>
     </p:spTree>
     <p:extLst>
       <p:ext uri="{BB962C8B-B14F-4D97-AF65-F5344CB8AC3E}">
-        <p14:creationId xmlns:p14="http://schemas.microsoft.com/office/powerpoint/2010/main" val="2774634539"/>
+        <p14:creationId xmlns:p14="http://schemas.microsoft.com/office/powerpoint/2010/main" val="2513345184"/>
       </p:ext>
     </p:extLst>
   </p:cSld>

</xml_diff>

<commit_message>
resale price and sales slides and code snippet
</commit_message>
<xml_diff>
--- a/CA1/CA1 Slides.pptx
+++ b/CA1/CA1 Slides.pptx
@@ -5,7 +5,7 @@
     <p:sldMasterId id="2147483648" r:id="rId1"/>
   </p:sldMasterIdLst>
   <p:notesMasterIdLst>
-    <p:notesMasterId r:id="rId16"/>
+    <p:notesMasterId r:id="rId18"/>
   </p:notesMasterIdLst>
   <p:sldIdLst>
     <p:sldId id="256" r:id="rId2"/>
@@ -18,10 +18,12 @@
     <p:sldId id="264" r:id="rId9"/>
     <p:sldId id="271" r:id="rId10"/>
     <p:sldId id="270" r:id="rId11"/>
-    <p:sldId id="269" r:id="rId12"/>
-    <p:sldId id="266" r:id="rId13"/>
-    <p:sldId id="267" r:id="rId14"/>
-    <p:sldId id="268" r:id="rId15"/>
+    <p:sldId id="272" r:id="rId12"/>
+    <p:sldId id="273" r:id="rId13"/>
+    <p:sldId id="269" r:id="rId14"/>
+    <p:sldId id="266" r:id="rId15"/>
+    <p:sldId id="267" r:id="rId16"/>
+    <p:sldId id="268" r:id="rId17"/>
   </p:sldIdLst>
   <p:sldSz cx="12192000" cy="6858000"/>
   <p:notesSz cx="6858000" cy="9144000"/>
@@ -476,6 +478,174 @@
     </a:lvl9pPr>
   </p:notesStyle>
 </p:notesMaster>
+</file>
+
+<file path=ppt/notesSlides/notesSlide1.xml><?xml version="1.0" encoding="utf-8"?>
+<p:notes xmlns:a="http://schemas.openxmlformats.org/drawingml/2006/main" xmlns:r="http://schemas.openxmlformats.org/officeDocument/2006/relationships" xmlns:p="http://schemas.openxmlformats.org/presentationml/2006/main">
+  <p:cSld>
+    <p:spTree>
+      <p:nvGrpSpPr>
+        <p:cNvPr id="1" name=""/>
+        <p:cNvGrpSpPr/>
+        <p:nvPr/>
+      </p:nvGrpSpPr>
+      <p:grpSpPr>
+        <a:xfrm>
+          <a:off x="0" y="0"/>
+          <a:ext cx="0" cy="0"/>
+          <a:chOff x="0" y="0"/>
+          <a:chExt cx="0" cy="0"/>
+        </a:xfrm>
+      </p:grpSpPr>
+      <p:sp>
+        <p:nvSpPr>
+          <p:cNvPr id="2" name="Slide Image Placeholder 1"/>
+          <p:cNvSpPr>
+            <a:spLocks noGrp="1" noRot="1" noChangeAspect="1"/>
+          </p:cNvSpPr>
+          <p:nvPr>
+            <p:ph type="sldImg"/>
+          </p:nvPr>
+        </p:nvSpPr>
+        <p:spPr/>
+      </p:sp>
+      <p:sp>
+        <p:nvSpPr>
+          <p:cNvPr id="3" name="Notes Placeholder 2"/>
+          <p:cNvSpPr>
+            <a:spLocks noGrp="1"/>
+          </p:cNvSpPr>
+          <p:nvPr>
+            <p:ph type="body" idx="1"/>
+          </p:nvPr>
+        </p:nvSpPr>
+        <p:spPr/>
+        <p:txBody>
+          <a:bodyPr/>
+          <a:lstStyle/>
+          <a:p>
+            <a:endParaRPr lang="en-US" dirty="0"/>
+          </a:p>
+        </p:txBody>
+      </p:sp>
+      <p:sp>
+        <p:nvSpPr>
+          <p:cNvPr id="4" name="Slide Number Placeholder 3"/>
+          <p:cNvSpPr>
+            <a:spLocks noGrp="1"/>
+          </p:cNvSpPr>
+          <p:nvPr>
+            <p:ph type="sldNum" sz="quarter" idx="5"/>
+          </p:nvPr>
+        </p:nvSpPr>
+        <p:spPr/>
+        <p:txBody>
+          <a:bodyPr/>
+          <a:lstStyle/>
+          <a:p>
+            <a:fld id="{13A557AE-D098-A94B-A53F-DC4DD24DCDC8}" type="slidenum">
+              <a:rPr lang="en-US" smtClean="0"/>
+              <a:t>11</a:t>
+            </a:fld>
+            <a:endParaRPr lang="en-US"/>
+          </a:p>
+        </p:txBody>
+      </p:sp>
+    </p:spTree>
+    <p:extLst>
+      <p:ext uri="{BB962C8B-B14F-4D97-AF65-F5344CB8AC3E}">
+        <p14:creationId xmlns:p14="http://schemas.microsoft.com/office/powerpoint/2010/main" val="4280924427"/>
+      </p:ext>
+    </p:extLst>
+  </p:cSld>
+  <p:clrMapOvr>
+    <a:masterClrMapping/>
+  </p:clrMapOvr>
+</p:notes>
+</file>
+
+<file path=ppt/notesSlides/notesSlide2.xml><?xml version="1.0" encoding="utf-8"?>
+<p:notes xmlns:a="http://schemas.openxmlformats.org/drawingml/2006/main" xmlns:r="http://schemas.openxmlformats.org/officeDocument/2006/relationships" xmlns:p="http://schemas.openxmlformats.org/presentationml/2006/main">
+  <p:cSld>
+    <p:spTree>
+      <p:nvGrpSpPr>
+        <p:cNvPr id="1" name=""/>
+        <p:cNvGrpSpPr/>
+        <p:nvPr/>
+      </p:nvGrpSpPr>
+      <p:grpSpPr>
+        <a:xfrm>
+          <a:off x="0" y="0"/>
+          <a:ext cx="0" cy="0"/>
+          <a:chOff x="0" y="0"/>
+          <a:chExt cx="0" cy="0"/>
+        </a:xfrm>
+      </p:grpSpPr>
+      <p:sp>
+        <p:nvSpPr>
+          <p:cNvPr id="2" name="Slide Image Placeholder 1"/>
+          <p:cNvSpPr>
+            <a:spLocks noGrp="1" noRot="1" noChangeAspect="1"/>
+          </p:cNvSpPr>
+          <p:nvPr>
+            <p:ph type="sldImg"/>
+          </p:nvPr>
+        </p:nvSpPr>
+        <p:spPr/>
+      </p:sp>
+      <p:sp>
+        <p:nvSpPr>
+          <p:cNvPr id="3" name="Notes Placeholder 2"/>
+          <p:cNvSpPr>
+            <a:spLocks noGrp="1"/>
+          </p:cNvSpPr>
+          <p:nvPr>
+            <p:ph type="body" idx="1"/>
+          </p:nvPr>
+        </p:nvSpPr>
+        <p:spPr/>
+        <p:txBody>
+          <a:bodyPr/>
+          <a:lstStyle/>
+          <a:p>
+            <a:endParaRPr lang="en-US" dirty="0"/>
+          </a:p>
+        </p:txBody>
+      </p:sp>
+      <p:sp>
+        <p:nvSpPr>
+          <p:cNvPr id="4" name="Slide Number Placeholder 3"/>
+          <p:cNvSpPr>
+            <a:spLocks noGrp="1"/>
+          </p:cNvSpPr>
+          <p:nvPr>
+            <p:ph type="sldNum" sz="quarter" idx="5"/>
+          </p:nvPr>
+        </p:nvSpPr>
+        <p:spPr/>
+        <p:txBody>
+          <a:bodyPr/>
+          <a:lstStyle/>
+          <a:p>
+            <a:fld id="{13A557AE-D098-A94B-A53F-DC4DD24DCDC8}" type="slidenum">
+              <a:rPr lang="en-US" smtClean="0"/>
+              <a:t>12</a:t>
+            </a:fld>
+            <a:endParaRPr lang="en-US"/>
+          </a:p>
+        </p:txBody>
+      </p:sp>
+    </p:spTree>
+    <p:extLst>
+      <p:ext uri="{BB962C8B-B14F-4D97-AF65-F5344CB8AC3E}">
+        <p14:creationId xmlns:p14="http://schemas.microsoft.com/office/powerpoint/2010/main" val="990307732"/>
+      </p:ext>
+    </p:extLst>
+  </p:cSld>
+  <p:clrMapOvr>
+    <a:masterClrMapping/>
+  </p:clrMapOvr>
+</p:notes>
 </file>
 
 <file path=ppt/slideLayouts/slideLayout1.xml><?xml version="1.0" encoding="utf-8"?>
@@ -5057,15 +5227,20 @@
         </p:nvSpPr>
         <p:spPr>
           <a:xfrm>
-            <a:off x="311728" y="311087"/>
-            <a:ext cx="3581400" cy="2935874"/>
-          </a:xfrm>
-        </p:spPr>
-        <p:txBody>
-          <a:bodyPr/>
-          <a:lstStyle/>
-          <a:p>
-            <a:endParaRPr lang="en-US" dirty="0"/>
+            <a:off x="311727" y="311087"/>
+            <a:ext cx="5360939" cy="1576980"/>
+          </a:xfrm>
+        </p:spPr>
+        <p:txBody>
+          <a:bodyPr>
+            <a:normAutofit/>
+          </a:bodyPr>
+          <a:lstStyle/>
+          <a:p>
+            <a:r>
+              <a:rPr lang="en-US" dirty="0"/>
+              <a:t>HDB Resale Flat Prices and Sales</a:t>
+            </a:r>
           </a:p>
         </p:txBody>
       </p:sp>
@@ -5087,15 +5262,179 @@
         </p:nvSpPr>
         <p:spPr>
           <a:xfrm>
-            <a:off x="4107872" y="335621"/>
-            <a:ext cx="7571851" cy="2935874"/>
-          </a:xfrm>
-        </p:spPr>
-        <p:txBody>
-          <a:bodyPr/>
-          <a:lstStyle/>
-          <a:p>
-            <a:endParaRPr lang="en-US" dirty="0"/>
+            <a:off x="311729" y="2012020"/>
+            <a:ext cx="5479471" cy="4342281"/>
+          </a:xfrm>
+        </p:spPr>
+        <p:txBody>
+          <a:bodyPr>
+            <a:normAutofit fontScale="70000" lnSpcReduction="20000"/>
+          </a:bodyPr>
+          <a:lstStyle/>
+          <a:p>
+            <a:r>
+              <a:rPr lang="en-US" dirty="0"/>
+              <a:t>List comprehension was used to create lists of the following:</a:t>
+            </a:r>
+          </a:p>
+          <a:p>
+            <a:pPr lvl="1"/>
+            <a:r>
+              <a:rPr lang="en-US" dirty="0"/>
+              <a:t> Months and years labels (‘</a:t>
+            </a:r>
+            <a:r>
+              <a:rPr lang="en-US" dirty="0" err="1"/>
+              <a:t>labels_ordered</a:t>
+            </a:r>
+            <a:r>
+              <a:rPr lang="en-US" dirty="0"/>
+              <a:t>’)</a:t>
+            </a:r>
+          </a:p>
+          <a:p>
+            <a:pPr lvl="1"/>
+            <a:r>
+              <a:rPr lang="en-US" dirty="0">
+                <a:solidFill>
+                  <a:srgbClr val="0000FF"/>
+                </a:solidFill>
+              </a:rPr>
+              <a:t>Count of Resale Flat Sales (‘</a:t>
+            </a:r>
+            <a:r>
+              <a:rPr lang="en-US" dirty="0" err="1">
+                <a:solidFill>
+                  <a:srgbClr val="0000FF"/>
+                </a:solidFill>
+              </a:rPr>
+              <a:t>count_sales</a:t>
+            </a:r>
+            <a:r>
+              <a:rPr lang="en-US" dirty="0">
+                <a:solidFill>
+                  <a:srgbClr val="0000FF"/>
+                </a:solidFill>
+              </a:rPr>
+              <a:t>’)</a:t>
+            </a:r>
+          </a:p>
+          <a:p>
+            <a:pPr lvl="1"/>
+            <a:r>
+              <a:rPr lang="en-US" dirty="0">
+                <a:solidFill>
+                  <a:srgbClr val="E93327"/>
+                </a:solidFill>
+              </a:rPr>
+              <a:t>Median Resale Flat Prices per month (‘</a:t>
+            </a:r>
+            <a:r>
+              <a:rPr lang="en-US" dirty="0" err="1">
+                <a:solidFill>
+                  <a:srgbClr val="E93327"/>
+                </a:solidFill>
+              </a:rPr>
+              <a:t>prices_median</a:t>
+            </a:r>
+            <a:r>
+              <a:rPr lang="en-US" dirty="0">
+                <a:solidFill>
+                  <a:srgbClr val="E93327"/>
+                </a:solidFill>
+              </a:rPr>
+              <a:t>’)</a:t>
+            </a:r>
+          </a:p>
+          <a:p>
+            <a:pPr lvl="2"/>
+            <a:r>
+              <a:rPr lang="en-US" dirty="0"/>
+              <a:t>Median was used as the boxplot earlier showed that prices were skewed</a:t>
+            </a:r>
+          </a:p>
+          <a:p>
+            <a:r>
+              <a:rPr lang="en-US" dirty="0"/>
+              <a:t>Using the zip() function, the labels were combined with the other two lists to create 2D-arrays to create </a:t>
+            </a:r>
+            <a:r>
+              <a:rPr lang="en-US" dirty="0">
+                <a:solidFill>
+                  <a:srgbClr val="0000FF"/>
+                </a:solidFill>
+              </a:rPr>
+              <a:t>bar (‘</a:t>
+            </a:r>
+            <a:r>
+              <a:rPr lang="en-US" dirty="0" err="1">
+                <a:solidFill>
+                  <a:srgbClr val="0000FF"/>
+                </a:solidFill>
+              </a:rPr>
+              <a:t>month_count_sales</a:t>
+            </a:r>
+            <a:r>
+              <a:rPr lang="en-US" dirty="0">
+                <a:solidFill>
+                  <a:srgbClr val="0000FF"/>
+                </a:solidFill>
+              </a:rPr>
+              <a:t>’)</a:t>
+            </a:r>
+            <a:r>
+              <a:rPr lang="en-US" dirty="0"/>
+              <a:t> and </a:t>
+            </a:r>
+            <a:r>
+              <a:rPr lang="en-US" dirty="0">
+                <a:solidFill>
+                  <a:srgbClr val="FF0000"/>
+                </a:solidFill>
+              </a:rPr>
+              <a:t>line (‘</a:t>
+            </a:r>
+            <a:r>
+              <a:rPr lang="en-US" dirty="0" err="1">
+                <a:solidFill>
+                  <a:srgbClr val="FF0000"/>
+                </a:solidFill>
+              </a:rPr>
+              <a:t>month_prices_median</a:t>
+            </a:r>
+            <a:r>
+              <a:rPr lang="en-US" dirty="0">
+                <a:solidFill>
+                  <a:srgbClr val="FF0000"/>
+                </a:solidFill>
+              </a:rPr>
+              <a:t>’) </a:t>
+            </a:r>
+            <a:r>
+              <a:rPr lang="en-US" dirty="0"/>
+              <a:t>plots respectively.</a:t>
+            </a:r>
+          </a:p>
+          <a:p>
+            <a:r>
+              <a:rPr lang="en-US" dirty="0"/>
+              <a:t>The </a:t>
+            </a:r>
+            <a:r>
+              <a:rPr lang="en-US" dirty="0" err="1"/>
+              <a:t>ax.twinx</a:t>
+            </a:r>
+            <a:r>
+              <a:rPr lang="en-US" dirty="0"/>
+              <a:t>() function was used to create the line plot overlayed on the bar plot, with secondary y-axis.</a:t>
+            </a:r>
+          </a:p>
+          <a:p>
+            <a:pPr lvl="1"/>
+            <a:r>
+              <a:rPr lang="en-US" dirty="0"/>
+              <a:t>A legend was included to indicate which dataset the line plot refers to</a:t>
+            </a:r>
           </a:p>
         </p:txBody>
       </p:sp>
@@ -5150,8 +5489,37 @@
         </p:blipFill>
         <p:spPr>
           <a:xfrm>
-            <a:off x="435584" y="3586505"/>
-            <a:ext cx="11320832" cy="2767797"/>
+            <a:off x="7374980" y="5959817"/>
+            <a:ext cx="2418642" cy="591327"/>
+          </a:xfrm>
+          <a:prstGeom prst="rect">
+            <a:avLst/>
+          </a:prstGeom>
+        </p:spPr>
+      </p:pic>
+      <p:pic>
+        <p:nvPicPr>
+          <p:cNvPr id="14" name="Picture 13" descr="Text&#10;&#10;Description automatically generated">
+            <a:extLst>
+              <a:ext uri="{FF2B5EF4-FFF2-40B4-BE49-F238E27FC236}">
+                <a16:creationId xmlns:a16="http://schemas.microsoft.com/office/drawing/2014/main" id="{56006CE3-0A6B-1319-4704-797137F2CFCB}"/>
+              </a:ext>
+            </a:extLst>
+          </p:cNvPr>
+          <p:cNvPicPr>
+            <a:picLocks noChangeAspect="1"/>
+          </p:cNvPicPr>
+          <p:nvPr/>
+        </p:nvPicPr>
+        <p:blipFill rotWithShape="1">
+          <a:blip r:embed="rId3"/>
+          <a:srcRect l="3208" t="3420" r="3208" b="3669"/>
+          <a:stretch/>
+        </p:blipFill>
+        <p:spPr>
+          <a:xfrm>
+            <a:off x="6136128" y="101302"/>
+            <a:ext cx="4896346" cy="5766098"/>
           </a:xfrm>
           <a:prstGeom prst="rect">
             <a:avLst/>
@@ -5193,7 +5561,7 @@
           <p:cNvPr id="2" name="Title 1">
             <a:extLst>
               <a:ext uri="{FF2B5EF4-FFF2-40B4-BE49-F238E27FC236}">
-                <a16:creationId xmlns:a16="http://schemas.microsoft.com/office/drawing/2014/main" id="{6AA6D162-3792-C1DD-3411-EEF61C233EC6}"/>
+                <a16:creationId xmlns:a16="http://schemas.microsoft.com/office/drawing/2014/main" id="{3A436372-877C-A4E4-296D-9DB75EA087C4}"/>
               </a:ext>
             </a:extLst>
           </p:cNvPr>
@@ -5206,15 +5574,18 @@
         </p:nvSpPr>
         <p:spPr>
           <a:xfrm>
-            <a:off x="838200" y="365125"/>
-            <a:ext cx="5857068" cy="1325563"/>
+            <a:off x="311728" y="160868"/>
+            <a:ext cx="3581400" cy="3243598"/>
           </a:xfrm>
         </p:spPr>
         <p:txBody>
           <a:bodyPr/>
           <a:lstStyle/>
           <a:p>
-            <a:endParaRPr lang="en-US" dirty="0"/>
+            <a:r>
+              <a:rPr lang="en-US" dirty="0"/>
+              <a:t>HDB Resale Flat Prices and Sales</a:t>
+            </a:r>
           </a:p>
         </p:txBody>
       </p:sp>
@@ -5223,7 +5594,7 @@
           <p:cNvPr id="3" name="Content Placeholder 2">
             <a:extLst>
               <a:ext uri="{FF2B5EF4-FFF2-40B4-BE49-F238E27FC236}">
-                <a16:creationId xmlns:a16="http://schemas.microsoft.com/office/drawing/2014/main" id="{F8F5BA37-534C-3525-8A90-76F4E0BE1FE1}"/>
+                <a16:creationId xmlns:a16="http://schemas.microsoft.com/office/drawing/2014/main" id="{2BC1008E-1EE7-B20A-4B9F-97C7A4610B77}"/>
               </a:ext>
             </a:extLst>
           </p:cNvPr>
@@ -5236,15 +5607,63 @@
         </p:nvSpPr>
         <p:spPr>
           <a:xfrm>
-            <a:off x="838200" y="1825625"/>
-            <a:ext cx="5857068" cy="4351338"/>
-          </a:xfrm>
-        </p:spPr>
-        <p:txBody>
-          <a:bodyPr/>
-          <a:lstStyle/>
-          <a:p>
-            <a:endParaRPr lang="en-US" dirty="0"/>
+            <a:off x="4107872" y="185402"/>
+            <a:ext cx="7571851" cy="3243598"/>
+          </a:xfrm>
+        </p:spPr>
+        <p:txBody>
+          <a:bodyPr>
+            <a:normAutofit fontScale="77500" lnSpcReduction="20000"/>
+          </a:bodyPr>
+          <a:lstStyle/>
+          <a:p>
+            <a:r>
+              <a:rPr lang="en-US" dirty="0"/>
+              <a:t>The time series chart shows that HDB resale flat prices have indeed risen over the past few years, with the </a:t>
+            </a:r>
+            <a:r>
+              <a:rPr lang="en-US" b="1" dirty="0"/>
+              <a:t>largest jump occurring from June 2020 onwards, right after the Circuit Breaker period</a:t>
+            </a:r>
+            <a:r>
+              <a:rPr lang="en-US" dirty="0"/>
+              <a:t>.</a:t>
+            </a:r>
+          </a:p>
+          <a:p>
+            <a:pPr lvl="1"/>
+            <a:r>
+              <a:rPr lang="en-US" dirty="0"/>
+              <a:t>The increase in resale flat prices can be attributed to </a:t>
+            </a:r>
+            <a:r>
+              <a:rPr lang="en-US" b="1" dirty="0"/>
+              <a:t>increased demand as many individuals or couples sought to get a place of their own after experiencing isolation at home during the Circuit Breaker and ensuing phases introduced by the MMTF in managing the pandemic</a:t>
+            </a:r>
+            <a:r>
+              <a:rPr lang="en-US" dirty="0"/>
+              <a:t>.</a:t>
+            </a:r>
+          </a:p>
+          <a:p>
+            <a:r>
+              <a:rPr lang="en-US" dirty="0"/>
+              <a:t>Furthermore, the </a:t>
+            </a:r>
+            <a:r>
+              <a:rPr lang="en-US" b="1" dirty="0"/>
+              <a:t>fall in prices seen towards the end of 2021 and 2022 could be attributed to </a:t>
+            </a:r>
+            <a:r>
+              <a:rPr lang="en-US" b="1" dirty="0">
+                <a:hlinkClick r:id="rId3"/>
+              </a:rPr>
+              <a:t>property cooling measures</a:t>
+            </a:r>
+            <a:r>
+              <a:rPr lang="en-US" dirty="0"/>
+              <a:t> introduced by HDB in December 2021 and October 2022 respectively.</a:t>
+            </a:r>
           </a:p>
         </p:txBody>
       </p:sp>
@@ -5253,7 +5672,7 @@
           <p:cNvPr id="4" name="Slide Number Placeholder 3">
             <a:extLst>
               <a:ext uri="{FF2B5EF4-FFF2-40B4-BE49-F238E27FC236}">
-                <a16:creationId xmlns:a16="http://schemas.microsoft.com/office/drawing/2014/main" id="{AD5ABD77-EBE2-5386-06B6-7CC422E72F01}"/>
+                <a16:creationId xmlns:a16="http://schemas.microsoft.com/office/drawing/2014/main" id="{D3AD5A38-4171-F2D2-6DD8-CCE83CC2BFB8}"/>
               </a:ext>
             </a:extLst>
           </p:cNvPr>
@@ -5283,7 +5702,7 @@
           <p:cNvPr id="6" name="Picture 5">
             <a:extLst>
               <a:ext uri="{FF2B5EF4-FFF2-40B4-BE49-F238E27FC236}">
-                <a16:creationId xmlns:a16="http://schemas.microsoft.com/office/drawing/2014/main" id="{5DD47241-F288-21E8-88CB-A6F28FCB8960}"/>
+                <a16:creationId xmlns:a16="http://schemas.microsoft.com/office/drawing/2014/main" id="{4AD7523C-0DFB-0CCD-C702-469BF5998A77}"/>
               </a:ext>
             </a:extLst>
           </p:cNvPr>
@@ -5293,31 +5712,222 @@
           <p:nvPr/>
         </p:nvPicPr>
         <p:blipFill>
-          <a:blip r:embed="rId2"/>
-          <a:stretch>
-            <a:fillRect/>
-          </a:stretch>
+          <a:blip r:embed="rId4"/>
+          <a:srcRect/>
+          <a:stretch/>
         </p:blipFill>
         <p:spPr>
           <a:xfrm>
-            <a:off x="6865749" y="392724"/>
-            <a:ext cx="5181100" cy="5931984"/>
+            <a:off x="435584" y="3586505"/>
+            <a:ext cx="11320832" cy="2767797"/>
           </a:xfrm>
           <a:prstGeom prst="rect">
             <a:avLst/>
           </a:prstGeom>
         </p:spPr>
       </p:pic>
+      <p:sp>
+        <p:nvSpPr>
+          <p:cNvPr id="5" name="Doughnut 4">
+            <a:extLst>
+              <a:ext uri="{FF2B5EF4-FFF2-40B4-BE49-F238E27FC236}">
+                <a16:creationId xmlns:a16="http://schemas.microsoft.com/office/drawing/2014/main" id="{BBE0E769-4916-8D3F-A9CB-39989AF75316}"/>
+              </a:ext>
+            </a:extLst>
+          </p:cNvPr>
+          <p:cNvSpPr/>
+          <p:nvPr/>
+        </p:nvSpPr>
+        <p:spPr>
+          <a:xfrm>
+            <a:off x="10617200" y="3979333"/>
+            <a:ext cx="321733" cy="296334"/>
+          </a:xfrm>
+          <a:prstGeom prst="donut">
+            <a:avLst>
+              <a:gd name="adj" fmla="val 0"/>
+            </a:avLst>
+          </a:prstGeom>
+          <a:solidFill>
+            <a:srgbClr val="92D050"/>
+          </a:solidFill>
+          <a:ln>
+            <a:solidFill>
+              <a:srgbClr val="FFFF00"/>
+            </a:solidFill>
+          </a:ln>
+        </p:spPr>
+        <p:style>
+          <a:lnRef idx="2">
+            <a:schemeClr val="accent1">
+              <a:shade val="50000"/>
+            </a:schemeClr>
+          </a:lnRef>
+          <a:fillRef idx="1">
+            <a:schemeClr val="accent1"/>
+          </a:fillRef>
+          <a:effectRef idx="0">
+            <a:schemeClr val="accent1"/>
+          </a:effectRef>
+          <a:fontRef idx="minor">
+            <a:schemeClr val="lt1"/>
+          </a:fontRef>
+        </p:style>
+        <p:txBody>
+          <a:bodyPr rtlCol="0" anchor="ctr"/>
+          <a:lstStyle/>
+          <a:p>
+            <a:pPr algn="ctr"/>
+            <a:endParaRPr lang="en-US">
+              <a:solidFill>
+                <a:schemeClr val="tx1"/>
+              </a:solidFill>
+            </a:endParaRPr>
+          </a:p>
+        </p:txBody>
+      </p:sp>
+      <p:sp>
+        <p:nvSpPr>
+          <p:cNvPr id="11" name="Doughnut 10">
+            <a:extLst>
+              <a:ext uri="{FF2B5EF4-FFF2-40B4-BE49-F238E27FC236}">
+                <a16:creationId xmlns:a16="http://schemas.microsoft.com/office/drawing/2014/main" id="{331FA54A-43F6-3728-3555-D94E1D990CDD}"/>
+              </a:ext>
+            </a:extLst>
+          </p:cNvPr>
+          <p:cNvSpPr/>
+          <p:nvPr/>
+        </p:nvSpPr>
+        <p:spPr>
+          <a:xfrm>
+            <a:off x="9695232" y="4351189"/>
+            <a:ext cx="321733" cy="296334"/>
+          </a:xfrm>
+          <a:prstGeom prst="donut">
+            <a:avLst>
+              <a:gd name="adj" fmla="val 0"/>
+            </a:avLst>
+          </a:prstGeom>
+          <a:solidFill>
+            <a:srgbClr val="92D050"/>
+          </a:solidFill>
+          <a:ln>
+            <a:solidFill>
+              <a:srgbClr val="FFFF00"/>
+            </a:solidFill>
+          </a:ln>
+        </p:spPr>
+        <p:style>
+          <a:lnRef idx="2">
+            <a:schemeClr val="accent1">
+              <a:shade val="50000"/>
+            </a:schemeClr>
+          </a:lnRef>
+          <a:fillRef idx="1">
+            <a:schemeClr val="accent1"/>
+          </a:fillRef>
+          <a:effectRef idx="0">
+            <a:schemeClr val="accent1"/>
+          </a:effectRef>
+          <a:fontRef idx="minor">
+            <a:schemeClr val="lt1"/>
+          </a:fontRef>
+        </p:style>
+        <p:txBody>
+          <a:bodyPr rtlCol="0" anchor="ctr"/>
+          <a:lstStyle/>
+          <a:p>
+            <a:pPr algn="ctr"/>
+            <a:endParaRPr lang="en-US">
+              <a:solidFill>
+                <a:schemeClr val="tx1"/>
+              </a:solidFill>
+            </a:endParaRPr>
+          </a:p>
+        </p:txBody>
+      </p:sp>
+      <p:sp>
+        <p:nvSpPr>
+          <p:cNvPr id="12" name="Doughnut 11">
+            <a:extLst>
+              <a:ext uri="{FF2B5EF4-FFF2-40B4-BE49-F238E27FC236}">
+                <a16:creationId xmlns:a16="http://schemas.microsoft.com/office/drawing/2014/main" id="{9D93E8EA-C5FE-5BBE-5476-89C9B1AA2127}"/>
+              </a:ext>
+            </a:extLst>
+          </p:cNvPr>
+          <p:cNvSpPr/>
+          <p:nvPr/>
+        </p:nvSpPr>
+        <p:spPr>
+          <a:xfrm>
+            <a:off x="7488480" y="5299116"/>
+            <a:ext cx="448512" cy="415883"/>
+          </a:xfrm>
+          <a:prstGeom prst="donut">
+            <a:avLst>
+              <a:gd name="adj" fmla="val 0"/>
+            </a:avLst>
+          </a:prstGeom>
+          <a:solidFill>
+            <a:srgbClr val="92D050"/>
+          </a:solidFill>
+          <a:ln>
+            <a:solidFill>
+              <a:srgbClr val="FFFF00"/>
+            </a:solidFill>
+          </a:ln>
+        </p:spPr>
+        <p:style>
+          <a:lnRef idx="2">
+            <a:schemeClr val="accent1">
+              <a:shade val="50000"/>
+            </a:schemeClr>
+          </a:lnRef>
+          <a:fillRef idx="1">
+            <a:schemeClr val="accent1"/>
+          </a:fillRef>
+          <a:effectRef idx="0">
+            <a:schemeClr val="accent1"/>
+          </a:effectRef>
+          <a:fontRef idx="minor">
+            <a:schemeClr val="lt1"/>
+          </a:fontRef>
+        </p:style>
+        <p:txBody>
+          <a:bodyPr rtlCol="0" anchor="ctr"/>
+          <a:lstStyle/>
+          <a:p>
+            <a:pPr algn="ctr"/>
+            <a:endParaRPr lang="en-US">
+              <a:solidFill>
+                <a:schemeClr val="tx1"/>
+              </a:solidFill>
+            </a:endParaRPr>
+          </a:p>
+        </p:txBody>
+      </p:sp>
     </p:spTree>
     <p:extLst>
       <p:ext uri="{BB962C8B-B14F-4D97-AF65-F5344CB8AC3E}">
-        <p14:creationId xmlns:p14="http://schemas.microsoft.com/office/powerpoint/2010/main" val="3308921364"/>
+        <p14:creationId xmlns:p14="http://schemas.microsoft.com/office/powerpoint/2010/main" val="3947833864"/>
       </p:ext>
     </p:extLst>
   </p:cSld>
   <p:clrMapOvr>
     <a:masterClrMapping/>
   </p:clrMapOvr>
+  <mc:AlternateContent xmlns:mc="http://schemas.openxmlformats.org/markup-compatibility/2006">
+    <mc:Choice xmlns:p159="http://schemas.microsoft.com/office/powerpoint/2015/09/main" Requires="p159">
+      <p:transition xmlns:p14="http://schemas.microsoft.com/office/powerpoint/2010/main" spd="slow" p14:dur="2000">
+        <p159:morph option="byObject"/>
+      </p:transition>
+    </mc:Choice>
+    <mc:Fallback>
+      <p:transition spd="slow">
+        <p:fade/>
+      </p:transition>
+    </mc:Fallback>
+  </mc:AlternateContent>
 </p:sld>
 </file>
 
@@ -5343,7 +5953,7 @@
           <p:cNvPr id="2" name="Title 1">
             <a:extLst>
               <a:ext uri="{FF2B5EF4-FFF2-40B4-BE49-F238E27FC236}">
-                <a16:creationId xmlns:a16="http://schemas.microsoft.com/office/drawing/2014/main" id="{11DBBA12-6E02-21FB-9470-5A7FAEEDC054}"/>
+                <a16:creationId xmlns:a16="http://schemas.microsoft.com/office/drawing/2014/main" id="{3A436372-877C-A4E4-296D-9DB75EA087C4}"/>
               </a:ext>
             </a:extLst>
           </p:cNvPr>
@@ -5356,15 +5966,18 @@
         </p:nvSpPr>
         <p:spPr>
           <a:xfrm>
-            <a:off x="838200" y="365125"/>
-            <a:ext cx="4245244" cy="1325563"/>
+            <a:off x="311728" y="160868"/>
+            <a:ext cx="3581400" cy="3243598"/>
           </a:xfrm>
         </p:spPr>
         <p:txBody>
           <a:bodyPr/>
           <a:lstStyle/>
           <a:p>
-            <a:endParaRPr lang="en-US" dirty="0"/>
+            <a:r>
+              <a:rPr lang="en-US" dirty="0"/>
+              <a:t>HDB Resale Flat Prices and Sales</a:t>
+            </a:r>
           </a:p>
         </p:txBody>
       </p:sp>
@@ -5373,7 +5986,7 @@
           <p:cNvPr id="3" name="Content Placeholder 2">
             <a:extLst>
               <a:ext uri="{FF2B5EF4-FFF2-40B4-BE49-F238E27FC236}">
-                <a16:creationId xmlns:a16="http://schemas.microsoft.com/office/drawing/2014/main" id="{CE84337D-3D74-248F-711D-B55D3962994C}"/>
+                <a16:creationId xmlns:a16="http://schemas.microsoft.com/office/drawing/2014/main" id="{2BC1008E-1EE7-B20A-4B9F-97C7A4610B77}"/>
               </a:ext>
             </a:extLst>
           </p:cNvPr>
@@ -5386,15 +5999,85 @@
         </p:nvSpPr>
         <p:spPr>
           <a:xfrm>
-            <a:off x="838200" y="1825625"/>
-            <a:ext cx="4245244" cy="4351338"/>
-          </a:xfrm>
-        </p:spPr>
-        <p:txBody>
-          <a:bodyPr/>
-          <a:lstStyle/>
-          <a:p>
-            <a:endParaRPr lang="en-US" dirty="0"/>
+            <a:off x="4107872" y="185402"/>
+            <a:ext cx="7571851" cy="3243598"/>
+          </a:xfrm>
+        </p:spPr>
+        <p:txBody>
+          <a:bodyPr>
+            <a:normAutofit fontScale="77500" lnSpcReduction="20000"/>
+          </a:bodyPr>
+          <a:lstStyle/>
+          <a:p>
+            <a:r>
+              <a:rPr lang="en-US" dirty="0"/>
+              <a:t>We can see that for the Circuit Breaker period, </a:t>
+            </a:r>
+            <a:r>
+              <a:rPr lang="en-US" b="1" dirty="0"/>
+              <a:t>the overall median resale price drop was linked to a large drop in volume of HDB resale flats sold</a:t>
+            </a:r>
+            <a:r>
+              <a:rPr lang="en-US" dirty="0"/>
+              <a:t>. </a:t>
+            </a:r>
+          </a:p>
+          <a:p>
+            <a:pPr lvl="1"/>
+            <a:r>
+              <a:rPr lang="en-US" dirty="0"/>
+              <a:t>Additionally, across 2015 – 2022, most HDB resale flat transactions took place within February - November, with a </a:t>
+            </a:r>
+            <a:r>
+              <a:rPr lang="en-US" b="1" dirty="0"/>
+              <a:t>typical fall in resale flat transactions at the beginning and end of the year</a:t>
+            </a:r>
+            <a:r>
+              <a:rPr lang="en-US" dirty="0"/>
+              <a:t>. </a:t>
+            </a:r>
+          </a:p>
+          <a:p>
+            <a:r>
+              <a:rPr lang="en-US" dirty="0"/>
+              <a:t>After the introduction of the </a:t>
+            </a:r>
+            <a:r>
+              <a:rPr lang="en-US" b="1" dirty="0"/>
+              <a:t>two property cooling measures</a:t>
+            </a:r>
+            <a:r>
+              <a:rPr lang="en-US" dirty="0"/>
+              <a:t> mentioned earlier, </a:t>
+            </a:r>
+            <a:r>
+              <a:rPr lang="en-US" b="1" dirty="0"/>
+              <a:t>resale flat sales volume also saw drops</a:t>
+            </a:r>
+          </a:p>
+          <a:p>
+            <a:pPr lvl="1"/>
+            <a:r>
+              <a:rPr lang="en-US" dirty="0"/>
+              <a:t>The</a:t>
+            </a:r>
+            <a:r>
+              <a:rPr lang="en-US" b="1" dirty="0"/>
+              <a:t> recent property cooling measures </a:t>
+            </a:r>
+            <a:r>
+              <a:rPr lang="en-US" dirty="0"/>
+              <a:t>had the </a:t>
+            </a:r>
+            <a:r>
+              <a:rPr lang="en-US" b="1" dirty="0"/>
+              <a:t>most impact on reducing resale flat sales volumes and prices</a:t>
+            </a:r>
+            <a:r>
+              <a:rPr lang="en-US" dirty="0"/>
+              <a:t> compared to the ones introduced in December 2021</a:t>
+            </a:r>
+            <a:endParaRPr lang="en-US" b="1" dirty="0"/>
           </a:p>
         </p:txBody>
       </p:sp>
@@ -5403,7 +6086,7 @@
           <p:cNvPr id="4" name="Slide Number Placeholder 3">
             <a:extLst>
               <a:ext uri="{FF2B5EF4-FFF2-40B4-BE49-F238E27FC236}">
-                <a16:creationId xmlns:a16="http://schemas.microsoft.com/office/drawing/2014/main" id="{D79CC5E2-9BD9-56C9-BCE1-07015755B40D}"/>
+                <a16:creationId xmlns:a16="http://schemas.microsoft.com/office/drawing/2014/main" id="{D3AD5A38-4171-F2D2-6DD8-CCE83CC2BFB8}"/>
               </a:ext>
             </a:extLst>
           </p:cNvPr>
@@ -5430,10 +6113,10 @@
       </p:sp>
       <p:pic>
         <p:nvPicPr>
-          <p:cNvPr id="5" name="Picture 4">
-            <a:extLst>
-              <a:ext uri="{FF2B5EF4-FFF2-40B4-BE49-F238E27FC236}">
-                <a16:creationId xmlns:a16="http://schemas.microsoft.com/office/drawing/2014/main" id="{E7EABACD-2C7E-DE0C-5F10-F1CFD4A048FF}"/>
+          <p:cNvPr id="6" name="Picture 5">
+            <a:extLst>
+              <a:ext uri="{FF2B5EF4-FFF2-40B4-BE49-F238E27FC236}">
+                <a16:creationId xmlns:a16="http://schemas.microsoft.com/office/drawing/2014/main" id="{4AD7523C-0DFB-0CCD-C702-469BF5998A77}"/>
               </a:ext>
             </a:extLst>
           </p:cNvPr>
@@ -5443,30 +6126,222 @@
           <p:nvPr/>
         </p:nvPicPr>
         <p:blipFill>
-          <a:blip r:embed="rId2"/>
+          <a:blip r:embed="rId3"/>
           <a:srcRect/>
           <a:stretch/>
         </p:blipFill>
         <p:spPr>
           <a:xfrm>
-            <a:off x="5381670" y="981189"/>
-            <a:ext cx="6541809" cy="4895621"/>
+            <a:off x="435584" y="3586505"/>
+            <a:ext cx="11320832" cy="2767797"/>
           </a:xfrm>
           <a:prstGeom prst="rect">
             <a:avLst/>
           </a:prstGeom>
         </p:spPr>
       </p:pic>
+      <p:sp>
+        <p:nvSpPr>
+          <p:cNvPr id="5" name="Doughnut 4">
+            <a:extLst>
+              <a:ext uri="{FF2B5EF4-FFF2-40B4-BE49-F238E27FC236}">
+                <a16:creationId xmlns:a16="http://schemas.microsoft.com/office/drawing/2014/main" id="{BBE0E769-4916-8D3F-A9CB-39989AF75316}"/>
+              </a:ext>
+            </a:extLst>
+          </p:cNvPr>
+          <p:cNvSpPr/>
+          <p:nvPr/>
+        </p:nvSpPr>
+        <p:spPr>
+          <a:xfrm>
+            <a:off x="10617200" y="3979333"/>
+            <a:ext cx="321733" cy="296334"/>
+          </a:xfrm>
+          <a:prstGeom prst="donut">
+            <a:avLst>
+              <a:gd name="adj" fmla="val 0"/>
+            </a:avLst>
+          </a:prstGeom>
+          <a:solidFill>
+            <a:srgbClr val="92D050"/>
+          </a:solidFill>
+          <a:ln>
+            <a:solidFill>
+              <a:srgbClr val="FFFF00"/>
+            </a:solidFill>
+          </a:ln>
+        </p:spPr>
+        <p:style>
+          <a:lnRef idx="2">
+            <a:schemeClr val="accent1">
+              <a:shade val="50000"/>
+            </a:schemeClr>
+          </a:lnRef>
+          <a:fillRef idx="1">
+            <a:schemeClr val="accent1"/>
+          </a:fillRef>
+          <a:effectRef idx="0">
+            <a:schemeClr val="accent1"/>
+          </a:effectRef>
+          <a:fontRef idx="minor">
+            <a:schemeClr val="lt1"/>
+          </a:fontRef>
+        </p:style>
+        <p:txBody>
+          <a:bodyPr rtlCol="0" anchor="ctr"/>
+          <a:lstStyle/>
+          <a:p>
+            <a:pPr algn="ctr"/>
+            <a:endParaRPr lang="en-US">
+              <a:solidFill>
+                <a:schemeClr val="tx1"/>
+              </a:solidFill>
+            </a:endParaRPr>
+          </a:p>
+        </p:txBody>
+      </p:sp>
+      <p:sp>
+        <p:nvSpPr>
+          <p:cNvPr id="11" name="Doughnut 10">
+            <a:extLst>
+              <a:ext uri="{FF2B5EF4-FFF2-40B4-BE49-F238E27FC236}">
+                <a16:creationId xmlns:a16="http://schemas.microsoft.com/office/drawing/2014/main" id="{331FA54A-43F6-3728-3555-D94E1D990CDD}"/>
+              </a:ext>
+            </a:extLst>
+          </p:cNvPr>
+          <p:cNvSpPr/>
+          <p:nvPr/>
+        </p:nvSpPr>
+        <p:spPr>
+          <a:xfrm>
+            <a:off x="9695232" y="4351189"/>
+            <a:ext cx="321733" cy="296334"/>
+          </a:xfrm>
+          <a:prstGeom prst="donut">
+            <a:avLst>
+              <a:gd name="adj" fmla="val 0"/>
+            </a:avLst>
+          </a:prstGeom>
+          <a:solidFill>
+            <a:srgbClr val="92D050"/>
+          </a:solidFill>
+          <a:ln>
+            <a:solidFill>
+              <a:srgbClr val="FFFF00"/>
+            </a:solidFill>
+          </a:ln>
+        </p:spPr>
+        <p:style>
+          <a:lnRef idx="2">
+            <a:schemeClr val="accent1">
+              <a:shade val="50000"/>
+            </a:schemeClr>
+          </a:lnRef>
+          <a:fillRef idx="1">
+            <a:schemeClr val="accent1"/>
+          </a:fillRef>
+          <a:effectRef idx="0">
+            <a:schemeClr val="accent1"/>
+          </a:effectRef>
+          <a:fontRef idx="minor">
+            <a:schemeClr val="lt1"/>
+          </a:fontRef>
+        </p:style>
+        <p:txBody>
+          <a:bodyPr rtlCol="0" anchor="ctr"/>
+          <a:lstStyle/>
+          <a:p>
+            <a:pPr algn="ctr"/>
+            <a:endParaRPr lang="en-US">
+              <a:solidFill>
+                <a:schemeClr val="tx1"/>
+              </a:solidFill>
+            </a:endParaRPr>
+          </a:p>
+        </p:txBody>
+      </p:sp>
+      <p:sp>
+        <p:nvSpPr>
+          <p:cNvPr id="12" name="Doughnut 11">
+            <a:extLst>
+              <a:ext uri="{FF2B5EF4-FFF2-40B4-BE49-F238E27FC236}">
+                <a16:creationId xmlns:a16="http://schemas.microsoft.com/office/drawing/2014/main" id="{9D93E8EA-C5FE-5BBE-5476-89C9B1AA2127}"/>
+              </a:ext>
+            </a:extLst>
+          </p:cNvPr>
+          <p:cNvSpPr/>
+          <p:nvPr/>
+        </p:nvSpPr>
+        <p:spPr>
+          <a:xfrm>
+            <a:off x="7488480" y="5299116"/>
+            <a:ext cx="448512" cy="415883"/>
+          </a:xfrm>
+          <a:prstGeom prst="donut">
+            <a:avLst>
+              <a:gd name="adj" fmla="val 0"/>
+            </a:avLst>
+          </a:prstGeom>
+          <a:solidFill>
+            <a:srgbClr val="92D050"/>
+          </a:solidFill>
+          <a:ln>
+            <a:solidFill>
+              <a:srgbClr val="FFFF00"/>
+            </a:solidFill>
+          </a:ln>
+        </p:spPr>
+        <p:style>
+          <a:lnRef idx="2">
+            <a:schemeClr val="accent1">
+              <a:shade val="50000"/>
+            </a:schemeClr>
+          </a:lnRef>
+          <a:fillRef idx="1">
+            <a:schemeClr val="accent1"/>
+          </a:fillRef>
+          <a:effectRef idx="0">
+            <a:schemeClr val="accent1"/>
+          </a:effectRef>
+          <a:fontRef idx="minor">
+            <a:schemeClr val="lt1"/>
+          </a:fontRef>
+        </p:style>
+        <p:txBody>
+          <a:bodyPr rtlCol="0" anchor="ctr"/>
+          <a:lstStyle/>
+          <a:p>
+            <a:pPr algn="ctr"/>
+            <a:endParaRPr lang="en-US">
+              <a:solidFill>
+                <a:schemeClr val="tx1"/>
+              </a:solidFill>
+            </a:endParaRPr>
+          </a:p>
+        </p:txBody>
+      </p:sp>
     </p:spTree>
     <p:extLst>
       <p:ext uri="{BB962C8B-B14F-4D97-AF65-F5344CB8AC3E}">
-        <p14:creationId xmlns:p14="http://schemas.microsoft.com/office/powerpoint/2010/main" val="2638041493"/>
+        <p14:creationId xmlns:p14="http://schemas.microsoft.com/office/powerpoint/2010/main" val="1377095019"/>
       </p:ext>
     </p:extLst>
   </p:cSld>
   <p:clrMapOvr>
     <a:masterClrMapping/>
   </p:clrMapOvr>
+  <mc:AlternateContent xmlns:mc="http://schemas.openxmlformats.org/markup-compatibility/2006">
+    <mc:Choice xmlns:p159="http://schemas.microsoft.com/office/powerpoint/2015/09/main" Requires="p159">
+      <p:transition xmlns:p14="http://schemas.microsoft.com/office/powerpoint/2010/main" spd="slow" p14:dur="2000">
+        <p159:morph option="byObject"/>
+      </p:transition>
+    </mc:Choice>
+    <mc:Fallback>
+      <p:transition spd="slow">
+        <p:fade/>
+      </p:transition>
+    </mc:Fallback>
+  </mc:AlternateContent>
 </p:sld>
 </file>
 
@@ -5492,7 +6367,7 @@
           <p:cNvPr id="2" name="Title 1">
             <a:extLst>
               <a:ext uri="{FF2B5EF4-FFF2-40B4-BE49-F238E27FC236}">
-                <a16:creationId xmlns:a16="http://schemas.microsoft.com/office/drawing/2014/main" id="{EC4B782B-6B1F-16F5-7582-475E887D20D9}"/>
+                <a16:creationId xmlns:a16="http://schemas.microsoft.com/office/drawing/2014/main" id="{6AA6D162-3792-C1DD-3411-EEF61C233EC6}"/>
               </a:ext>
             </a:extLst>
           </p:cNvPr>
@@ -5505,8 +6380,8 @@
         </p:nvSpPr>
         <p:spPr>
           <a:xfrm>
-            <a:off x="838199" y="365125"/>
-            <a:ext cx="5066655" cy="1325563"/>
+            <a:off x="838200" y="365125"/>
+            <a:ext cx="5857068" cy="1325563"/>
           </a:xfrm>
         </p:spPr>
         <p:txBody>
@@ -5522,7 +6397,7 @@
           <p:cNvPr id="3" name="Content Placeholder 2">
             <a:extLst>
               <a:ext uri="{FF2B5EF4-FFF2-40B4-BE49-F238E27FC236}">
-                <a16:creationId xmlns:a16="http://schemas.microsoft.com/office/drawing/2014/main" id="{2D21537C-8050-0B9C-B9E0-2076DCEDC41B}"/>
+                <a16:creationId xmlns:a16="http://schemas.microsoft.com/office/drawing/2014/main" id="{F8F5BA37-534C-3525-8A90-76F4E0BE1FE1}"/>
               </a:ext>
             </a:extLst>
           </p:cNvPr>
@@ -5535,8 +6410,8 @@
         </p:nvSpPr>
         <p:spPr>
           <a:xfrm>
-            <a:off x="838199" y="1825625"/>
-            <a:ext cx="5066655" cy="4351338"/>
+            <a:off x="838200" y="1825625"/>
+            <a:ext cx="5857068" cy="4351338"/>
           </a:xfrm>
         </p:spPr>
         <p:txBody>
@@ -5552,7 +6427,7 @@
           <p:cNvPr id="4" name="Slide Number Placeholder 3">
             <a:extLst>
               <a:ext uri="{FF2B5EF4-FFF2-40B4-BE49-F238E27FC236}">
-                <a16:creationId xmlns:a16="http://schemas.microsoft.com/office/drawing/2014/main" id="{E997AB43-4AAD-B4DA-E158-D945270FC108}"/>
+                <a16:creationId xmlns:a16="http://schemas.microsoft.com/office/drawing/2014/main" id="{AD5ABD77-EBE2-5386-06B6-7CC422E72F01}"/>
               </a:ext>
             </a:extLst>
           </p:cNvPr>
@@ -5582,7 +6457,7 @@
           <p:cNvPr id="6" name="Picture 5">
             <a:extLst>
               <a:ext uri="{FF2B5EF4-FFF2-40B4-BE49-F238E27FC236}">
-                <a16:creationId xmlns:a16="http://schemas.microsoft.com/office/drawing/2014/main" id="{02508BBA-7536-E325-E2BF-0B5DD2B18C6D}"/>
+                <a16:creationId xmlns:a16="http://schemas.microsoft.com/office/drawing/2014/main" id="{5DD47241-F288-21E8-88CB-A6F28FCB8960}"/>
               </a:ext>
             </a:extLst>
           </p:cNvPr>
@@ -5599,8 +6474,8 @@
         </p:blipFill>
         <p:spPr>
           <a:xfrm>
-            <a:off x="6044337" y="425557"/>
-            <a:ext cx="6006885" cy="6006885"/>
+            <a:off x="6865749" y="392724"/>
+            <a:ext cx="5181100" cy="5931984"/>
           </a:xfrm>
           <a:prstGeom prst="rect">
             <a:avLst/>
@@ -5610,7 +6485,7 @@
     </p:spTree>
     <p:extLst>
       <p:ext uri="{BB962C8B-B14F-4D97-AF65-F5344CB8AC3E}">
-        <p14:creationId xmlns:p14="http://schemas.microsoft.com/office/powerpoint/2010/main" val="928219461"/>
+        <p14:creationId xmlns:p14="http://schemas.microsoft.com/office/powerpoint/2010/main" val="3308921364"/>
       </p:ext>
     </p:extLst>
   </p:cSld>
@@ -5642,7 +6517,7 @@
           <p:cNvPr id="2" name="Title 1">
             <a:extLst>
               <a:ext uri="{FF2B5EF4-FFF2-40B4-BE49-F238E27FC236}">
-                <a16:creationId xmlns:a16="http://schemas.microsoft.com/office/drawing/2014/main" id="{C4A634B8-030A-4482-12C1-692EE51B6997}"/>
+                <a16:creationId xmlns:a16="http://schemas.microsoft.com/office/drawing/2014/main" id="{11DBBA12-6E02-21FB-9470-5A7FAEEDC054}"/>
               </a:ext>
             </a:extLst>
           </p:cNvPr>
@@ -5656,14 +6531,14 @@
         <p:spPr>
           <a:xfrm>
             <a:off x="838200" y="365125"/>
-            <a:ext cx="5717583" cy="1325563"/>
+            <a:ext cx="4245244" cy="1325563"/>
           </a:xfrm>
         </p:spPr>
         <p:txBody>
           <a:bodyPr/>
           <a:lstStyle/>
           <a:p>
-            <a:endParaRPr lang="en-US"/>
+            <a:endParaRPr lang="en-US" dirty="0"/>
           </a:p>
         </p:txBody>
       </p:sp>
@@ -5672,7 +6547,7 @@
           <p:cNvPr id="3" name="Content Placeholder 2">
             <a:extLst>
               <a:ext uri="{FF2B5EF4-FFF2-40B4-BE49-F238E27FC236}">
-                <a16:creationId xmlns:a16="http://schemas.microsoft.com/office/drawing/2014/main" id="{BDE36D69-B8B0-C3E8-84ED-BA08459C3658}"/>
+                <a16:creationId xmlns:a16="http://schemas.microsoft.com/office/drawing/2014/main" id="{CE84337D-3D74-248F-711D-B55D3962994C}"/>
               </a:ext>
             </a:extLst>
           </p:cNvPr>
@@ -5686,14 +6561,14 @@
         <p:spPr>
           <a:xfrm>
             <a:off x="838200" y="1825625"/>
-            <a:ext cx="5717583" cy="4351338"/>
+            <a:ext cx="4245244" cy="4351338"/>
           </a:xfrm>
         </p:spPr>
         <p:txBody>
           <a:bodyPr/>
           <a:lstStyle/>
           <a:p>
-            <a:endParaRPr lang="en-US"/>
+            <a:endParaRPr lang="en-US" dirty="0"/>
           </a:p>
         </p:txBody>
       </p:sp>
@@ -5702,7 +6577,7 @@
           <p:cNvPr id="4" name="Slide Number Placeholder 3">
             <a:extLst>
               <a:ext uri="{FF2B5EF4-FFF2-40B4-BE49-F238E27FC236}">
-                <a16:creationId xmlns:a16="http://schemas.microsoft.com/office/drawing/2014/main" id="{30E3EB71-C593-925E-73EB-D9B83D7E9927}"/>
+                <a16:creationId xmlns:a16="http://schemas.microsoft.com/office/drawing/2014/main" id="{D79CC5E2-9BD9-56C9-BCE1-07015755B40D}"/>
               </a:ext>
             </a:extLst>
           </p:cNvPr>
@@ -5722,6 +6597,305 @@
               <a:rPr lang="en-US" smtClean="0"/>
               <a:pPr/>
               <a:t>14</a:t>
+            </a:fld>
+            <a:endParaRPr lang="en-US" dirty="0"/>
+          </a:p>
+        </p:txBody>
+      </p:sp>
+      <p:pic>
+        <p:nvPicPr>
+          <p:cNvPr id="5" name="Picture 4">
+            <a:extLst>
+              <a:ext uri="{FF2B5EF4-FFF2-40B4-BE49-F238E27FC236}">
+                <a16:creationId xmlns:a16="http://schemas.microsoft.com/office/drawing/2014/main" id="{E7EABACD-2C7E-DE0C-5F10-F1CFD4A048FF}"/>
+              </a:ext>
+            </a:extLst>
+          </p:cNvPr>
+          <p:cNvPicPr>
+            <a:picLocks noChangeAspect="1"/>
+          </p:cNvPicPr>
+          <p:nvPr/>
+        </p:nvPicPr>
+        <p:blipFill>
+          <a:blip r:embed="rId2"/>
+          <a:srcRect/>
+          <a:stretch/>
+        </p:blipFill>
+        <p:spPr>
+          <a:xfrm>
+            <a:off x="5381670" y="981189"/>
+            <a:ext cx="6541809" cy="4895621"/>
+          </a:xfrm>
+          <a:prstGeom prst="rect">
+            <a:avLst/>
+          </a:prstGeom>
+        </p:spPr>
+      </p:pic>
+    </p:spTree>
+    <p:extLst>
+      <p:ext uri="{BB962C8B-B14F-4D97-AF65-F5344CB8AC3E}">
+        <p14:creationId xmlns:p14="http://schemas.microsoft.com/office/powerpoint/2010/main" val="2638041493"/>
+      </p:ext>
+    </p:extLst>
+  </p:cSld>
+  <p:clrMapOvr>
+    <a:masterClrMapping/>
+  </p:clrMapOvr>
+</p:sld>
+</file>
+
+<file path=ppt/slides/slide15.xml><?xml version="1.0" encoding="utf-8"?>
+<p:sld xmlns:a="http://schemas.openxmlformats.org/drawingml/2006/main" xmlns:r="http://schemas.openxmlformats.org/officeDocument/2006/relationships" xmlns:p="http://schemas.openxmlformats.org/presentationml/2006/main">
+  <p:cSld>
+    <p:spTree>
+      <p:nvGrpSpPr>
+        <p:cNvPr id="1" name=""/>
+        <p:cNvGrpSpPr/>
+        <p:nvPr/>
+      </p:nvGrpSpPr>
+      <p:grpSpPr>
+        <a:xfrm>
+          <a:off x="0" y="0"/>
+          <a:ext cx="0" cy="0"/>
+          <a:chOff x="0" y="0"/>
+          <a:chExt cx="0" cy="0"/>
+        </a:xfrm>
+      </p:grpSpPr>
+      <p:sp>
+        <p:nvSpPr>
+          <p:cNvPr id="2" name="Title 1">
+            <a:extLst>
+              <a:ext uri="{FF2B5EF4-FFF2-40B4-BE49-F238E27FC236}">
+                <a16:creationId xmlns:a16="http://schemas.microsoft.com/office/drawing/2014/main" id="{EC4B782B-6B1F-16F5-7582-475E887D20D9}"/>
+              </a:ext>
+            </a:extLst>
+          </p:cNvPr>
+          <p:cNvSpPr>
+            <a:spLocks noGrp="1"/>
+          </p:cNvSpPr>
+          <p:nvPr>
+            <p:ph type="title"/>
+          </p:nvPr>
+        </p:nvSpPr>
+        <p:spPr>
+          <a:xfrm>
+            <a:off x="838199" y="365125"/>
+            <a:ext cx="5066655" cy="1325563"/>
+          </a:xfrm>
+        </p:spPr>
+        <p:txBody>
+          <a:bodyPr/>
+          <a:lstStyle/>
+          <a:p>
+            <a:endParaRPr lang="en-US" dirty="0"/>
+          </a:p>
+        </p:txBody>
+      </p:sp>
+      <p:sp>
+        <p:nvSpPr>
+          <p:cNvPr id="3" name="Content Placeholder 2">
+            <a:extLst>
+              <a:ext uri="{FF2B5EF4-FFF2-40B4-BE49-F238E27FC236}">
+                <a16:creationId xmlns:a16="http://schemas.microsoft.com/office/drawing/2014/main" id="{2D21537C-8050-0B9C-B9E0-2076DCEDC41B}"/>
+              </a:ext>
+            </a:extLst>
+          </p:cNvPr>
+          <p:cNvSpPr>
+            <a:spLocks noGrp="1"/>
+          </p:cNvSpPr>
+          <p:nvPr>
+            <p:ph idx="1"/>
+          </p:nvPr>
+        </p:nvSpPr>
+        <p:spPr>
+          <a:xfrm>
+            <a:off x="838199" y="1825625"/>
+            <a:ext cx="5066655" cy="4351338"/>
+          </a:xfrm>
+        </p:spPr>
+        <p:txBody>
+          <a:bodyPr/>
+          <a:lstStyle/>
+          <a:p>
+            <a:endParaRPr lang="en-US" dirty="0"/>
+          </a:p>
+        </p:txBody>
+      </p:sp>
+      <p:sp>
+        <p:nvSpPr>
+          <p:cNvPr id="4" name="Slide Number Placeholder 3">
+            <a:extLst>
+              <a:ext uri="{FF2B5EF4-FFF2-40B4-BE49-F238E27FC236}">
+                <a16:creationId xmlns:a16="http://schemas.microsoft.com/office/drawing/2014/main" id="{E997AB43-4AAD-B4DA-E158-D945270FC108}"/>
+              </a:ext>
+            </a:extLst>
+          </p:cNvPr>
+          <p:cNvSpPr>
+            <a:spLocks noGrp="1"/>
+          </p:cNvSpPr>
+          <p:nvPr>
+            <p:ph type="sldNum" sz="quarter" idx="12"/>
+          </p:nvPr>
+        </p:nvSpPr>
+        <p:spPr/>
+        <p:txBody>
+          <a:bodyPr/>
+          <a:lstStyle/>
+          <a:p>
+            <a:fld id="{E6FE59FF-D9EB-D545-90E6-CE90D1694C9B}" type="slidenum">
+              <a:rPr lang="en-US" smtClean="0"/>
+              <a:pPr/>
+              <a:t>15</a:t>
+            </a:fld>
+            <a:endParaRPr lang="en-US" dirty="0"/>
+          </a:p>
+        </p:txBody>
+      </p:sp>
+      <p:pic>
+        <p:nvPicPr>
+          <p:cNvPr id="6" name="Picture 5">
+            <a:extLst>
+              <a:ext uri="{FF2B5EF4-FFF2-40B4-BE49-F238E27FC236}">
+                <a16:creationId xmlns:a16="http://schemas.microsoft.com/office/drawing/2014/main" id="{02508BBA-7536-E325-E2BF-0B5DD2B18C6D}"/>
+              </a:ext>
+            </a:extLst>
+          </p:cNvPr>
+          <p:cNvPicPr>
+            <a:picLocks noChangeAspect="1"/>
+          </p:cNvPicPr>
+          <p:nvPr/>
+        </p:nvPicPr>
+        <p:blipFill>
+          <a:blip r:embed="rId2"/>
+          <a:stretch>
+            <a:fillRect/>
+          </a:stretch>
+        </p:blipFill>
+        <p:spPr>
+          <a:xfrm>
+            <a:off x="6044337" y="425557"/>
+            <a:ext cx="6006885" cy="6006885"/>
+          </a:xfrm>
+          <a:prstGeom prst="rect">
+            <a:avLst/>
+          </a:prstGeom>
+        </p:spPr>
+      </p:pic>
+    </p:spTree>
+    <p:extLst>
+      <p:ext uri="{BB962C8B-B14F-4D97-AF65-F5344CB8AC3E}">
+        <p14:creationId xmlns:p14="http://schemas.microsoft.com/office/powerpoint/2010/main" val="928219461"/>
+      </p:ext>
+    </p:extLst>
+  </p:cSld>
+  <p:clrMapOvr>
+    <a:masterClrMapping/>
+  </p:clrMapOvr>
+</p:sld>
+</file>
+
+<file path=ppt/slides/slide16.xml><?xml version="1.0" encoding="utf-8"?>
+<p:sld xmlns:a="http://schemas.openxmlformats.org/drawingml/2006/main" xmlns:r="http://schemas.openxmlformats.org/officeDocument/2006/relationships" xmlns:p="http://schemas.openxmlformats.org/presentationml/2006/main">
+  <p:cSld>
+    <p:spTree>
+      <p:nvGrpSpPr>
+        <p:cNvPr id="1" name=""/>
+        <p:cNvGrpSpPr/>
+        <p:nvPr/>
+      </p:nvGrpSpPr>
+      <p:grpSpPr>
+        <a:xfrm>
+          <a:off x="0" y="0"/>
+          <a:ext cx="0" cy="0"/>
+          <a:chOff x="0" y="0"/>
+          <a:chExt cx="0" cy="0"/>
+        </a:xfrm>
+      </p:grpSpPr>
+      <p:sp>
+        <p:nvSpPr>
+          <p:cNvPr id="2" name="Title 1">
+            <a:extLst>
+              <a:ext uri="{FF2B5EF4-FFF2-40B4-BE49-F238E27FC236}">
+                <a16:creationId xmlns:a16="http://schemas.microsoft.com/office/drawing/2014/main" id="{C4A634B8-030A-4482-12C1-692EE51B6997}"/>
+              </a:ext>
+            </a:extLst>
+          </p:cNvPr>
+          <p:cNvSpPr>
+            <a:spLocks noGrp="1"/>
+          </p:cNvSpPr>
+          <p:nvPr>
+            <p:ph type="title"/>
+          </p:nvPr>
+        </p:nvSpPr>
+        <p:spPr>
+          <a:xfrm>
+            <a:off x="838200" y="365125"/>
+            <a:ext cx="5717583" cy="1325563"/>
+          </a:xfrm>
+        </p:spPr>
+        <p:txBody>
+          <a:bodyPr/>
+          <a:lstStyle/>
+          <a:p>
+            <a:endParaRPr lang="en-US"/>
+          </a:p>
+        </p:txBody>
+      </p:sp>
+      <p:sp>
+        <p:nvSpPr>
+          <p:cNvPr id="3" name="Content Placeholder 2">
+            <a:extLst>
+              <a:ext uri="{FF2B5EF4-FFF2-40B4-BE49-F238E27FC236}">
+                <a16:creationId xmlns:a16="http://schemas.microsoft.com/office/drawing/2014/main" id="{BDE36D69-B8B0-C3E8-84ED-BA08459C3658}"/>
+              </a:ext>
+            </a:extLst>
+          </p:cNvPr>
+          <p:cNvSpPr>
+            <a:spLocks noGrp="1"/>
+          </p:cNvSpPr>
+          <p:nvPr>
+            <p:ph idx="1"/>
+          </p:nvPr>
+        </p:nvSpPr>
+        <p:spPr>
+          <a:xfrm>
+            <a:off x="838200" y="1825625"/>
+            <a:ext cx="5717583" cy="4351338"/>
+          </a:xfrm>
+        </p:spPr>
+        <p:txBody>
+          <a:bodyPr/>
+          <a:lstStyle/>
+          <a:p>
+            <a:endParaRPr lang="en-US"/>
+          </a:p>
+        </p:txBody>
+      </p:sp>
+      <p:sp>
+        <p:nvSpPr>
+          <p:cNvPr id="4" name="Slide Number Placeholder 3">
+            <a:extLst>
+              <a:ext uri="{FF2B5EF4-FFF2-40B4-BE49-F238E27FC236}">
+                <a16:creationId xmlns:a16="http://schemas.microsoft.com/office/drawing/2014/main" id="{30E3EB71-C593-925E-73EB-D9B83D7E9927}"/>
+              </a:ext>
+            </a:extLst>
+          </p:cNvPr>
+          <p:cNvSpPr>
+            <a:spLocks noGrp="1"/>
+          </p:cNvSpPr>
+          <p:nvPr>
+            <p:ph type="sldNum" sz="quarter" idx="12"/>
+          </p:nvPr>
+        </p:nvSpPr>
+        <p:spPr/>
+        <p:txBody>
+          <a:bodyPr/>
+          <a:lstStyle/>
+          <a:p>
+            <a:fld id="{E6FE59FF-D9EB-D545-90E6-CE90D1694C9B}" type="slidenum">
+              <a:rPr lang="en-US" smtClean="0"/>
+              <a:pPr/>
+              <a:t>16</a:t>
             </a:fld>
             <a:endParaRPr lang="en-US" dirty="0"/>
           </a:p>
@@ -7582,7 +8756,7 @@
               <a:t>Design and label attributes were added to the boxplot for better </a:t>
             </a:r>
             <a:r>
-              <a:rPr lang="en-US" sz="2200"/>
+              <a:rPr lang="en-US" sz="2200" dirty="0" err="1"/>
               <a:t>visualisation</a:t>
             </a:r>
             <a:endParaRPr lang="en-US" sz="2200" dirty="0"/>
@@ -7611,8 +8785,8 @@
         </p:blipFill>
         <p:spPr>
           <a:xfrm>
-            <a:off x="8168998" y="4852857"/>
-            <a:ext cx="3080167" cy="1570885"/>
+            <a:off x="8342826" y="5463529"/>
+            <a:ext cx="1909643" cy="973918"/>
           </a:xfrm>
           <a:prstGeom prst="rect">
             <a:avLst/>
@@ -7833,16 +9007,15 @@
           </p:cNvPicPr>
           <p:nvPr/>
         </p:nvPicPr>
-        <p:blipFill>
+        <p:blipFill rotWithShape="1">
           <a:blip r:embed="rId3"/>
-          <a:stretch>
-            <a:fillRect/>
-          </a:stretch>
+          <a:srcRect l="2741" t="4288" r="2662" b="4376"/>
+          <a:stretch/>
         </p:blipFill>
         <p:spPr>
           <a:xfrm>
-            <a:off x="7408505" y="243107"/>
-            <a:ext cx="4601154" cy="4457132"/>
+            <a:off x="6568441" y="196265"/>
+            <a:ext cx="5465064" cy="5111461"/>
           </a:xfrm>
           <a:prstGeom prst="rect">
             <a:avLst/>
@@ -8279,25 +9452,45 @@
         </p:spPr>
         <p:txBody>
           <a:bodyPr anchor="t">
-            <a:normAutofit fontScale="92500" lnSpcReduction="20000"/>
+            <a:normAutofit fontScale="85000" lnSpcReduction="20000"/>
           </a:bodyPr>
           <a:lstStyle/>
           <a:p>
             <a:r>
               <a:rPr lang="en-US" sz="2200" dirty="0"/>
-              <a:t>As expected, the larger flat types see higher median prices than those of smaller types</a:t>
-            </a:r>
-          </a:p>
-          <a:p>
+              <a:t>As expected, the </a:t>
+            </a:r>
+            <a:r>
+              <a:rPr lang="en-US" sz="2200" b="1" dirty="0"/>
+              <a:t>larger flat types see higher median prices</a:t>
+            </a:r>
             <a:r>
               <a:rPr lang="en-US" sz="2200" dirty="0"/>
-              <a:t>Most flat types (except 1-room and Multi-Generation) are right-skewed with many outliers in the higher range of prices</a:t>
+              <a:t> than those of smaller types</a:t>
             </a:r>
           </a:p>
           <a:p>
             <a:r>
               <a:rPr lang="en-US" sz="2200" dirty="0"/>
-              <a:t>The reason for skewness could be due to recent sales of resale flats hitting the price point of S$1m</a:t>
+              <a:t>Most flat types prices (except 1-room and Multi-Generation) are </a:t>
+            </a:r>
+            <a:r>
+              <a:rPr lang="en-US" sz="2200" b="1" dirty="0"/>
+              <a:t>right-skewed with many outliers in the higher range</a:t>
+            </a:r>
+            <a:r>
+              <a:rPr lang="en-US" sz="2200" dirty="0"/>
+              <a:t> of prices</a:t>
+            </a:r>
+          </a:p>
+          <a:p>
+            <a:r>
+              <a:rPr lang="en-US" sz="2200" dirty="0"/>
+              <a:t>The </a:t>
+            </a:r>
+            <a:r>
+              <a:rPr lang="en-US" sz="2200" b="1" dirty="0"/>
+              <a:t>reason for skewness could be due to recent sales of resale flats hitting the price point of S$1m</a:t>
             </a:r>
           </a:p>
         </p:txBody>
@@ -8542,6 +9735,18 @@
   <p:clrMapOvr>
     <a:masterClrMapping/>
   </p:clrMapOvr>
+  <mc:AlternateContent xmlns:mc="http://schemas.openxmlformats.org/markup-compatibility/2006">
+    <mc:Choice xmlns:p159="http://schemas.microsoft.com/office/powerpoint/2015/09/main" Requires="p159">
+      <p:transition xmlns:p14="http://schemas.microsoft.com/office/powerpoint/2010/main" spd="slow" p14:dur="2000">
+        <p159:morph option="byObject"/>
+      </p:transition>
+    </mc:Choice>
+    <mc:Fallback>
+      <p:transition spd="slow">
+        <p:fade/>
+      </p:transition>
+    </mc:Fallback>
+  </mc:AlternateContent>
 </p:sld>
 </file>
 

</xml_diff>

<commit_message>
resale applications, sales and prices analyses
</commit_message>
<xml_diff>
--- a/CA1/CA1 Slides.pptx
+++ b/CA1/CA1 Slides.pptx
@@ -5,7 +5,7 @@
     <p:sldMasterId id="2147483648" r:id="rId1"/>
   </p:sldMasterIdLst>
   <p:notesMasterIdLst>
-    <p:notesMasterId r:id="rId18"/>
+    <p:notesMasterId r:id="rId19"/>
   </p:notesMasterIdLst>
   <p:sldIdLst>
     <p:sldId id="256" r:id="rId2"/>
@@ -21,9 +21,10 @@
     <p:sldId id="272" r:id="rId12"/>
     <p:sldId id="273" r:id="rId13"/>
     <p:sldId id="269" r:id="rId14"/>
-    <p:sldId id="266" r:id="rId15"/>
-    <p:sldId id="267" r:id="rId16"/>
-    <p:sldId id="268" r:id="rId17"/>
+    <p:sldId id="274" r:id="rId15"/>
+    <p:sldId id="266" r:id="rId16"/>
+    <p:sldId id="267" r:id="rId17"/>
+    <p:sldId id="268" r:id="rId18"/>
   </p:sldIdLst>
   <p:sldSz cx="12192000" cy="6858000"/>
   <p:notesSz cx="6858000" cy="9144000"/>
@@ -6380,7 +6381,7 @@
         </p:nvSpPr>
         <p:spPr>
           <a:xfrm>
-            <a:off x="838200" y="365125"/>
+            <a:off x="238932" y="392724"/>
             <a:ext cx="5857068" cy="1325563"/>
           </a:xfrm>
         </p:spPr>
@@ -6388,7 +6389,10 @@
           <a:bodyPr/>
           <a:lstStyle/>
           <a:p>
-            <a:endParaRPr lang="en-US" dirty="0"/>
+            <a:r>
+              <a:rPr lang="en-US" dirty="0"/>
+              <a:t>HDB Resale Flat Sales and Applications</a:t>
+            </a:r>
           </a:p>
         </p:txBody>
       </p:sp>
@@ -6410,7 +6414,7 @@
         </p:nvSpPr>
         <p:spPr>
           <a:xfrm>
-            <a:off x="838200" y="1825625"/>
+            <a:off x="238932" y="1853224"/>
             <a:ext cx="5857068" cy="4351338"/>
           </a:xfrm>
         </p:spPr>
@@ -6418,6 +6422,10 @@
           <a:bodyPr/>
           <a:lstStyle/>
           <a:p>
+            <a:r>
+              <a:rPr lang="en-US" dirty="0" err="1"/>
+              <a:t>adsasda</a:t>
+            </a:r>
             <a:endParaRPr lang="en-US" dirty="0"/>
           </a:p>
         </p:txBody>
@@ -6468,14 +6476,42 @@
         </p:nvPicPr>
         <p:blipFill>
           <a:blip r:embed="rId2"/>
-          <a:stretch>
-            <a:fillRect/>
-          </a:stretch>
+          <a:srcRect/>
+          <a:stretch/>
         </p:blipFill>
         <p:spPr>
           <a:xfrm>
-            <a:off x="6865749" y="392724"/>
-            <a:ext cx="5181100" cy="5931984"/>
+            <a:off x="11138951" y="5285232"/>
+            <a:ext cx="907896" cy="1039476"/>
+          </a:xfrm>
+          <a:prstGeom prst="rect">
+            <a:avLst/>
+          </a:prstGeom>
+        </p:spPr>
+      </p:pic>
+      <p:pic>
+        <p:nvPicPr>
+          <p:cNvPr id="13" name="Picture 12" descr="Text&#10;&#10;Description automatically generated">
+            <a:extLst>
+              <a:ext uri="{FF2B5EF4-FFF2-40B4-BE49-F238E27FC236}">
+                <a16:creationId xmlns:a16="http://schemas.microsoft.com/office/drawing/2014/main" id="{F2ED9892-5D36-01EA-B8E7-7F60964C09BB}"/>
+              </a:ext>
+            </a:extLst>
+          </p:cNvPr>
+          <p:cNvPicPr>
+            <a:picLocks noChangeAspect="1"/>
+          </p:cNvPicPr>
+          <p:nvPr/>
+        </p:nvPicPr>
+        <p:blipFill rotWithShape="1">
+          <a:blip r:embed="rId3"/>
+          <a:srcRect l="2750" t="2854" r="2605" b="3148"/>
+          <a:stretch/>
+        </p:blipFill>
+        <p:spPr>
+          <a:xfrm>
+            <a:off x="6643506" y="78169"/>
+            <a:ext cx="4283573" cy="6471324"/>
           </a:xfrm>
           <a:prstGeom prst="rect">
             <a:avLst/>
@@ -6517,7 +6553,7 @@
           <p:cNvPr id="2" name="Title 1">
             <a:extLst>
               <a:ext uri="{FF2B5EF4-FFF2-40B4-BE49-F238E27FC236}">
-                <a16:creationId xmlns:a16="http://schemas.microsoft.com/office/drawing/2014/main" id="{11DBBA12-6E02-21FB-9470-5A7FAEEDC054}"/>
+                <a16:creationId xmlns:a16="http://schemas.microsoft.com/office/drawing/2014/main" id="{6AA6D162-3792-C1DD-3411-EEF61C233EC6}"/>
               </a:ext>
             </a:extLst>
           </p:cNvPr>
@@ -6530,54 +6566,57 @@
         </p:nvSpPr>
         <p:spPr>
           <a:xfrm>
-            <a:off x="838200" y="365125"/>
-            <a:ext cx="4245244" cy="1325563"/>
+            <a:off x="238932" y="392724"/>
+            <a:ext cx="5857068" cy="1325563"/>
           </a:xfrm>
         </p:spPr>
         <p:txBody>
           <a:bodyPr/>
           <a:lstStyle/>
           <a:p>
+            <a:r>
+              <a:rPr lang="en-US" dirty="0"/>
+              <a:t>HDB Resale Flat Sales and Applications</a:t>
+            </a:r>
+          </a:p>
+        </p:txBody>
+      </p:sp>
+      <p:sp>
+        <p:nvSpPr>
+          <p:cNvPr id="3" name="Content Placeholder 2">
+            <a:extLst>
+              <a:ext uri="{FF2B5EF4-FFF2-40B4-BE49-F238E27FC236}">
+                <a16:creationId xmlns:a16="http://schemas.microsoft.com/office/drawing/2014/main" id="{F8F5BA37-534C-3525-8A90-76F4E0BE1FE1}"/>
+              </a:ext>
+            </a:extLst>
+          </p:cNvPr>
+          <p:cNvSpPr>
+            <a:spLocks noGrp="1"/>
+          </p:cNvSpPr>
+          <p:nvPr>
+            <p:ph idx="1"/>
+          </p:nvPr>
+        </p:nvSpPr>
+        <p:spPr>
+          <a:xfrm>
+            <a:off x="238932" y="1853224"/>
+            <a:ext cx="5857068" cy="4351338"/>
+          </a:xfrm>
+        </p:spPr>
+        <p:txBody>
+          <a:bodyPr/>
+          <a:lstStyle/>
+          <a:p>
             <a:endParaRPr lang="en-US" dirty="0"/>
           </a:p>
         </p:txBody>
       </p:sp>
       <p:sp>
         <p:nvSpPr>
-          <p:cNvPr id="3" name="Content Placeholder 2">
-            <a:extLst>
-              <a:ext uri="{FF2B5EF4-FFF2-40B4-BE49-F238E27FC236}">
-                <a16:creationId xmlns:a16="http://schemas.microsoft.com/office/drawing/2014/main" id="{CE84337D-3D74-248F-711D-B55D3962994C}"/>
-              </a:ext>
-            </a:extLst>
-          </p:cNvPr>
-          <p:cNvSpPr>
-            <a:spLocks noGrp="1"/>
-          </p:cNvSpPr>
-          <p:nvPr>
-            <p:ph idx="1"/>
-          </p:nvPr>
-        </p:nvSpPr>
-        <p:spPr>
-          <a:xfrm>
-            <a:off x="838200" y="1825625"/>
-            <a:ext cx="4245244" cy="4351338"/>
-          </a:xfrm>
-        </p:spPr>
-        <p:txBody>
-          <a:bodyPr/>
-          <a:lstStyle/>
-          <a:p>
-            <a:endParaRPr lang="en-US" dirty="0"/>
-          </a:p>
-        </p:txBody>
-      </p:sp>
-      <p:sp>
-        <p:nvSpPr>
           <p:cNvPr id="4" name="Slide Number Placeholder 3">
             <a:extLst>
               <a:ext uri="{FF2B5EF4-FFF2-40B4-BE49-F238E27FC236}">
-                <a16:creationId xmlns:a16="http://schemas.microsoft.com/office/drawing/2014/main" id="{D79CC5E2-9BD9-56C9-BCE1-07015755B40D}"/>
+                <a16:creationId xmlns:a16="http://schemas.microsoft.com/office/drawing/2014/main" id="{AD5ABD77-EBE2-5386-06B6-7CC422E72F01}"/>
               </a:ext>
             </a:extLst>
           </p:cNvPr>
@@ -6604,10 +6643,10 @@
       </p:sp>
       <p:pic>
         <p:nvPicPr>
-          <p:cNvPr id="5" name="Picture 4">
-            <a:extLst>
-              <a:ext uri="{FF2B5EF4-FFF2-40B4-BE49-F238E27FC236}">
-                <a16:creationId xmlns:a16="http://schemas.microsoft.com/office/drawing/2014/main" id="{E7EABACD-2C7E-DE0C-5F10-F1CFD4A048FF}"/>
+          <p:cNvPr id="6" name="Picture 5">
+            <a:extLst>
+              <a:ext uri="{FF2B5EF4-FFF2-40B4-BE49-F238E27FC236}">
+                <a16:creationId xmlns:a16="http://schemas.microsoft.com/office/drawing/2014/main" id="{5DD47241-F288-21E8-88CB-A6F28FCB8960}"/>
               </a:ext>
             </a:extLst>
           </p:cNvPr>
@@ -6623,8 +6662,8 @@
         </p:blipFill>
         <p:spPr>
           <a:xfrm>
-            <a:off x="5381670" y="981189"/>
-            <a:ext cx="6541809" cy="4895621"/>
+            <a:off x="6521512" y="180961"/>
+            <a:ext cx="5390017" cy="6171178"/>
           </a:xfrm>
           <a:prstGeom prst="rect">
             <a:avLst/>
@@ -6634,13 +6673,25 @@
     </p:spTree>
     <p:extLst>
       <p:ext uri="{BB962C8B-B14F-4D97-AF65-F5344CB8AC3E}">
-        <p14:creationId xmlns:p14="http://schemas.microsoft.com/office/powerpoint/2010/main" val="2638041493"/>
+        <p14:creationId xmlns:p14="http://schemas.microsoft.com/office/powerpoint/2010/main" val="1863907567"/>
       </p:ext>
     </p:extLst>
   </p:cSld>
   <p:clrMapOvr>
     <a:masterClrMapping/>
   </p:clrMapOvr>
+  <mc:AlternateContent xmlns:mc="http://schemas.openxmlformats.org/markup-compatibility/2006">
+    <mc:Choice xmlns:p159="http://schemas.microsoft.com/office/powerpoint/2015/09/main" Requires="p159">
+      <p:transition xmlns:p14="http://schemas.microsoft.com/office/powerpoint/2010/main" spd="slow" p14:dur="2000">
+        <p159:morph option="byObject"/>
+      </p:transition>
+    </mc:Choice>
+    <mc:Fallback>
+      <p:transition spd="slow">
+        <p:fade/>
+      </p:transition>
+    </mc:Fallback>
+  </mc:AlternateContent>
 </p:sld>
 </file>
 
@@ -6666,7 +6717,7 @@
           <p:cNvPr id="2" name="Title 1">
             <a:extLst>
               <a:ext uri="{FF2B5EF4-FFF2-40B4-BE49-F238E27FC236}">
-                <a16:creationId xmlns:a16="http://schemas.microsoft.com/office/drawing/2014/main" id="{EC4B782B-6B1F-16F5-7582-475E887D20D9}"/>
+                <a16:creationId xmlns:a16="http://schemas.microsoft.com/office/drawing/2014/main" id="{11DBBA12-6E02-21FB-9470-5A7FAEEDC054}"/>
               </a:ext>
             </a:extLst>
           </p:cNvPr>
@@ -6679,8 +6730,8 @@
         </p:nvSpPr>
         <p:spPr>
           <a:xfrm>
-            <a:off x="838199" y="365125"/>
-            <a:ext cx="5066655" cy="1325563"/>
+            <a:off x="838200" y="365125"/>
+            <a:ext cx="4245244" cy="1325563"/>
           </a:xfrm>
         </p:spPr>
         <p:txBody>
@@ -6696,7 +6747,7 @@
           <p:cNvPr id="3" name="Content Placeholder 2">
             <a:extLst>
               <a:ext uri="{FF2B5EF4-FFF2-40B4-BE49-F238E27FC236}">
-                <a16:creationId xmlns:a16="http://schemas.microsoft.com/office/drawing/2014/main" id="{2D21537C-8050-0B9C-B9E0-2076DCEDC41B}"/>
+                <a16:creationId xmlns:a16="http://schemas.microsoft.com/office/drawing/2014/main" id="{CE84337D-3D74-248F-711D-B55D3962994C}"/>
               </a:ext>
             </a:extLst>
           </p:cNvPr>
@@ -6709,8 +6760,8 @@
         </p:nvSpPr>
         <p:spPr>
           <a:xfrm>
-            <a:off x="838199" y="1825625"/>
-            <a:ext cx="5066655" cy="4351338"/>
+            <a:off x="838200" y="1825625"/>
+            <a:ext cx="4245244" cy="4351338"/>
           </a:xfrm>
         </p:spPr>
         <p:txBody>
@@ -6726,7 +6777,7 @@
           <p:cNvPr id="4" name="Slide Number Placeholder 3">
             <a:extLst>
               <a:ext uri="{FF2B5EF4-FFF2-40B4-BE49-F238E27FC236}">
-                <a16:creationId xmlns:a16="http://schemas.microsoft.com/office/drawing/2014/main" id="{E997AB43-4AAD-B4DA-E158-D945270FC108}"/>
+                <a16:creationId xmlns:a16="http://schemas.microsoft.com/office/drawing/2014/main" id="{D79CC5E2-9BD9-56C9-BCE1-07015755B40D}"/>
               </a:ext>
             </a:extLst>
           </p:cNvPr>
@@ -6753,10 +6804,10 @@
       </p:sp>
       <p:pic>
         <p:nvPicPr>
-          <p:cNvPr id="6" name="Picture 5">
-            <a:extLst>
-              <a:ext uri="{FF2B5EF4-FFF2-40B4-BE49-F238E27FC236}">
-                <a16:creationId xmlns:a16="http://schemas.microsoft.com/office/drawing/2014/main" id="{02508BBA-7536-E325-E2BF-0B5DD2B18C6D}"/>
+          <p:cNvPr id="5" name="Picture 4">
+            <a:extLst>
+              <a:ext uri="{FF2B5EF4-FFF2-40B4-BE49-F238E27FC236}">
+                <a16:creationId xmlns:a16="http://schemas.microsoft.com/office/drawing/2014/main" id="{E7EABACD-2C7E-DE0C-5F10-F1CFD4A048FF}"/>
               </a:ext>
             </a:extLst>
           </p:cNvPr>
@@ -6767,14 +6818,13 @@
         </p:nvPicPr>
         <p:blipFill>
           <a:blip r:embed="rId2"/>
-          <a:stretch>
-            <a:fillRect/>
-          </a:stretch>
+          <a:srcRect/>
+          <a:stretch/>
         </p:blipFill>
         <p:spPr>
           <a:xfrm>
-            <a:off x="6044337" y="425557"/>
-            <a:ext cx="6006885" cy="6006885"/>
+            <a:off x="5381670" y="981189"/>
+            <a:ext cx="6541809" cy="4895621"/>
           </a:xfrm>
           <a:prstGeom prst="rect">
             <a:avLst/>
@@ -6784,7 +6834,7 @@
     </p:spTree>
     <p:extLst>
       <p:ext uri="{BB962C8B-B14F-4D97-AF65-F5344CB8AC3E}">
-        <p14:creationId xmlns:p14="http://schemas.microsoft.com/office/powerpoint/2010/main" val="928219461"/>
+        <p14:creationId xmlns:p14="http://schemas.microsoft.com/office/powerpoint/2010/main" val="2638041493"/>
       </p:ext>
     </p:extLst>
   </p:cSld>
@@ -6816,7 +6866,7 @@
           <p:cNvPr id="2" name="Title 1">
             <a:extLst>
               <a:ext uri="{FF2B5EF4-FFF2-40B4-BE49-F238E27FC236}">
-                <a16:creationId xmlns:a16="http://schemas.microsoft.com/office/drawing/2014/main" id="{C4A634B8-030A-4482-12C1-692EE51B6997}"/>
+                <a16:creationId xmlns:a16="http://schemas.microsoft.com/office/drawing/2014/main" id="{EC4B782B-6B1F-16F5-7582-475E887D20D9}"/>
               </a:ext>
             </a:extLst>
           </p:cNvPr>
@@ -6829,15 +6879,15 @@
         </p:nvSpPr>
         <p:spPr>
           <a:xfrm>
-            <a:off x="838200" y="365125"/>
-            <a:ext cx="5717583" cy="1325563"/>
+            <a:off x="838199" y="365125"/>
+            <a:ext cx="5066655" cy="1325563"/>
           </a:xfrm>
         </p:spPr>
         <p:txBody>
           <a:bodyPr/>
           <a:lstStyle/>
           <a:p>
-            <a:endParaRPr lang="en-US"/>
+            <a:endParaRPr lang="en-US" dirty="0"/>
           </a:p>
         </p:txBody>
       </p:sp>
@@ -6846,7 +6896,7 @@
           <p:cNvPr id="3" name="Content Placeholder 2">
             <a:extLst>
               <a:ext uri="{FF2B5EF4-FFF2-40B4-BE49-F238E27FC236}">
-                <a16:creationId xmlns:a16="http://schemas.microsoft.com/office/drawing/2014/main" id="{BDE36D69-B8B0-C3E8-84ED-BA08459C3658}"/>
+                <a16:creationId xmlns:a16="http://schemas.microsoft.com/office/drawing/2014/main" id="{2D21537C-8050-0B9C-B9E0-2076DCEDC41B}"/>
               </a:ext>
             </a:extLst>
           </p:cNvPr>
@@ -6859,15 +6909,15 @@
         </p:nvSpPr>
         <p:spPr>
           <a:xfrm>
-            <a:off x="838200" y="1825625"/>
-            <a:ext cx="5717583" cy="4351338"/>
+            <a:off x="838199" y="1825625"/>
+            <a:ext cx="5066655" cy="4351338"/>
           </a:xfrm>
         </p:spPr>
         <p:txBody>
           <a:bodyPr/>
           <a:lstStyle/>
           <a:p>
-            <a:endParaRPr lang="en-US"/>
+            <a:endParaRPr lang="en-US" dirty="0"/>
           </a:p>
         </p:txBody>
       </p:sp>
@@ -6876,7 +6926,7 @@
           <p:cNvPr id="4" name="Slide Number Placeholder 3">
             <a:extLst>
               <a:ext uri="{FF2B5EF4-FFF2-40B4-BE49-F238E27FC236}">
-                <a16:creationId xmlns:a16="http://schemas.microsoft.com/office/drawing/2014/main" id="{30E3EB71-C593-925E-73EB-D9B83D7E9927}"/>
+                <a16:creationId xmlns:a16="http://schemas.microsoft.com/office/drawing/2014/main" id="{E997AB43-4AAD-B4DA-E158-D945270FC108}"/>
               </a:ext>
             </a:extLst>
           </p:cNvPr>
@@ -6896,6 +6946,156 @@
               <a:rPr lang="en-US" smtClean="0"/>
               <a:pPr/>
               <a:t>16</a:t>
+            </a:fld>
+            <a:endParaRPr lang="en-US" dirty="0"/>
+          </a:p>
+        </p:txBody>
+      </p:sp>
+      <p:pic>
+        <p:nvPicPr>
+          <p:cNvPr id="6" name="Picture 5">
+            <a:extLst>
+              <a:ext uri="{FF2B5EF4-FFF2-40B4-BE49-F238E27FC236}">
+                <a16:creationId xmlns:a16="http://schemas.microsoft.com/office/drawing/2014/main" id="{02508BBA-7536-E325-E2BF-0B5DD2B18C6D}"/>
+              </a:ext>
+            </a:extLst>
+          </p:cNvPr>
+          <p:cNvPicPr>
+            <a:picLocks noChangeAspect="1"/>
+          </p:cNvPicPr>
+          <p:nvPr/>
+        </p:nvPicPr>
+        <p:blipFill>
+          <a:blip r:embed="rId2"/>
+          <a:stretch>
+            <a:fillRect/>
+          </a:stretch>
+        </p:blipFill>
+        <p:spPr>
+          <a:xfrm>
+            <a:off x="6044337" y="425557"/>
+            <a:ext cx="6006885" cy="6006885"/>
+          </a:xfrm>
+          <a:prstGeom prst="rect">
+            <a:avLst/>
+          </a:prstGeom>
+        </p:spPr>
+      </p:pic>
+    </p:spTree>
+    <p:extLst>
+      <p:ext uri="{BB962C8B-B14F-4D97-AF65-F5344CB8AC3E}">
+        <p14:creationId xmlns:p14="http://schemas.microsoft.com/office/powerpoint/2010/main" val="928219461"/>
+      </p:ext>
+    </p:extLst>
+  </p:cSld>
+  <p:clrMapOvr>
+    <a:masterClrMapping/>
+  </p:clrMapOvr>
+</p:sld>
+</file>
+
+<file path=ppt/slides/slide17.xml><?xml version="1.0" encoding="utf-8"?>
+<p:sld xmlns:a="http://schemas.openxmlformats.org/drawingml/2006/main" xmlns:r="http://schemas.openxmlformats.org/officeDocument/2006/relationships" xmlns:p="http://schemas.openxmlformats.org/presentationml/2006/main">
+  <p:cSld>
+    <p:spTree>
+      <p:nvGrpSpPr>
+        <p:cNvPr id="1" name=""/>
+        <p:cNvGrpSpPr/>
+        <p:nvPr/>
+      </p:nvGrpSpPr>
+      <p:grpSpPr>
+        <a:xfrm>
+          <a:off x="0" y="0"/>
+          <a:ext cx="0" cy="0"/>
+          <a:chOff x="0" y="0"/>
+          <a:chExt cx="0" cy="0"/>
+        </a:xfrm>
+      </p:grpSpPr>
+      <p:sp>
+        <p:nvSpPr>
+          <p:cNvPr id="2" name="Title 1">
+            <a:extLst>
+              <a:ext uri="{FF2B5EF4-FFF2-40B4-BE49-F238E27FC236}">
+                <a16:creationId xmlns:a16="http://schemas.microsoft.com/office/drawing/2014/main" id="{C4A634B8-030A-4482-12C1-692EE51B6997}"/>
+              </a:ext>
+            </a:extLst>
+          </p:cNvPr>
+          <p:cNvSpPr>
+            <a:spLocks noGrp="1"/>
+          </p:cNvSpPr>
+          <p:nvPr>
+            <p:ph type="title"/>
+          </p:nvPr>
+        </p:nvSpPr>
+        <p:spPr>
+          <a:xfrm>
+            <a:off x="838200" y="365125"/>
+            <a:ext cx="5717583" cy="1325563"/>
+          </a:xfrm>
+        </p:spPr>
+        <p:txBody>
+          <a:bodyPr/>
+          <a:lstStyle/>
+          <a:p>
+            <a:endParaRPr lang="en-US"/>
+          </a:p>
+        </p:txBody>
+      </p:sp>
+      <p:sp>
+        <p:nvSpPr>
+          <p:cNvPr id="3" name="Content Placeholder 2">
+            <a:extLst>
+              <a:ext uri="{FF2B5EF4-FFF2-40B4-BE49-F238E27FC236}">
+                <a16:creationId xmlns:a16="http://schemas.microsoft.com/office/drawing/2014/main" id="{BDE36D69-B8B0-C3E8-84ED-BA08459C3658}"/>
+              </a:ext>
+            </a:extLst>
+          </p:cNvPr>
+          <p:cNvSpPr>
+            <a:spLocks noGrp="1"/>
+          </p:cNvSpPr>
+          <p:nvPr>
+            <p:ph idx="1"/>
+          </p:nvPr>
+        </p:nvSpPr>
+        <p:spPr>
+          <a:xfrm>
+            <a:off x="838200" y="1825625"/>
+            <a:ext cx="5717583" cy="4351338"/>
+          </a:xfrm>
+        </p:spPr>
+        <p:txBody>
+          <a:bodyPr/>
+          <a:lstStyle/>
+          <a:p>
+            <a:endParaRPr lang="en-US"/>
+          </a:p>
+        </p:txBody>
+      </p:sp>
+      <p:sp>
+        <p:nvSpPr>
+          <p:cNvPr id="4" name="Slide Number Placeholder 3">
+            <a:extLst>
+              <a:ext uri="{FF2B5EF4-FFF2-40B4-BE49-F238E27FC236}">
+                <a16:creationId xmlns:a16="http://schemas.microsoft.com/office/drawing/2014/main" id="{30E3EB71-C593-925E-73EB-D9B83D7E9927}"/>
+              </a:ext>
+            </a:extLst>
+          </p:cNvPr>
+          <p:cNvSpPr>
+            <a:spLocks noGrp="1"/>
+          </p:cNvSpPr>
+          <p:nvPr>
+            <p:ph type="sldNum" sz="quarter" idx="12"/>
+          </p:nvPr>
+        </p:nvSpPr>
+        <p:spPr/>
+        <p:txBody>
+          <a:bodyPr/>
+          <a:lstStyle/>
+          <a:p>
+            <a:fld id="{E6FE59FF-D9EB-D545-90E6-CE90D1694C9B}" type="slidenum">
+              <a:rPr lang="en-US" smtClean="0"/>
+              <a:pPr/>
+              <a:t>17</a:t>
             </a:fld>
             <a:endParaRPr lang="en-US" dirty="0"/>
           </a:p>

</xml_diff>